<commit_message>
feat: add ft for SmartArt sync error dialog
</commit_message>
<xml_diff>
--- a/doc/test/SyncLab/SyncLab.pptx
+++ b/doc/test/SyncLab/SyncLab.pptx
@@ -8,7 +8,7 @@
     <p:sldMasterId id="2147483684" r:id="rId4"/>
   </p:sldMasterIdLst>
   <p:notesMasterIdLst>
-    <p:notesMasterId r:id="rId51"/>
+    <p:notesMasterId r:id="rId52"/>
   </p:notesMasterIdLst>
   <p:sldIdLst>
     <p:sldId id="287" r:id="rId5"/>
@@ -57,6 +57,7 @@
     <p:sldId id="416" r:id="rId48"/>
     <p:sldId id="417" r:id="rId49"/>
     <p:sldId id="418" r:id="rId50"/>
+    <p:sldId id="419" r:id="rId51"/>
   </p:sldIdLst>
   <p:sldSz cx="9144000" cy="6858000" type="screen4x3"/>
   <p:notesSz cx="6858000" cy="9144000"/>
@@ -230,6 +231,7 @@
             <p14:sldId id="416"/>
             <p14:sldId id="417"/>
             <p14:sldId id="418"/>
+            <p14:sldId id="419"/>
           </p14:sldIdLst>
         </p14:section>
       </p14:sectionLst>
@@ -1238,6 +1240,2593 @@
 </cs:chartStyle>
 </file>
 
+<file path=ppt/diagrams/colors1.xml><?xml version="1.0" encoding="utf-8"?>
+<dgm:colorsDef xmlns:dgm="http://schemas.openxmlformats.org/drawingml/2006/diagram" xmlns:a="http://schemas.openxmlformats.org/drawingml/2006/main" uniqueId="urn:microsoft.com/office/officeart/2005/8/colors/accent1_2">
+  <dgm:title val=""/>
+  <dgm:desc val=""/>
+  <dgm:catLst>
+    <dgm:cat type="accent1" pri="11200"/>
+  </dgm:catLst>
+  <dgm:styleLbl name="node0">
+    <dgm:fillClrLst meth="repeat">
+      <a:schemeClr val="accent1"/>
+    </dgm:fillClrLst>
+    <dgm:linClrLst meth="repeat">
+      <a:schemeClr val="lt1"/>
+    </dgm:linClrLst>
+    <dgm:effectClrLst/>
+    <dgm:txLinClrLst/>
+    <dgm:txFillClrLst/>
+    <dgm:txEffectClrLst/>
+  </dgm:styleLbl>
+  <dgm:styleLbl name="alignNode1">
+    <dgm:fillClrLst meth="repeat">
+      <a:schemeClr val="accent1"/>
+    </dgm:fillClrLst>
+    <dgm:linClrLst meth="repeat">
+      <a:schemeClr val="accent1"/>
+    </dgm:linClrLst>
+    <dgm:effectClrLst/>
+    <dgm:txLinClrLst/>
+    <dgm:txFillClrLst/>
+    <dgm:txEffectClrLst/>
+  </dgm:styleLbl>
+  <dgm:styleLbl name="node1">
+    <dgm:fillClrLst meth="repeat">
+      <a:schemeClr val="accent1"/>
+    </dgm:fillClrLst>
+    <dgm:linClrLst meth="repeat">
+      <a:schemeClr val="lt1"/>
+    </dgm:linClrLst>
+    <dgm:effectClrLst/>
+    <dgm:txLinClrLst/>
+    <dgm:txFillClrLst/>
+    <dgm:txEffectClrLst/>
+  </dgm:styleLbl>
+  <dgm:styleLbl name="lnNode1">
+    <dgm:fillClrLst meth="repeat">
+      <a:schemeClr val="accent1"/>
+    </dgm:fillClrLst>
+    <dgm:linClrLst meth="repeat">
+      <a:schemeClr val="lt1"/>
+    </dgm:linClrLst>
+    <dgm:effectClrLst/>
+    <dgm:txLinClrLst/>
+    <dgm:txFillClrLst/>
+    <dgm:txEffectClrLst/>
+  </dgm:styleLbl>
+  <dgm:styleLbl name="vennNode1">
+    <dgm:fillClrLst meth="repeat">
+      <a:schemeClr val="accent1">
+        <a:alpha val="50000"/>
+      </a:schemeClr>
+    </dgm:fillClrLst>
+    <dgm:linClrLst meth="repeat">
+      <a:schemeClr val="lt1"/>
+    </dgm:linClrLst>
+    <dgm:effectClrLst/>
+    <dgm:txLinClrLst/>
+    <dgm:txFillClrLst/>
+    <dgm:txEffectClrLst/>
+  </dgm:styleLbl>
+  <dgm:styleLbl name="node2">
+    <dgm:fillClrLst meth="repeat">
+      <a:schemeClr val="accent1"/>
+    </dgm:fillClrLst>
+    <dgm:linClrLst meth="repeat">
+      <a:schemeClr val="lt1"/>
+    </dgm:linClrLst>
+    <dgm:effectClrLst/>
+    <dgm:txLinClrLst/>
+    <dgm:txFillClrLst/>
+    <dgm:txEffectClrLst/>
+  </dgm:styleLbl>
+  <dgm:styleLbl name="node3">
+    <dgm:fillClrLst meth="repeat">
+      <a:schemeClr val="accent1"/>
+    </dgm:fillClrLst>
+    <dgm:linClrLst meth="repeat">
+      <a:schemeClr val="lt1"/>
+    </dgm:linClrLst>
+    <dgm:effectClrLst/>
+    <dgm:txLinClrLst/>
+    <dgm:txFillClrLst/>
+    <dgm:txEffectClrLst/>
+  </dgm:styleLbl>
+  <dgm:styleLbl name="node4">
+    <dgm:fillClrLst meth="repeat">
+      <a:schemeClr val="accent1"/>
+    </dgm:fillClrLst>
+    <dgm:linClrLst meth="repeat">
+      <a:schemeClr val="lt1"/>
+    </dgm:linClrLst>
+    <dgm:effectClrLst/>
+    <dgm:txLinClrLst/>
+    <dgm:txFillClrLst/>
+    <dgm:txEffectClrLst/>
+  </dgm:styleLbl>
+  <dgm:styleLbl name="fgImgPlace1">
+    <dgm:fillClrLst meth="repeat">
+      <a:schemeClr val="accent1">
+        <a:tint val="50000"/>
+      </a:schemeClr>
+    </dgm:fillClrLst>
+    <dgm:linClrLst meth="repeat">
+      <a:schemeClr val="lt1"/>
+    </dgm:linClrLst>
+    <dgm:effectClrLst/>
+    <dgm:txLinClrLst/>
+    <dgm:txFillClrLst meth="repeat">
+      <a:schemeClr val="lt1"/>
+    </dgm:txFillClrLst>
+    <dgm:txEffectClrLst/>
+  </dgm:styleLbl>
+  <dgm:styleLbl name="alignImgPlace1">
+    <dgm:fillClrLst meth="repeat">
+      <a:schemeClr val="accent1">
+        <a:tint val="50000"/>
+      </a:schemeClr>
+    </dgm:fillClrLst>
+    <dgm:linClrLst meth="repeat">
+      <a:schemeClr val="lt1"/>
+    </dgm:linClrLst>
+    <dgm:effectClrLst/>
+    <dgm:txLinClrLst/>
+    <dgm:txFillClrLst meth="repeat">
+      <a:schemeClr val="lt1"/>
+    </dgm:txFillClrLst>
+    <dgm:txEffectClrLst/>
+  </dgm:styleLbl>
+  <dgm:styleLbl name="bgImgPlace1">
+    <dgm:fillClrLst meth="repeat">
+      <a:schemeClr val="accent1">
+        <a:tint val="50000"/>
+      </a:schemeClr>
+    </dgm:fillClrLst>
+    <dgm:linClrLst meth="repeat">
+      <a:schemeClr val="lt1"/>
+    </dgm:linClrLst>
+    <dgm:effectClrLst/>
+    <dgm:txLinClrLst/>
+    <dgm:txFillClrLst meth="repeat">
+      <a:schemeClr val="lt1"/>
+    </dgm:txFillClrLst>
+    <dgm:txEffectClrLst/>
+  </dgm:styleLbl>
+  <dgm:styleLbl name="sibTrans2D1">
+    <dgm:fillClrLst meth="repeat">
+      <a:schemeClr val="accent1">
+        <a:tint val="60000"/>
+      </a:schemeClr>
+    </dgm:fillClrLst>
+    <dgm:linClrLst meth="repeat">
+      <a:schemeClr val="accent1">
+        <a:tint val="60000"/>
+      </a:schemeClr>
+    </dgm:linClrLst>
+    <dgm:effectClrLst/>
+    <dgm:txLinClrLst/>
+    <dgm:txFillClrLst/>
+    <dgm:txEffectClrLst/>
+  </dgm:styleLbl>
+  <dgm:styleLbl name="fgSibTrans2D1">
+    <dgm:fillClrLst meth="repeat">
+      <a:schemeClr val="accent1">
+        <a:tint val="60000"/>
+      </a:schemeClr>
+    </dgm:fillClrLst>
+    <dgm:linClrLst meth="repeat">
+      <a:schemeClr val="accent1">
+        <a:tint val="60000"/>
+      </a:schemeClr>
+    </dgm:linClrLst>
+    <dgm:effectClrLst/>
+    <dgm:txLinClrLst/>
+    <dgm:txFillClrLst/>
+    <dgm:txEffectClrLst/>
+  </dgm:styleLbl>
+  <dgm:styleLbl name="bgSibTrans2D1">
+    <dgm:fillClrLst meth="repeat">
+      <a:schemeClr val="accent1">
+        <a:tint val="60000"/>
+      </a:schemeClr>
+    </dgm:fillClrLst>
+    <dgm:linClrLst meth="repeat">
+      <a:schemeClr val="accent1">
+        <a:tint val="60000"/>
+      </a:schemeClr>
+    </dgm:linClrLst>
+    <dgm:effectClrLst/>
+    <dgm:txLinClrLst/>
+    <dgm:txFillClrLst/>
+    <dgm:txEffectClrLst/>
+  </dgm:styleLbl>
+  <dgm:styleLbl name="sibTrans1D1">
+    <dgm:fillClrLst meth="repeat">
+      <a:schemeClr val="accent1"/>
+    </dgm:fillClrLst>
+    <dgm:linClrLst meth="repeat">
+      <a:schemeClr val="accent1"/>
+    </dgm:linClrLst>
+    <dgm:effectClrLst/>
+    <dgm:txLinClrLst/>
+    <dgm:txFillClrLst meth="repeat">
+      <a:schemeClr val="tx1"/>
+    </dgm:txFillClrLst>
+    <dgm:txEffectClrLst/>
+  </dgm:styleLbl>
+  <dgm:styleLbl name="callout">
+    <dgm:fillClrLst meth="repeat">
+      <a:schemeClr val="accent1"/>
+    </dgm:fillClrLst>
+    <dgm:linClrLst meth="repeat">
+      <a:schemeClr val="accent1">
+        <a:tint val="50000"/>
+      </a:schemeClr>
+    </dgm:linClrLst>
+    <dgm:effectClrLst/>
+    <dgm:txLinClrLst/>
+    <dgm:txFillClrLst meth="repeat">
+      <a:schemeClr val="tx1"/>
+    </dgm:txFillClrLst>
+    <dgm:txEffectClrLst/>
+  </dgm:styleLbl>
+  <dgm:styleLbl name="asst0">
+    <dgm:fillClrLst meth="repeat">
+      <a:schemeClr val="accent1"/>
+    </dgm:fillClrLst>
+    <dgm:linClrLst meth="repeat">
+      <a:schemeClr val="lt1"/>
+    </dgm:linClrLst>
+    <dgm:effectClrLst/>
+    <dgm:txLinClrLst/>
+    <dgm:txFillClrLst/>
+    <dgm:txEffectClrLst/>
+  </dgm:styleLbl>
+  <dgm:styleLbl name="asst1">
+    <dgm:fillClrLst meth="repeat">
+      <a:schemeClr val="accent1"/>
+    </dgm:fillClrLst>
+    <dgm:linClrLst meth="repeat">
+      <a:schemeClr val="lt1"/>
+    </dgm:linClrLst>
+    <dgm:effectClrLst/>
+    <dgm:txLinClrLst/>
+    <dgm:txFillClrLst/>
+    <dgm:txEffectClrLst/>
+  </dgm:styleLbl>
+  <dgm:styleLbl name="asst2">
+    <dgm:fillClrLst meth="repeat">
+      <a:schemeClr val="accent1"/>
+    </dgm:fillClrLst>
+    <dgm:linClrLst meth="repeat">
+      <a:schemeClr val="lt1"/>
+    </dgm:linClrLst>
+    <dgm:effectClrLst/>
+    <dgm:txLinClrLst/>
+    <dgm:txFillClrLst/>
+    <dgm:txEffectClrLst/>
+  </dgm:styleLbl>
+  <dgm:styleLbl name="asst3">
+    <dgm:fillClrLst meth="repeat">
+      <a:schemeClr val="accent1"/>
+    </dgm:fillClrLst>
+    <dgm:linClrLst meth="repeat">
+      <a:schemeClr val="lt1"/>
+    </dgm:linClrLst>
+    <dgm:effectClrLst/>
+    <dgm:txLinClrLst/>
+    <dgm:txFillClrLst/>
+    <dgm:txEffectClrLst/>
+  </dgm:styleLbl>
+  <dgm:styleLbl name="asst4">
+    <dgm:fillClrLst meth="repeat">
+      <a:schemeClr val="accent1"/>
+    </dgm:fillClrLst>
+    <dgm:linClrLst meth="repeat">
+      <a:schemeClr val="lt1"/>
+    </dgm:linClrLst>
+    <dgm:effectClrLst/>
+    <dgm:txLinClrLst/>
+    <dgm:txFillClrLst/>
+    <dgm:txEffectClrLst/>
+  </dgm:styleLbl>
+  <dgm:styleLbl name="parChTrans2D1">
+    <dgm:fillClrLst meth="repeat">
+      <a:schemeClr val="accent1">
+        <a:tint val="60000"/>
+      </a:schemeClr>
+    </dgm:fillClrLst>
+    <dgm:linClrLst meth="repeat">
+      <a:schemeClr val="accent1">
+        <a:tint val="60000"/>
+      </a:schemeClr>
+    </dgm:linClrLst>
+    <dgm:effectClrLst/>
+    <dgm:txLinClrLst/>
+    <dgm:txFillClrLst meth="repeat">
+      <a:schemeClr val="lt1"/>
+    </dgm:txFillClrLst>
+    <dgm:txEffectClrLst/>
+  </dgm:styleLbl>
+  <dgm:styleLbl name="parChTrans2D2">
+    <dgm:fillClrLst meth="repeat">
+      <a:schemeClr val="accent1"/>
+    </dgm:fillClrLst>
+    <dgm:linClrLst meth="repeat">
+      <a:schemeClr val="accent1"/>
+    </dgm:linClrLst>
+    <dgm:effectClrLst/>
+    <dgm:txLinClrLst/>
+    <dgm:txFillClrLst meth="repeat">
+      <a:schemeClr val="lt1"/>
+    </dgm:txFillClrLst>
+    <dgm:txEffectClrLst/>
+  </dgm:styleLbl>
+  <dgm:styleLbl name="parChTrans2D3">
+    <dgm:fillClrLst meth="repeat">
+      <a:schemeClr val="accent1"/>
+    </dgm:fillClrLst>
+    <dgm:linClrLst meth="repeat">
+      <a:schemeClr val="accent1"/>
+    </dgm:linClrLst>
+    <dgm:effectClrLst/>
+    <dgm:txLinClrLst/>
+    <dgm:txFillClrLst meth="repeat">
+      <a:schemeClr val="lt1"/>
+    </dgm:txFillClrLst>
+    <dgm:txEffectClrLst/>
+  </dgm:styleLbl>
+  <dgm:styleLbl name="parChTrans2D4">
+    <dgm:fillClrLst meth="repeat">
+      <a:schemeClr val="accent1"/>
+    </dgm:fillClrLst>
+    <dgm:linClrLst meth="repeat">
+      <a:schemeClr val="accent1"/>
+    </dgm:linClrLst>
+    <dgm:effectClrLst/>
+    <dgm:txLinClrLst/>
+    <dgm:txFillClrLst meth="repeat">
+      <a:schemeClr val="lt1"/>
+    </dgm:txFillClrLst>
+    <dgm:txEffectClrLst/>
+  </dgm:styleLbl>
+  <dgm:styleLbl name="parChTrans1D1">
+    <dgm:fillClrLst meth="repeat">
+      <a:schemeClr val="accent1"/>
+    </dgm:fillClrLst>
+    <dgm:linClrLst meth="repeat">
+      <a:schemeClr val="accent1">
+        <a:shade val="60000"/>
+      </a:schemeClr>
+    </dgm:linClrLst>
+    <dgm:effectClrLst/>
+    <dgm:txLinClrLst/>
+    <dgm:txFillClrLst meth="repeat">
+      <a:schemeClr val="tx1"/>
+    </dgm:txFillClrLst>
+    <dgm:txEffectClrLst/>
+  </dgm:styleLbl>
+  <dgm:styleLbl name="parChTrans1D2">
+    <dgm:fillClrLst meth="repeat">
+      <a:schemeClr val="accent1"/>
+    </dgm:fillClrLst>
+    <dgm:linClrLst meth="repeat">
+      <a:schemeClr val="accent1">
+        <a:shade val="60000"/>
+      </a:schemeClr>
+    </dgm:linClrLst>
+    <dgm:effectClrLst/>
+    <dgm:txLinClrLst/>
+    <dgm:txFillClrLst meth="repeat">
+      <a:schemeClr val="tx1"/>
+    </dgm:txFillClrLst>
+    <dgm:txEffectClrLst/>
+  </dgm:styleLbl>
+  <dgm:styleLbl name="parChTrans1D3">
+    <dgm:fillClrLst meth="repeat">
+      <a:schemeClr val="accent1"/>
+    </dgm:fillClrLst>
+    <dgm:linClrLst meth="repeat">
+      <a:schemeClr val="accent1">
+        <a:shade val="80000"/>
+      </a:schemeClr>
+    </dgm:linClrLst>
+    <dgm:effectClrLst/>
+    <dgm:txLinClrLst/>
+    <dgm:txFillClrLst meth="repeat">
+      <a:schemeClr val="tx1"/>
+    </dgm:txFillClrLst>
+    <dgm:txEffectClrLst/>
+  </dgm:styleLbl>
+  <dgm:styleLbl name="parChTrans1D4">
+    <dgm:fillClrLst meth="repeat">
+      <a:schemeClr val="accent1"/>
+    </dgm:fillClrLst>
+    <dgm:linClrLst meth="repeat">
+      <a:schemeClr val="accent1">
+        <a:shade val="80000"/>
+      </a:schemeClr>
+    </dgm:linClrLst>
+    <dgm:effectClrLst/>
+    <dgm:txLinClrLst/>
+    <dgm:txFillClrLst meth="repeat">
+      <a:schemeClr val="tx1"/>
+    </dgm:txFillClrLst>
+    <dgm:txEffectClrLst/>
+  </dgm:styleLbl>
+  <dgm:styleLbl name="fgAcc1">
+    <dgm:fillClrLst meth="repeat">
+      <a:schemeClr val="lt1">
+        <a:alpha val="90000"/>
+      </a:schemeClr>
+    </dgm:fillClrLst>
+    <dgm:linClrLst meth="repeat">
+      <a:schemeClr val="accent1"/>
+    </dgm:linClrLst>
+    <dgm:effectClrLst/>
+    <dgm:txLinClrLst/>
+    <dgm:txFillClrLst meth="repeat">
+      <a:schemeClr val="dk1"/>
+    </dgm:txFillClrLst>
+    <dgm:txEffectClrLst/>
+  </dgm:styleLbl>
+  <dgm:styleLbl name="conFgAcc1">
+    <dgm:fillClrLst meth="repeat">
+      <a:schemeClr val="lt1">
+        <a:alpha val="90000"/>
+      </a:schemeClr>
+    </dgm:fillClrLst>
+    <dgm:linClrLst meth="repeat">
+      <a:schemeClr val="accent1"/>
+    </dgm:linClrLst>
+    <dgm:effectClrLst/>
+    <dgm:txLinClrLst/>
+    <dgm:txFillClrLst meth="repeat">
+      <a:schemeClr val="dk1"/>
+    </dgm:txFillClrLst>
+    <dgm:txEffectClrLst/>
+  </dgm:styleLbl>
+  <dgm:styleLbl name="alignAcc1">
+    <dgm:fillClrLst meth="repeat">
+      <a:schemeClr val="lt1">
+        <a:alpha val="90000"/>
+      </a:schemeClr>
+    </dgm:fillClrLst>
+    <dgm:linClrLst meth="repeat">
+      <a:schemeClr val="accent1"/>
+    </dgm:linClrLst>
+    <dgm:effectClrLst/>
+    <dgm:txLinClrLst/>
+    <dgm:txFillClrLst meth="repeat">
+      <a:schemeClr val="dk1"/>
+    </dgm:txFillClrLst>
+    <dgm:txEffectClrLst/>
+  </dgm:styleLbl>
+  <dgm:styleLbl name="trAlignAcc1">
+    <dgm:fillClrLst meth="repeat">
+      <a:schemeClr val="lt1">
+        <a:alpha val="40000"/>
+      </a:schemeClr>
+    </dgm:fillClrLst>
+    <dgm:linClrLst meth="repeat">
+      <a:schemeClr val="accent1"/>
+    </dgm:linClrLst>
+    <dgm:effectClrLst/>
+    <dgm:txLinClrLst/>
+    <dgm:txFillClrLst meth="repeat">
+      <a:schemeClr val="dk1"/>
+    </dgm:txFillClrLst>
+    <dgm:txEffectClrLst/>
+  </dgm:styleLbl>
+  <dgm:styleLbl name="bgAcc1">
+    <dgm:fillClrLst meth="repeat">
+      <a:schemeClr val="lt1">
+        <a:alpha val="90000"/>
+      </a:schemeClr>
+    </dgm:fillClrLst>
+    <dgm:linClrLst meth="repeat">
+      <a:schemeClr val="accent1"/>
+    </dgm:linClrLst>
+    <dgm:effectClrLst/>
+    <dgm:txLinClrLst/>
+    <dgm:txFillClrLst meth="repeat">
+      <a:schemeClr val="dk1"/>
+    </dgm:txFillClrLst>
+    <dgm:txEffectClrLst/>
+  </dgm:styleLbl>
+  <dgm:styleLbl name="solidFgAcc1">
+    <dgm:fillClrLst meth="repeat">
+      <a:schemeClr val="lt1"/>
+    </dgm:fillClrLst>
+    <dgm:linClrLst meth="repeat">
+      <a:schemeClr val="accent1"/>
+    </dgm:linClrLst>
+    <dgm:effectClrLst/>
+    <dgm:txLinClrLst/>
+    <dgm:txFillClrLst meth="repeat">
+      <a:schemeClr val="dk1"/>
+    </dgm:txFillClrLst>
+    <dgm:txEffectClrLst/>
+  </dgm:styleLbl>
+  <dgm:styleLbl name="solidAlignAcc1">
+    <dgm:fillClrLst meth="repeat">
+      <a:schemeClr val="lt1"/>
+    </dgm:fillClrLst>
+    <dgm:linClrLst meth="repeat">
+      <a:schemeClr val="accent1"/>
+    </dgm:linClrLst>
+    <dgm:effectClrLst/>
+    <dgm:txLinClrLst/>
+    <dgm:txFillClrLst meth="repeat">
+      <a:schemeClr val="dk1"/>
+    </dgm:txFillClrLst>
+    <dgm:txEffectClrLst/>
+  </dgm:styleLbl>
+  <dgm:styleLbl name="solidBgAcc1">
+    <dgm:fillClrLst meth="repeat">
+      <a:schemeClr val="lt1"/>
+    </dgm:fillClrLst>
+    <dgm:linClrLst meth="repeat">
+      <a:schemeClr val="accent1"/>
+    </dgm:linClrLst>
+    <dgm:effectClrLst/>
+    <dgm:txLinClrLst/>
+    <dgm:txFillClrLst meth="repeat">
+      <a:schemeClr val="dk1"/>
+    </dgm:txFillClrLst>
+    <dgm:txEffectClrLst/>
+  </dgm:styleLbl>
+  <dgm:styleLbl name="fgAccFollowNode1">
+    <dgm:fillClrLst meth="repeat">
+      <a:schemeClr val="accent1">
+        <a:alpha val="90000"/>
+        <a:tint val="40000"/>
+      </a:schemeClr>
+    </dgm:fillClrLst>
+    <dgm:linClrLst meth="repeat">
+      <a:schemeClr val="accent1">
+        <a:alpha val="90000"/>
+        <a:tint val="40000"/>
+      </a:schemeClr>
+    </dgm:linClrLst>
+    <dgm:effectClrLst/>
+    <dgm:txLinClrLst/>
+    <dgm:txFillClrLst meth="repeat">
+      <a:schemeClr val="dk1"/>
+    </dgm:txFillClrLst>
+    <dgm:txEffectClrLst/>
+  </dgm:styleLbl>
+  <dgm:styleLbl name="alignAccFollowNode1">
+    <dgm:fillClrLst meth="repeat">
+      <a:schemeClr val="accent1">
+        <a:alpha val="90000"/>
+        <a:tint val="40000"/>
+      </a:schemeClr>
+    </dgm:fillClrLst>
+    <dgm:linClrLst meth="repeat">
+      <a:schemeClr val="accent1">
+        <a:alpha val="90000"/>
+        <a:tint val="40000"/>
+      </a:schemeClr>
+    </dgm:linClrLst>
+    <dgm:effectClrLst/>
+    <dgm:txLinClrLst/>
+    <dgm:txFillClrLst meth="repeat">
+      <a:schemeClr val="dk1"/>
+    </dgm:txFillClrLst>
+    <dgm:txEffectClrLst/>
+  </dgm:styleLbl>
+  <dgm:styleLbl name="bgAccFollowNode1">
+    <dgm:fillClrLst meth="repeat">
+      <a:schemeClr val="accent1">
+        <a:alpha val="90000"/>
+        <a:tint val="40000"/>
+      </a:schemeClr>
+    </dgm:fillClrLst>
+    <dgm:linClrLst meth="repeat">
+      <a:schemeClr val="accent1">
+        <a:alpha val="90000"/>
+        <a:tint val="40000"/>
+      </a:schemeClr>
+    </dgm:linClrLst>
+    <dgm:effectClrLst/>
+    <dgm:txLinClrLst/>
+    <dgm:txFillClrLst meth="repeat">
+      <a:schemeClr val="dk1"/>
+    </dgm:txFillClrLst>
+    <dgm:txEffectClrLst/>
+  </dgm:styleLbl>
+  <dgm:styleLbl name="fgAcc0">
+    <dgm:fillClrLst meth="repeat">
+      <a:schemeClr val="lt1">
+        <a:alpha val="90000"/>
+      </a:schemeClr>
+    </dgm:fillClrLst>
+    <dgm:linClrLst meth="repeat">
+      <a:schemeClr val="accent1"/>
+    </dgm:linClrLst>
+    <dgm:effectClrLst/>
+    <dgm:txLinClrLst/>
+    <dgm:txFillClrLst meth="repeat">
+      <a:schemeClr val="dk1"/>
+    </dgm:txFillClrLst>
+    <dgm:txEffectClrLst/>
+  </dgm:styleLbl>
+  <dgm:styleLbl name="fgAcc2">
+    <dgm:fillClrLst meth="repeat">
+      <a:schemeClr val="lt1">
+        <a:alpha val="90000"/>
+      </a:schemeClr>
+    </dgm:fillClrLst>
+    <dgm:linClrLst meth="repeat">
+      <a:schemeClr val="accent1"/>
+    </dgm:linClrLst>
+    <dgm:effectClrLst/>
+    <dgm:txLinClrLst/>
+    <dgm:txFillClrLst meth="repeat">
+      <a:schemeClr val="dk1"/>
+    </dgm:txFillClrLst>
+    <dgm:txEffectClrLst/>
+  </dgm:styleLbl>
+  <dgm:styleLbl name="fgAcc3">
+    <dgm:fillClrLst meth="repeat">
+      <a:schemeClr val="lt1">
+        <a:alpha val="90000"/>
+      </a:schemeClr>
+    </dgm:fillClrLst>
+    <dgm:linClrLst meth="repeat">
+      <a:schemeClr val="accent1"/>
+    </dgm:linClrLst>
+    <dgm:effectClrLst/>
+    <dgm:txLinClrLst/>
+    <dgm:txFillClrLst meth="repeat">
+      <a:schemeClr val="dk1"/>
+    </dgm:txFillClrLst>
+    <dgm:txEffectClrLst/>
+  </dgm:styleLbl>
+  <dgm:styleLbl name="fgAcc4">
+    <dgm:fillClrLst meth="repeat">
+      <a:schemeClr val="lt1">
+        <a:alpha val="90000"/>
+      </a:schemeClr>
+    </dgm:fillClrLst>
+    <dgm:linClrLst meth="repeat">
+      <a:schemeClr val="accent1"/>
+    </dgm:linClrLst>
+    <dgm:effectClrLst/>
+    <dgm:txLinClrLst/>
+    <dgm:txFillClrLst meth="repeat">
+      <a:schemeClr val="dk1"/>
+    </dgm:txFillClrLst>
+    <dgm:txEffectClrLst/>
+  </dgm:styleLbl>
+  <dgm:styleLbl name="bgShp">
+    <dgm:fillClrLst meth="repeat">
+      <a:schemeClr val="accent1">
+        <a:tint val="40000"/>
+      </a:schemeClr>
+    </dgm:fillClrLst>
+    <dgm:linClrLst meth="repeat">
+      <a:schemeClr val="accent1"/>
+    </dgm:linClrLst>
+    <dgm:effectClrLst/>
+    <dgm:txLinClrLst/>
+    <dgm:txFillClrLst meth="repeat">
+      <a:schemeClr val="dk1"/>
+    </dgm:txFillClrLst>
+    <dgm:txEffectClrLst/>
+  </dgm:styleLbl>
+  <dgm:styleLbl name="dkBgShp">
+    <dgm:fillClrLst meth="repeat">
+      <a:schemeClr val="accent1">
+        <a:shade val="80000"/>
+      </a:schemeClr>
+    </dgm:fillClrLst>
+    <dgm:linClrLst meth="repeat">
+      <a:schemeClr val="accent1"/>
+    </dgm:linClrLst>
+    <dgm:effectClrLst/>
+    <dgm:txLinClrLst/>
+    <dgm:txFillClrLst meth="repeat">
+      <a:schemeClr val="lt1"/>
+    </dgm:txFillClrLst>
+    <dgm:txEffectClrLst/>
+  </dgm:styleLbl>
+  <dgm:styleLbl name="trBgShp">
+    <dgm:fillClrLst meth="repeat">
+      <a:schemeClr val="accent1">
+        <a:tint val="50000"/>
+        <a:alpha val="40000"/>
+      </a:schemeClr>
+    </dgm:fillClrLst>
+    <dgm:linClrLst meth="repeat">
+      <a:schemeClr val="accent1"/>
+    </dgm:linClrLst>
+    <dgm:effectClrLst/>
+    <dgm:txLinClrLst/>
+    <dgm:txFillClrLst meth="repeat">
+      <a:schemeClr val="lt1"/>
+    </dgm:txFillClrLst>
+    <dgm:txEffectClrLst/>
+  </dgm:styleLbl>
+  <dgm:styleLbl name="fgShp">
+    <dgm:fillClrLst meth="repeat">
+      <a:schemeClr val="accent1">
+        <a:tint val="60000"/>
+      </a:schemeClr>
+    </dgm:fillClrLst>
+    <dgm:linClrLst meth="repeat">
+      <a:schemeClr val="lt1"/>
+    </dgm:linClrLst>
+    <dgm:effectClrLst/>
+    <dgm:txLinClrLst/>
+    <dgm:txFillClrLst meth="repeat">
+      <a:schemeClr val="dk1"/>
+    </dgm:txFillClrLst>
+    <dgm:txEffectClrLst/>
+  </dgm:styleLbl>
+  <dgm:styleLbl name="revTx">
+    <dgm:fillClrLst meth="repeat">
+      <a:schemeClr val="lt1">
+        <a:alpha val="0"/>
+      </a:schemeClr>
+    </dgm:fillClrLst>
+    <dgm:linClrLst meth="repeat">
+      <a:schemeClr val="dk1">
+        <a:alpha val="0"/>
+      </a:schemeClr>
+    </dgm:linClrLst>
+    <dgm:effectClrLst/>
+    <dgm:txLinClrLst/>
+    <dgm:txFillClrLst meth="repeat">
+      <a:schemeClr val="tx1"/>
+    </dgm:txFillClrLst>
+    <dgm:txEffectClrLst/>
+  </dgm:styleLbl>
+</dgm:colorsDef>
+</file>
+
+<file path=ppt/diagrams/data1.xml><?xml version="1.0" encoding="utf-8"?>
+<dgm:dataModel xmlns:dgm="http://schemas.openxmlformats.org/drawingml/2006/diagram" xmlns:a="http://schemas.openxmlformats.org/drawingml/2006/main">
+  <dgm:ptLst>
+    <dgm:pt modelId="{3AA79373-6E81-4534-9BC4-0E4BD9EB7B41}" type="doc">
+      <dgm:prSet loTypeId="urn:microsoft.com/office/officeart/2005/8/layout/default" loCatId="list" qsTypeId="urn:microsoft.com/office/officeart/2005/8/quickstyle/simple1" qsCatId="simple" csTypeId="urn:microsoft.com/office/officeart/2005/8/colors/accent1_2" csCatId="accent1" phldr="0"/>
+      <dgm:spPr/>
+      <dgm:t>
+        <a:bodyPr/>
+        <a:lstStyle/>
+        <a:p>
+          <a:endParaRPr lang="en-US"/>
+        </a:p>
+      </dgm:t>
+    </dgm:pt>
+    <dgm:pt modelId="{44749E3A-1B85-42FE-9C60-ECBED08D5C74}">
+      <dgm:prSet phldrT="[Text]" phldr="1"/>
+      <dgm:spPr/>
+      <dgm:t>
+        <a:bodyPr/>
+        <a:lstStyle/>
+        <a:p>
+          <a:endParaRPr lang="en-US" dirty="0"/>
+        </a:p>
+      </dgm:t>
+    </dgm:pt>
+    <dgm:pt modelId="{7F6CB9B5-AB7E-44A4-A6E1-679533668C09}" type="parTrans" cxnId="{19EE11FE-45CE-4C7A-A3F2-2E3201B71C54}">
+      <dgm:prSet/>
+      <dgm:spPr/>
+      <dgm:t>
+        <a:bodyPr/>
+        <a:lstStyle/>
+        <a:p>
+          <a:endParaRPr lang="en-US"/>
+        </a:p>
+      </dgm:t>
+    </dgm:pt>
+    <dgm:pt modelId="{6F9F4AD6-503E-4390-8ED6-9FEAE80C646E}" type="sibTrans" cxnId="{19EE11FE-45CE-4C7A-A3F2-2E3201B71C54}">
+      <dgm:prSet/>
+      <dgm:spPr/>
+      <dgm:t>
+        <a:bodyPr/>
+        <a:lstStyle/>
+        <a:p>
+          <a:endParaRPr lang="en-US"/>
+        </a:p>
+      </dgm:t>
+    </dgm:pt>
+    <dgm:pt modelId="{A3991E47-AA0B-40C0-81AA-0CA452A12F91}">
+      <dgm:prSet phldrT="[Text]" phldr="1"/>
+      <dgm:spPr/>
+      <dgm:t>
+        <a:bodyPr/>
+        <a:lstStyle/>
+        <a:p>
+          <a:endParaRPr lang="en-US"/>
+        </a:p>
+      </dgm:t>
+    </dgm:pt>
+    <dgm:pt modelId="{E1E29432-4A1C-4F18-A80E-316C1E88DCF5}" type="parTrans" cxnId="{63D745BB-EB86-4DF2-ADDA-1D50E462FE4C}">
+      <dgm:prSet/>
+      <dgm:spPr/>
+      <dgm:t>
+        <a:bodyPr/>
+        <a:lstStyle/>
+        <a:p>
+          <a:endParaRPr lang="en-US"/>
+        </a:p>
+      </dgm:t>
+    </dgm:pt>
+    <dgm:pt modelId="{090F431D-8101-4BFE-A924-96A0FB6EE71C}" type="sibTrans" cxnId="{63D745BB-EB86-4DF2-ADDA-1D50E462FE4C}">
+      <dgm:prSet/>
+      <dgm:spPr/>
+      <dgm:t>
+        <a:bodyPr/>
+        <a:lstStyle/>
+        <a:p>
+          <a:endParaRPr lang="en-US"/>
+        </a:p>
+      </dgm:t>
+    </dgm:pt>
+    <dgm:pt modelId="{E9A8A44E-02A2-43B2-8C1E-97FDC4D69F94}">
+      <dgm:prSet phldrT="[Text]" phldr="1"/>
+      <dgm:spPr/>
+      <dgm:t>
+        <a:bodyPr/>
+        <a:lstStyle/>
+        <a:p>
+          <a:endParaRPr lang="en-US"/>
+        </a:p>
+      </dgm:t>
+    </dgm:pt>
+    <dgm:pt modelId="{231326C7-EA2E-4096-AE27-9025B8AD71A1}" type="parTrans" cxnId="{6F1D360B-EC3F-4D66-B6FF-00D2E8233DBF}">
+      <dgm:prSet/>
+      <dgm:spPr/>
+      <dgm:t>
+        <a:bodyPr/>
+        <a:lstStyle/>
+        <a:p>
+          <a:endParaRPr lang="en-US"/>
+        </a:p>
+      </dgm:t>
+    </dgm:pt>
+    <dgm:pt modelId="{C1404E0B-15B7-4FFC-9D5F-2D553D606503}" type="sibTrans" cxnId="{6F1D360B-EC3F-4D66-B6FF-00D2E8233DBF}">
+      <dgm:prSet/>
+      <dgm:spPr/>
+      <dgm:t>
+        <a:bodyPr/>
+        <a:lstStyle/>
+        <a:p>
+          <a:endParaRPr lang="en-US"/>
+        </a:p>
+      </dgm:t>
+    </dgm:pt>
+    <dgm:pt modelId="{02ADB1D9-3693-483D-BF17-950EF0C68011}">
+      <dgm:prSet phldrT="[Text]" phldr="1"/>
+      <dgm:spPr/>
+      <dgm:t>
+        <a:bodyPr/>
+        <a:lstStyle/>
+        <a:p>
+          <a:endParaRPr lang="en-US"/>
+        </a:p>
+      </dgm:t>
+    </dgm:pt>
+    <dgm:pt modelId="{F0D941E6-329D-4878-992C-EB0A87AC5C27}" type="parTrans" cxnId="{4E80B540-67F5-4191-A41D-57615EA160EA}">
+      <dgm:prSet/>
+      <dgm:spPr/>
+      <dgm:t>
+        <a:bodyPr/>
+        <a:lstStyle/>
+        <a:p>
+          <a:endParaRPr lang="en-US"/>
+        </a:p>
+      </dgm:t>
+    </dgm:pt>
+    <dgm:pt modelId="{24E83D83-3A1D-4B11-9B38-F3DE33223896}" type="sibTrans" cxnId="{4E80B540-67F5-4191-A41D-57615EA160EA}">
+      <dgm:prSet/>
+      <dgm:spPr/>
+      <dgm:t>
+        <a:bodyPr/>
+        <a:lstStyle/>
+        <a:p>
+          <a:endParaRPr lang="en-US"/>
+        </a:p>
+      </dgm:t>
+    </dgm:pt>
+    <dgm:pt modelId="{A70BE9CF-7FC3-4728-ABAC-D2F211416E26}">
+      <dgm:prSet phldrT="[Text]" phldr="1"/>
+      <dgm:spPr/>
+      <dgm:t>
+        <a:bodyPr/>
+        <a:lstStyle/>
+        <a:p>
+          <a:endParaRPr lang="en-US"/>
+        </a:p>
+      </dgm:t>
+    </dgm:pt>
+    <dgm:pt modelId="{0FBBDD03-F302-417F-8175-9E7A4DC9802A}" type="parTrans" cxnId="{473C0760-D55B-44F7-9FBA-4588D6E1AA01}">
+      <dgm:prSet/>
+      <dgm:spPr/>
+      <dgm:t>
+        <a:bodyPr/>
+        <a:lstStyle/>
+        <a:p>
+          <a:endParaRPr lang="en-US"/>
+        </a:p>
+      </dgm:t>
+    </dgm:pt>
+    <dgm:pt modelId="{FF96BA45-0123-408C-9E2C-B2487A5BC4CC}" type="sibTrans" cxnId="{473C0760-D55B-44F7-9FBA-4588D6E1AA01}">
+      <dgm:prSet/>
+      <dgm:spPr/>
+      <dgm:t>
+        <a:bodyPr/>
+        <a:lstStyle/>
+        <a:p>
+          <a:endParaRPr lang="en-US"/>
+        </a:p>
+      </dgm:t>
+    </dgm:pt>
+    <dgm:pt modelId="{C6F34645-2819-48C4-A6B3-24D8EBC6BAD5}" type="pres">
+      <dgm:prSet presAssocID="{3AA79373-6E81-4534-9BC4-0E4BD9EB7B41}" presName="diagram" presStyleCnt="0">
+        <dgm:presLayoutVars>
+          <dgm:dir/>
+          <dgm:resizeHandles val="exact"/>
+        </dgm:presLayoutVars>
+      </dgm:prSet>
+      <dgm:spPr/>
+    </dgm:pt>
+    <dgm:pt modelId="{9D9F7CF5-A1B5-4F94-987E-87F281797020}" type="pres">
+      <dgm:prSet presAssocID="{44749E3A-1B85-42FE-9C60-ECBED08D5C74}" presName="node" presStyleLbl="node1" presStyleIdx="0" presStyleCnt="5">
+        <dgm:presLayoutVars>
+          <dgm:bulletEnabled val="1"/>
+        </dgm:presLayoutVars>
+      </dgm:prSet>
+      <dgm:spPr/>
+    </dgm:pt>
+    <dgm:pt modelId="{E8D2FCA9-092F-444B-8D54-E2EBE339FB34}" type="pres">
+      <dgm:prSet presAssocID="{6F9F4AD6-503E-4390-8ED6-9FEAE80C646E}" presName="sibTrans" presStyleCnt="0"/>
+      <dgm:spPr/>
+    </dgm:pt>
+    <dgm:pt modelId="{26B60EB4-F063-4E2D-A6F9-5FE480B4F1BE}" type="pres">
+      <dgm:prSet presAssocID="{A3991E47-AA0B-40C0-81AA-0CA452A12F91}" presName="node" presStyleLbl="node1" presStyleIdx="1" presStyleCnt="5">
+        <dgm:presLayoutVars>
+          <dgm:bulletEnabled val="1"/>
+        </dgm:presLayoutVars>
+      </dgm:prSet>
+      <dgm:spPr/>
+    </dgm:pt>
+    <dgm:pt modelId="{B7B79A1E-EE10-486C-B075-AD5A6937D0E8}" type="pres">
+      <dgm:prSet presAssocID="{090F431D-8101-4BFE-A924-96A0FB6EE71C}" presName="sibTrans" presStyleCnt="0"/>
+      <dgm:spPr/>
+    </dgm:pt>
+    <dgm:pt modelId="{707DEC3E-79CD-49EB-B903-5BF34A00C39F}" type="pres">
+      <dgm:prSet presAssocID="{E9A8A44E-02A2-43B2-8C1E-97FDC4D69F94}" presName="node" presStyleLbl="node1" presStyleIdx="2" presStyleCnt="5">
+        <dgm:presLayoutVars>
+          <dgm:bulletEnabled val="1"/>
+        </dgm:presLayoutVars>
+      </dgm:prSet>
+      <dgm:spPr/>
+    </dgm:pt>
+    <dgm:pt modelId="{03708E88-6073-4D88-82DF-3A560736A6B9}" type="pres">
+      <dgm:prSet presAssocID="{C1404E0B-15B7-4FFC-9D5F-2D553D606503}" presName="sibTrans" presStyleCnt="0"/>
+      <dgm:spPr/>
+    </dgm:pt>
+    <dgm:pt modelId="{80CD610F-504E-44E3-83A7-F9AAF223380B}" type="pres">
+      <dgm:prSet presAssocID="{02ADB1D9-3693-483D-BF17-950EF0C68011}" presName="node" presStyleLbl="node1" presStyleIdx="3" presStyleCnt="5">
+        <dgm:presLayoutVars>
+          <dgm:bulletEnabled val="1"/>
+        </dgm:presLayoutVars>
+      </dgm:prSet>
+      <dgm:spPr/>
+    </dgm:pt>
+    <dgm:pt modelId="{5125E142-6412-460D-965F-BBEF95224A05}" type="pres">
+      <dgm:prSet presAssocID="{24E83D83-3A1D-4B11-9B38-F3DE33223896}" presName="sibTrans" presStyleCnt="0"/>
+      <dgm:spPr/>
+    </dgm:pt>
+    <dgm:pt modelId="{1CF4EFB8-1069-40BB-81F9-2BB7E1EA8098}" type="pres">
+      <dgm:prSet presAssocID="{A70BE9CF-7FC3-4728-ABAC-D2F211416E26}" presName="node" presStyleLbl="node1" presStyleIdx="4" presStyleCnt="5">
+        <dgm:presLayoutVars>
+          <dgm:bulletEnabled val="1"/>
+        </dgm:presLayoutVars>
+      </dgm:prSet>
+      <dgm:spPr/>
+    </dgm:pt>
+  </dgm:ptLst>
+  <dgm:cxnLst>
+    <dgm:cxn modelId="{6F1D360B-EC3F-4D66-B6FF-00D2E8233DBF}" srcId="{3AA79373-6E81-4534-9BC4-0E4BD9EB7B41}" destId="{E9A8A44E-02A2-43B2-8C1E-97FDC4D69F94}" srcOrd="2" destOrd="0" parTransId="{231326C7-EA2E-4096-AE27-9025B8AD71A1}" sibTransId="{C1404E0B-15B7-4FFC-9D5F-2D553D606503}"/>
+    <dgm:cxn modelId="{04372138-48FB-4918-866B-C5DFC54A0A7B}" type="presOf" srcId="{A3991E47-AA0B-40C0-81AA-0CA452A12F91}" destId="{26B60EB4-F063-4E2D-A6F9-5FE480B4F1BE}" srcOrd="0" destOrd="0" presId="urn:microsoft.com/office/officeart/2005/8/layout/default"/>
+    <dgm:cxn modelId="{3AA4823A-1501-48F0-AE91-2C7338307B93}" type="presOf" srcId="{02ADB1D9-3693-483D-BF17-950EF0C68011}" destId="{80CD610F-504E-44E3-83A7-F9AAF223380B}" srcOrd="0" destOrd="0" presId="urn:microsoft.com/office/officeart/2005/8/layout/default"/>
+    <dgm:cxn modelId="{4E80B540-67F5-4191-A41D-57615EA160EA}" srcId="{3AA79373-6E81-4534-9BC4-0E4BD9EB7B41}" destId="{02ADB1D9-3693-483D-BF17-950EF0C68011}" srcOrd="3" destOrd="0" parTransId="{F0D941E6-329D-4878-992C-EB0A87AC5C27}" sibTransId="{24E83D83-3A1D-4B11-9B38-F3DE33223896}"/>
+    <dgm:cxn modelId="{473C0760-D55B-44F7-9FBA-4588D6E1AA01}" srcId="{3AA79373-6E81-4534-9BC4-0E4BD9EB7B41}" destId="{A70BE9CF-7FC3-4728-ABAC-D2F211416E26}" srcOrd="4" destOrd="0" parTransId="{0FBBDD03-F302-417F-8175-9E7A4DC9802A}" sibTransId="{FF96BA45-0123-408C-9E2C-B2487A5BC4CC}"/>
+    <dgm:cxn modelId="{D51AC351-D023-41D6-A65D-799624DD04BD}" type="presOf" srcId="{E9A8A44E-02A2-43B2-8C1E-97FDC4D69F94}" destId="{707DEC3E-79CD-49EB-B903-5BF34A00C39F}" srcOrd="0" destOrd="0" presId="urn:microsoft.com/office/officeart/2005/8/layout/default"/>
+    <dgm:cxn modelId="{63D745BB-EB86-4DF2-ADDA-1D50E462FE4C}" srcId="{3AA79373-6E81-4534-9BC4-0E4BD9EB7B41}" destId="{A3991E47-AA0B-40C0-81AA-0CA452A12F91}" srcOrd="1" destOrd="0" parTransId="{E1E29432-4A1C-4F18-A80E-316C1E88DCF5}" sibTransId="{090F431D-8101-4BFE-A924-96A0FB6EE71C}"/>
+    <dgm:cxn modelId="{EA8486CE-E0C4-4773-8BDB-745709F64305}" type="presOf" srcId="{A70BE9CF-7FC3-4728-ABAC-D2F211416E26}" destId="{1CF4EFB8-1069-40BB-81F9-2BB7E1EA8098}" srcOrd="0" destOrd="0" presId="urn:microsoft.com/office/officeart/2005/8/layout/default"/>
+    <dgm:cxn modelId="{B96B23E9-862C-459D-A040-0F502A2136F1}" type="presOf" srcId="{3AA79373-6E81-4534-9BC4-0E4BD9EB7B41}" destId="{C6F34645-2819-48C4-A6B3-24D8EBC6BAD5}" srcOrd="0" destOrd="0" presId="urn:microsoft.com/office/officeart/2005/8/layout/default"/>
+    <dgm:cxn modelId="{0EFAFAF0-92B1-4798-98C3-2836F856B16E}" type="presOf" srcId="{44749E3A-1B85-42FE-9C60-ECBED08D5C74}" destId="{9D9F7CF5-A1B5-4F94-987E-87F281797020}" srcOrd="0" destOrd="0" presId="urn:microsoft.com/office/officeart/2005/8/layout/default"/>
+    <dgm:cxn modelId="{19EE11FE-45CE-4C7A-A3F2-2E3201B71C54}" srcId="{3AA79373-6E81-4534-9BC4-0E4BD9EB7B41}" destId="{44749E3A-1B85-42FE-9C60-ECBED08D5C74}" srcOrd="0" destOrd="0" parTransId="{7F6CB9B5-AB7E-44A4-A6E1-679533668C09}" sibTransId="{6F9F4AD6-503E-4390-8ED6-9FEAE80C646E}"/>
+    <dgm:cxn modelId="{7BD74E11-BCE3-4BDA-AC76-FAC52FA4047A}" type="presParOf" srcId="{C6F34645-2819-48C4-A6B3-24D8EBC6BAD5}" destId="{9D9F7CF5-A1B5-4F94-987E-87F281797020}" srcOrd="0" destOrd="0" presId="urn:microsoft.com/office/officeart/2005/8/layout/default"/>
+    <dgm:cxn modelId="{5DB17709-0042-4956-A617-652E09789092}" type="presParOf" srcId="{C6F34645-2819-48C4-A6B3-24D8EBC6BAD5}" destId="{E8D2FCA9-092F-444B-8D54-E2EBE339FB34}" srcOrd="1" destOrd="0" presId="urn:microsoft.com/office/officeart/2005/8/layout/default"/>
+    <dgm:cxn modelId="{D9DDBFFC-D78A-44B1-BF8C-5EC4B9B5A55A}" type="presParOf" srcId="{C6F34645-2819-48C4-A6B3-24D8EBC6BAD5}" destId="{26B60EB4-F063-4E2D-A6F9-5FE480B4F1BE}" srcOrd="2" destOrd="0" presId="urn:microsoft.com/office/officeart/2005/8/layout/default"/>
+    <dgm:cxn modelId="{9A9A295B-80CA-4216-A62C-F63D0B57B0CE}" type="presParOf" srcId="{C6F34645-2819-48C4-A6B3-24D8EBC6BAD5}" destId="{B7B79A1E-EE10-486C-B075-AD5A6937D0E8}" srcOrd="3" destOrd="0" presId="urn:microsoft.com/office/officeart/2005/8/layout/default"/>
+    <dgm:cxn modelId="{F0CC50C6-3D23-40A1-AEE6-857B0530DECD}" type="presParOf" srcId="{C6F34645-2819-48C4-A6B3-24D8EBC6BAD5}" destId="{707DEC3E-79CD-49EB-B903-5BF34A00C39F}" srcOrd="4" destOrd="0" presId="urn:microsoft.com/office/officeart/2005/8/layout/default"/>
+    <dgm:cxn modelId="{B04965CA-C161-4D91-B766-9F305099BF5E}" type="presParOf" srcId="{C6F34645-2819-48C4-A6B3-24D8EBC6BAD5}" destId="{03708E88-6073-4D88-82DF-3A560736A6B9}" srcOrd="5" destOrd="0" presId="urn:microsoft.com/office/officeart/2005/8/layout/default"/>
+    <dgm:cxn modelId="{2845BB35-201E-45A6-9EF5-CADA3FCBE707}" type="presParOf" srcId="{C6F34645-2819-48C4-A6B3-24D8EBC6BAD5}" destId="{80CD610F-504E-44E3-83A7-F9AAF223380B}" srcOrd="6" destOrd="0" presId="urn:microsoft.com/office/officeart/2005/8/layout/default"/>
+    <dgm:cxn modelId="{401E54F3-B959-4256-BA8E-9CCB46678591}" type="presParOf" srcId="{C6F34645-2819-48C4-A6B3-24D8EBC6BAD5}" destId="{5125E142-6412-460D-965F-BBEF95224A05}" srcOrd="7" destOrd="0" presId="urn:microsoft.com/office/officeart/2005/8/layout/default"/>
+    <dgm:cxn modelId="{68B8DC12-80C6-465F-BA14-937C4D1291FC}" type="presParOf" srcId="{C6F34645-2819-48C4-A6B3-24D8EBC6BAD5}" destId="{1CF4EFB8-1069-40BB-81F9-2BB7E1EA8098}" srcOrd="8" destOrd="0" presId="urn:microsoft.com/office/officeart/2005/8/layout/default"/>
+  </dgm:cxnLst>
+  <dgm:bg/>
+  <dgm:whole/>
+  <dgm:extLst>
+    <a:ext uri="http://schemas.microsoft.com/office/drawing/2008/diagram">
+      <dsp:dataModelExt xmlns:dsp="http://schemas.microsoft.com/office/drawing/2008/diagram" relId="rId7" minVer="http://schemas.openxmlformats.org/drawingml/2006/diagram"/>
+    </a:ext>
+  </dgm:extLst>
+</dgm:dataModel>
+</file>
+
+<file path=ppt/diagrams/drawing1.xml><?xml version="1.0" encoding="utf-8"?>
+<dsp:drawing xmlns:dgm="http://schemas.openxmlformats.org/drawingml/2006/diagram" xmlns:dsp="http://schemas.microsoft.com/office/drawing/2008/diagram" xmlns:a="http://schemas.openxmlformats.org/drawingml/2006/main">
+  <dsp:spTree>
+    <dsp:nvGrpSpPr>
+      <dsp:cNvPr id="0" name=""/>
+      <dsp:cNvGrpSpPr/>
+    </dsp:nvGrpSpPr>
+    <dsp:grpSpPr/>
+    <dsp:sp modelId="{9D9F7CF5-A1B5-4F94-987E-87F281797020}">
+      <dsp:nvSpPr>
+        <dsp:cNvPr id="0" name=""/>
+        <dsp:cNvSpPr/>
+      </dsp:nvSpPr>
+      <dsp:spPr>
+        <a:xfrm>
+          <a:off x="916483" y="1984"/>
+          <a:ext cx="2030015" cy="1218009"/>
+        </a:xfrm>
+        <a:prstGeom prst="rect">
+          <a:avLst/>
+        </a:prstGeom>
+        <a:solidFill>
+          <a:schemeClr val="accent1">
+            <a:hueOff val="0"/>
+            <a:satOff val="0"/>
+            <a:lumOff val="0"/>
+            <a:alphaOff val="0"/>
+          </a:schemeClr>
+        </a:solidFill>
+        <a:ln w="25400" cap="flat" cmpd="sng" algn="ctr">
+          <a:solidFill>
+            <a:schemeClr val="lt1">
+              <a:hueOff val="0"/>
+              <a:satOff val="0"/>
+              <a:lumOff val="0"/>
+              <a:alphaOff val="0"/>
+            </a:schemeClr>
+          </a:solidFill>
+          <a:prstDash val="solid"/>
+        </a:ln>
+        <a:effectLst/>
+      </dsp:spPr>
+      <dsp:style>
+        <a:lnRef idx="2">
+          <a:scrgbClr r="0" g="0" b="0"/>
+        </a:lnRef>
+        <a:fillRef idx="1">
+          <a:scrgbClr r="0" g="0" b="0"/>
+        </a:fillRef>
+        <a:effectRef idx="0">
+          <a:scrgbClr r="0" g="0" b="0"/>
+        </a:effectRef>
+        <a:fontRef idx="minor">
+          <a:schemeClr val="lt1"/>
+        </a:fontRef>
+      </dsp:style>
+      <dsp:txBody>
+        <a:bodyPr spcFirstLastPara="0" vert="horz" wrap="square" lIns="209550" tIns="209550" rIns="209550" bIns="209550" numCol="1" spcCol="1270" anchor="ctr" anchorCtr="0">
+          <a:noAutofit/>
+        </a:bodyPr>
+        <a:lstStyle/>
+        <a:p>
+          <a:pPr marL="0" lvl="0" indent="0" algn="ctr" defTabSz="2444750">
+            <a:lnSpc>
+              <a:spcPct val="90000"/>
+            </a:lnSpc>
+            <a:spcBef>
+              <a:spcPct val="0"/>
+            </a:spcBef>
+            <a:spcAft>
+              <a:spcPct val="35000"/>
+            </a:spcAft>
+            <a:buNone/>
+          </a:pPr>
+          <a:endParaRPr lang="en-US" sz="5500" kern="1200"/>
+        </a:p>
+      </dsp:txBody>
+      <dsp:txXfrm>
+        <a:off x="916483" y="1984"/>
+        <a:ext cx="2030015" cy="1218009"/>
+      </dsp:txXfrm>
+    </dsp:sp>
+    <dsp:sp modelId="{26B60EB4-F063-4E2D-A6F9-5FE480B4F1BE}">
+      <dsp:nvSpPr>
+        <dsp:cNvPr id="0" name=""/>
+        <dsp:cNvSpPr/>
+      </dsp:nvSpPr>
+      <dsp:spPr>
+        <a:xfrm>
+          <a:off x="3149500" y="1984"/>
+          <a:ext cx="2030015" cy="1218009"/>
+        </a:xfrm>
+        <a:prstGeom prst="rect">
+          <a:avLst/>
+        </a:prstGeom>
+        <a:solidFill>
+          <a:schemeClr val="accent1">
+            <a:hueOff val="0"/>
+            <a:satOff val="0"/>
+            <a:lumOff val="0"/>
+            <a:alphaOff val="0"/>
+          </a:schemeClr>
+        </a:solidFill>
+        <a:ln w="25400" cap="flat" cmpd="sng" algn="ctr">
+          <a:solidFill>
+            <a:schemeClr val="lt1">
+              <a:hueOff val="0"/>
+              <a:satOff val="0"/>
+              <a:lumOff val="0"/>
+              <a:alphaOff val="0"/>
+            </a:schemeClr>
+          </a:solidFill>
+          <a:prstDash val="solid"/>
+        </a:ln>
+        <a:effectLst/>
+      </dsp:spPr>
+      <dsp:style>
+        <a:lnRef idx="2">
+          <a:scrgbClr r="0" g="0" b="0"/>
+        </a:lnRef>
+        <a:fillRef idx="1">
+          <a:scrgbClr r="0" g="0" b="0"/>
+        </a:fillRef>
+        <a:effectRef idx="0">
+          <a:scrgbClr r="0" g="0" b="0"/>
+        </a:effectRef>
+        <a:fontRef idx="minor">
+          <a:schemeClr val="lt1"/>
+        </a:fontRef>
+      </dsp:style>
+      <dsp:txBody>
+        <a:bodyPr spcFirstLastPara="0" vert="horz" wrap="square" lIns="209550" tIns="209550" rIns="209550" bIns="209550" numCol="1" spcCol="1270" anchor="ctr" anchorCtr="0">
+          <a:noAutofit/>
+        </a:bodyPr>
+        <a:lstStyle/>
+        <a:p>
+          <a:pPr marL="0" lvl="0" indent="0" algn="ctr" defTabSz="2444750">
+            <a:lnSpc>
+              <a:spcPct val="90000"/>
+            </a:lnSpc>
+            <a:spcBef>
+              <a:spcPct val="0"/>
+            </a:spcBef>
+            <a:spcAft>
+              <a:spcPct val="35000"/>
+            </a:spcAft>
+            <a:buNone/>
+          </a:pPr>
+          <a:endParaRPr lang="en-US" sz="5500" kern="1200"/>
+        </a:p>
+      </dsp:txBody>
+      <dsp:txXfrm>
+        <a:off x="3149500" y="1984"/>
+        <a:ext cx="2030015" cy="1218009"/>
+      </dsp:txXfrm>
+    </dsp:sp>
+    <dsp:sp modelId="{707DEC3E-79CD-49EB-B903-5BF34A00C39F}">
+      <dsp:nvSpPr>
+        <dsp:cNvPr id="0" name=""/>
+        <dsp:cNvSpPr/>
+      </dsp:nvSpPr>
+      <dsp:spPr>
+        <a:xfrm>
+          <a:off x="916483" y="1422995"/>
+          <a:ext cx="2030015" cy="1218009"/>
+        </a:xfrm>
+        <a:prstGeom prst="rect">
+          <a:avLst/>
+        </a:prstGeom>
+        <a:solidFill>
+          <a:schemeClr val="accent1">
+            <a:hueOff val="0"/>
+            <a:satOff val="0"/>
+            <a:lumOff val="0"/>
+            <a:alphaOff val="0"/>
+          </a:schemeClr>
+        </a:solidFill>
+        <a:ln w="25400" cap="flat" cmpd="sng" algn="ctr">
+          <a:solidFill>
+            <a:schemeClr val="lt1">
+              <a:hueOff val="0"/>
+              <a:satOff val="0"/>
+              <a:lumOff val="0"/>
+              <a:alphaOff val="0"/>
+            </a:schemeClr>
+          </a:solidFill>
+          <a:prstDash val="solid"/>
+        </a:ln>
+        <a:effectLst/>
+      </dsp:spPr>
+      <dsp:style>
+        <a:lnRef idx="2">
+          <a:scrgbClr r="0" g="0" b="0"/>
+        </a:lnRef>
+        <a:fillRef idx="1">
+          <a:scrgbClr r="0" g="0" b="0"/>
+        </a:fillRef>
+        <a:effectRef idx="0">
+          <a:scrgbClr r="0" g="0" b="0"/>
+        </a:effectRef>
+        <a:fontRef idx="minor">
+          <a:schemeClr val="lt1"/>
+        </a:fontRef>
+      </dsp:style>
+      <dsp:txBody>
+        <a:bodyPr spcFirstLastPara="0" vert="horz" wrap="square" lIns="209550" tIns="209550" rIns="209550" bIns="209550" numCol="1" spcCol="1270" anchor="ctr" anchorCtr="0">
+          <a:noAutofit/>
+        </a:bodyPr>
+        <a:lstStyle/>
+        <a:p>
+          <a:pPr marL="0" lvl="0" indent="0" algn="ctr" defTabSz="2444750">
+            <a:lnSpc>
+              <a:spcPct val="90000"/>
+            </a:lnSpc>
+            <a:spcBef>
+              <a:spcPct val="0"/>
+            </a:spcBef>
+            <a:spcAft>
+              <a:spcPct val="35000"/>
+            </a:spcAft>
+            <a:buNone/>
+          </a:pPr>
+          <a:endParaRPr lang="en-US" sz="5500" kern="1200"/>
+        </a:p>
+      </dsp:txBody>
+      <dsp:txXfrm>
+        <a:off x="916483" y="1422995"/>
+        <a:ext cx="2030015" cy="1218009"/>
+      </dsp:txXfrm>
+    </dsp:sp>
+    <dsp:sp modelId="{80CD610F-504E-44E3-83A7-F9AAF223380B}">
+      <dsp:nvSpPr>
+        <dsp:cNvPr id="0" name=""/>
+        <dsp:cNvSpPr/>
+      </dsp:nvSpPr>
+      <dsp:spPr>
+        <a:xfrm>
+          <a:off x="3149500" y="1422995"/>
+          <a:ext cx="2030015" cy="1218009"/>
+        </a:xfrm>
+        <a:prstGeom prst="rect">
+          <a:avLst/>
+        </a:prstGeom>
+        <a:solidFill>
+          <a:schemeClr val="accent1">
+            <a:hueOff val="0"/>
+            <a:satOff val="0"/>
+            <a:lumOff val="0"/>
+            <a:alphaOff val="0"/>
+          </a:schemeClr>
+        </a:solidFill>
+        <a:ln w="25400" cap="flat" cmpd="sng" algn="ctr">
+          <a:solidFill>
+            <a:schemeClr val="lt1">
+              <a:hueOff val="0"/>
+              <a:satOff val="0"/>
+              <a:lumOff val="0"/>
+              <a:alphaOff val="0"/>
+            </a:schemeClr>
+          </a:solidFill>
+          <a:prstDash val="solid"/>
+        </a:ln>
+        <a:effectLst/>
+      </dsp:spPr>
+      <dsp:style>
+        <a:lnRef idx="2">
+          <a:scrgbClr r="0" g="0" b="0"/>
+        </a:lnRef>
+        <a:fillRef idx="1">
+          <a:scrgbClr r="0" g="0" b="0"/>
+        </a:fillRef>
+        <a:effectRef idx="0">
+          <a:scrgbClr r="0" g="0" b="0"/>
+        </a:effectRef>
+        <a:fontRef idx="minor">
+          <a:schemeClr val="lt1"/>
+        </a:fontRef>
+      </dsp:style>
+      <dsp:txBody>
+        <a:bodyPr spcFirstLastPara="0" vert="horz" wrap="square" lIns="209550" tIns="209550" rIns="209550" bIns="209550" numCol="1" spcCol="1270" anchor="ctr" anchorCtr="0">
+          <a:noAutofit/>
+        </a:bodyPr>
+        <a:lstStyle/>
+        <a:p>
+          <a:pPr marL="0" lvl="0" indent="0" algn="ctr" defTabSz="2444750">
+            <a:lnSpc>
+              <a:spcPct val="90000"/>
+            </a:lnSpc>
+            <a:spcBef>
+              <a:spcPct val="0"/>
+            </a:spcBef>
+            <a:spcAft>
+              <a:spcPct val="35000"/>
+            </a:spcAft>
+            <a:buNone/>
+          </a:pPr>
+          <a:endParaRPr lang="en-US" sz="5500" kern="1200"/>
+        </a:p>
+      </dsp:txBody>
+      <dsp:txXfrm>
+        <a:off x="3149500" y="1422995"/>
+        <a:ext cx="2030015" cy="1218009"/>
+      </dsp:txXfrm>
+    </dsp:sp>
+    <dsp:sp modelId="{1CF4EFB8-1069-40BB-81F9-2BB7E1EA8098}">
+      <dsp:nvSpPr>
+        <dsp:cNvPr id="0" name=""/>
+        <dsp:cNvSpPr/>
+      </dsp:nvSpPr>
+      <dsp:spPr>
+        <a:xfrm>
+          <a:off x="2032992" y="2844006"/>
+          <a:ext cx="2030015" cy="1218009"/>
+        </a:xfrm>
+        <a:prstGeom prst="rect">
+          <a:avLst/>
+        </a:prstGeom>
+        <a:solidFill>
+          <a:schemeClr val="accent1">
+            <a:hueOff val="0"/>
+            <a:satOff val="0"/>
+            <a:lumOff val="0"/>
+            <a:alphaOff val="0"/>
+          </a:schemeClr>
+        </a:solidFill>
+        <a:ln w="25400" cap="flat" cmpd="sng" algn="ctr">
+          <a:solidFill>
+            <a:schemeClr val="lt1">
+              <a:hueOff val="0"/>
+              <a:satOff val="0"/>
+              <a:lumOff val="0"/>
+              <a:alphaOff val="0"/>
+            </a:schemeClr>
+          </a:solidFill>
+          <a:prstDash val="solid"/>
+        </a:ln>
+        <a:effectLst/>
+      </dsp:spPr>
+      <dsp:style>
+        <a:lnRef idx="2">
+          <a:scrgbClr r="0" g="0" b="0"/>
+        </a:lnRef>
+        <a:fillRef idx="1">
+          <a:scrgbClr r="0" g="0" b="0"/>
+        </a:fillRef>
+        <a:effectRef idx="0">
+          <a:scrgbClr r="0" g="0" b="0"/>
+        </a:effectRef>
+        <a:fontRef idx="minor">
+          <a:schemeClr val="lt1"/>
+        </a:fontRef>
+      </dsp:style>
+      <dsp:txBody>
+        <a:bodyPr spcFirstLastPara="0" vert="horz" wrap="square" lIns="209550" tIns="209550" rIns="209550" bIns="209550" numCol="1" spcCol="1270" anchor="ctr" anchorCtr="0">
+          <a:noAutofit/>
+        </a:bodyPr>
+        <a:lstStyle/>
+        <a:p>
+          <a:pPr marL="0" lvl="0" indent="0" algn="ctr" defTabSz="2444750">
+            <a:lnSpc>
+              <a:spcPct val="90000"/>
+            </a:lnSpc>
+            <a:spcBef>
+              <a:spcPct val="0"/>
+            </a:spcBef>
+            <a:spcAft>
+              <a:spcPct val="35000"/>
+            </a:spcAft>
+            <a:buNone/>
+          </a:pPr>
+          <a:endParaRPr lang="en-US" sz="5500" kern="1200"/>
+        </a:p>
+      </dsp:txBody>
+      <dsp:txXfrm>
+        <a:off x="2032992" y="2844006"/>
+        <a:ext cx="2030015" cy="1218009"/>
+      </dsp:txXfrm>
+    </dsp:sp>
+  </dsp:spTree>
+</dsp:drawing>
+</file>
+
+<file path=ppt/diagrams/layout1.xml><?xml version="1.0" encoding="utf-8"?>
+<dgm:layoutDef xmlns:dgm="http://schemas.openxmlformats.org/drawingml/2006/diagram" xmlns:a="http://schemas.openxmlformats.org/drawingml/2006/main" uniqueId="urn:microsoft.com/office/officeart/2005/8/layout/default">
+  <dgm:title val=""/>
+  <dgm:desc val=""/>
+  <dgm:catLst>
+    <dgm:cat type="list" pri="400"/>
+  </dgm:catLst>
+  <dgm:sampData>
+    <dgm:dataModel>
+      <dgm:ptLst>
+        <dgm:pt modelId="0" type="doc"/>
+        <dgm:pt modelId="1">
+          <dgm:prSet phldr="1"/>
+        </dgm:pt>
+        <dgm:pt modelId="2">
+          <dgm:prSet phldr="1"/>
+        </dgm:pt>
+        <dgm:pt modelId="3">
+          <dgm:prSet phldr="1"/>
+        </dgm:pt>
+        <dgm:pt modelId="4">
+          <dgm:prSet phldr="1"/>
+        </dgm:pt>
+        <dgm:pt modelId="5">
+          <dgm:prSet phldr="1"/>
+        </dgm:pt>
+      </dgm:ptLst>
+      <dgm:cxnLst>
+        <dgm:cxn modelId="6" srcId="0" destId="1" srcOrd="0" destOrd="0"/>
+        <dgm:cxn modelId="7" srcId="0" destId="2" srcOrd="1" destOrd="0"/>
+        <dgm:cxn modelId="8" srcId="0" destId="3" srcOrd="2" destOrd="0"/>
+        <dgm:cxn modelId="9" srcId="0" destId="4" srcOrd="3" destOrd="0"/>
+        <dgm:cxn modelId="10" srcId="0" destId="5" srcOrd="4" destOrd="0"/>
+      </dgm:cxnLst>
+      <dgm:bg/>
+      <dgm:whole/>
+    </dgm:dataModel>
+  </dgm:sampData>
+  <dgm:styleData>
+    <dgm:dataModel>
+      <dgm:ptLst>
+        <dgm:pt modelId="0" type="doc"/>
+        <dgm:pt modelId="1"/>
+        <dgm:pt modelId="2"/>
+      </dgm:ptLst>
+      <dgm:cxnLst>
+        <dgm:cxn modelId="3" srcId="0" destId="1" srcOrd="0" destOrd="0"/>
+        <dgm:cxn modelId="4" srcId="0" destId="2" srcOrd="1" destOrd="0"/>
+      </dgm:cxnLst>
+      <dgm:bg/>
+      <dgm:whole/>
+    </dgm:dataModel>
+  </dgm:styleData>
+  <dgm:clrData>
+    <dgm:dataModel>
+      <dgm:ptLst>
+        <dgm:pt modelId="0" type="doc"/>
+        <dgm:pt modelId="1"/>
+        <dgm:pt modelId="2"/>
+        <dgm:pt modelId="3"/>
+        <dgm:pt modelId="4"/>
+        <dgm:pt modelId="5"/>
+        <dgm:pt modelId="6"/>
+      </dgm:ptLst>
+      <dgm:cxnLst>
+        <dgm:cxn modelId="7" srcId="0" destId="1" srcOrd="0" destOrd="0"/>
+        <dgm:cxn modelId="8" srcId="0" destId="2" srcOrd="1" destOrd="0"/>
+        <dgm:cxn modelId="9" srcId="0" destId="3" srcOrd="2" destOrd="0"/>
+        <dgm:cxn modelId="10" srcId="0" destId="4" srcOrd="3" destOrd="0"/>
+        <dgm:cxn modelId="11" srcId="0" destId="5" srcOrd="4" destOrd="0"/>
+        <dgm:cxn modelId="12" srcId="0" destId="6" srcOrd="5" destOrd="0"/>
+      </dgm:cxnLst>
+      <dgm:bg/>
+      <dgm:whole/>
+    </dgm:dataModel>
+  </dgm:clrData>
+  <dgm:layoutNode name="diagram">
+    <dgm:varLst>
+      <dgm:dir/>
+      <dgm:resizeHandles val="exact"/>
+    </dgm:varLst>
+    <dgm:choose name="Name0">
+      <dgm:if name="Name1" func="var" arg="dir" op="equ" val="norm">
+        <dgm:alg type="snake">
+          <dgm:param type="grDir" val="tL"/>
+          <dgm:param type="flowDir" val="row"/>
+          <dgm:param type="contDir" val="sameDir"/>
+          <dgm:param type="off" val="ctr"/>
+        </dgm:alg>
+      </dgm:if>
+      <dgm:else name="Name2">
+        <dgm:alg type="snake">
+          <dgm:param type="grDir" val="tR"/>
+          <dgm:param type="flowDir" val="row"/>
+          <dgm:param type="contDir" val="sameDir"/>
+          <dgm:param type="off" val="ctr"/>
+        </dgm:alg>
+      </dgm:else>
+    </dgm:choose>
+    <dgm:shape xmlns:r="http://schemas.openxmlformats.org/officeDocument/2006/relationships" r:blip="">
+      <dgm:adjLst/>
+    </dgm:shape>
+    <dgm:presOf/>
+    <dgm:constrLst>
+      <dgm:constr type="w" for="ch" forName="node" refType="w"/>
+      <dgm:constr type="h" for="ch" forName="node" refType="w" refFor="ch" refForName="node" fact="0.6"/>
+      <dgm:constr type="w" for="ch" forName="sibTrans" refType="w" refFor="ch" refForName="node" fact="0.1"/>
+      <dgm:constr type="sp" refType="w" refFor="ch" refForName="sibTrans"/>
+      <dgm:constr type="primFontSz" for="ch" forName="node" op="equ" val="65"/>
+    </dgm:constrLst>
+    <dgm:ruleLst/>
+    <dgm:forEach name="Name3" axis="ch" ptType="node">
+      <dgm:layoutNode name="node">
+        <dgm:varLst>
+          <dgm:bulletEnabled val="1"/>
+        </dgm:varLst>
+        <dgm:alg type="tx"/>
+        <dgm:shape xmlns:r="http://schemas.openxmlformats.org/officeDocument/2006/relationships" type="rect" r:blip="">
+          <dgm:adjLst/>
+        </dgm:shape>
+        <dgm:presOf axis="desOrSelf" ptType="node"/>
+        <dgm:constrLst>
+          <dgm:constr type="lMarg" refType="primFontSz" fact="0.3"/>
+          <dgm:constr type="rMarg" refType="primFontSz" fact="0.3"/>
+          <dgm:constr type="tMarg" refType="primFontSz" fact="0.3"/>
+          <dgm:constr type="bMarg" refType="primFontSz" fact="0.3"/>
+        </dgm:constrLst>
+        <dgm:ruleLst>
+          <dgm:rule type="primFontSz" val="5" fact="NaN" max="NaN"/>
+        </dgm:ruleLst>
+      </dgm:layoutNode>
+      <dgm:forEach name="Name4" axis="followSib" ptType="sibTrans" cnt="1">
+        <dgm:layoutNode name="sibTrans">
+          <dgm:alg type="sp"/>
+          <dgm:shape xmlns:r="http://schemas.openxmlformats.org/officeDocument/2006/relationships" r:blip="">
+            <dgm:adjLst/>
+          </dgm:shape>
+          <dgm:presOf/>
+          <dgm:constrLst/>
+          <dgm:ruleLst/>
+        </dgm:layoutNode>
+      </dgm:forEach>
+    </dgm:forEach>
+  </dgm:layoutNode>
+</dgm:layoutDef>
+</file>
+
+<file path=ppt/diagrams/quickStyle1.xml><?xml version="1.0" encoding="utf-8"?>
+<dgm:styleDef xmlns:dgm="http://schemas.openxmlformats.org/drawingml/2006/diagram" xmlns:a="http://schemas.openxmlformats.org/drawingml/2006/main" uniqueId="urn:microsoft.com/office/officeart/2005/8/quickstyle/simple1">
+  <dgm:title val=""/>
+  <dgm:desc val=""/>
+  <dgm:catLst>
+    <dgm:cat type="simple" pri="10100"/>
+  </dgm:catLst>
+  <dgm:scene3d>
+    <a:camera prst="orthographicFront"/>
+    <a:lightRig rig="threePt" dir="t"/>
+  </dgm:scene3d>
+  <dgm:styleLbl name="node0">
+    <dgm:scene3d>
+      <a:camera prst="orthographicFront"/>
+      <a:lightRig rig="threePt" dir="t"/>
+    </dgm:scene3d>
+    <dgm:sp3d/>
+    <dgm:txPr/>
+    <dgm:style>
+      <a:lnRef idx="2">
+        <a:scrgbClr r="0" g="0" b="0"/>
+      </a:lnRef>
+      <a:fillRef idx="1">
+        <a:scrgbClr r="0" g="0" b="0"/>
+      </a:fillRef>
+      <a:effectRef idx="0">
+        <a:scrgbClr r="0" g="0" b="0"/>
+      </a:effectRef>
+      <a:fontRef idx="minor">
+        <a:schemeClr val="lt1"/>
+      </a:fontRef>
+    </dgm:style>
+  </dgm:styleLbl>
+  <dgm:styleLbl name="lnNode1">
+    <dgm:scene3d>
+      <a:camera prst="orthographicFront"/>
+      <a:lightRig rig="threePt" dir="t"/>
+    </dgm:scene3d>
+    <dgm:sp3d/>
+    <dgm:txPr/>
+    <dgm:style>
+      <a:lnRef idx="2">
+        <a:scrgbClr r="0" g="0" b="0"/>
+      </a:lnRef>
+      <a:fillRef idx="1">
+        <a:scrgbClr r="0" g="0" b="0"/>
+      </a:fillRef>
+      <a:effectRef idx="0">
+        <a:scrgbClr r="0" g="0" b="0"/>
+      </a:effectRef>
+      <a:fontRef idx="minor">
+        <a:schemeClr val="lt1"/>
+      </a:fontRef>
+    </dgm:style>
+  </dgm:styleLbl>
+  <dgm:styleLbl name="vennNode1">
+    <dgm:scene3d>
+      <a:camera prst="orthographicFront"/>
+      <a:lightRig rig="threePt" dir="t"/>
+    </dgm:scene3d>
+    <dgm:sp3d/>
+    <dgm:txPr/>
+    <dgm:style>
+      <a:lnRef idx="2">
+        <a:scrgbClr r="0" g="0" b="0"/>
+      </a:lnRef>
+      <a:fillRef idx="1">
+        <a:scrgbClr r="0" g="0" b="0"/>
+      </a:fillRef>
+      <a:effectRef idx="0">
+        <a:scrgbClr r="0" g="0" b="0"/>
+      </a:effectRef>
+      <a:fontRef idx="minor">
+        <a:schemeClr val="tx1"/>
+      </a:fontRef>
+    </dgm:style>
+  </dgm:styleLbl>
+  <dgm:styleLbl name="alignNode1">
+    <dgm:scene3d>
+      <a:camera prst="orthographicFront"/>
+      <a:lightRig rig="threePt" dir="t"/>
+    </dgm:scene3d>
+    <dgm:sp3d/>
+    <dgm:txPr/>
+    <dgm:style>
+      <a:lnRef idx="2">
+        <a:scrgbClr r="0" g="0" b="0"/>
+      </a:lnRef>
+      <a:fillRef idx="1">
+        <a:scrgbClr r="0" g="0" b="0"/>
+      </a:fillRef>
+      <a:effectRef idx="0">
+        <a:scrgbClr r="0" g="0" b="0"/>
+      </a:effectRef>
+      <a:fontRef idx="minor">
+        <a:schemeClr val="lt1"/>
+      </a:fontRef>
+    </dgm:style>
+  </dgm:styleLbl>
+  <dgm:styleLbl name="node1">
+    <dgm:scene3d>
+      <a:camera prst="orthographicFront"/>
+      <a:lightRig rig="threePt" dir="t"/>
+    </dgm:scene3d>
+    <dgm:sp3d/>
+    <dgm:txPr/>
+    <dgm:style>
+      <a:lnRef idx="2">
+        <a:scrgbClr r="0" g="0" b="0"/>
+      </a:lnRef>
+      <a:fillRef idx="1">
+        <a:scrgbClr r="0" g="0" b="0"/>
+      </a:fillRef>
+      <a:effectRef idx="0">
+        <a:scrgbClr r="0" g="0" b="0"/>
+      </a:effectRef>
+      <a:fontRef idx="minor">
+        <a:schemeClr val="lt1"/>
+      </a:fontRef>
+    </dgm:style>
+  </dgm:styleLbl>
+  <dgm:styleLbl name="node2">
+    <dgm:scene3d>
+      <a:camera prst="orthographicFront"/>
+      <a:lightRig rig="threePt" dir="t"/>
+    </dgm:scene3d>
+    <dgm:sp3d/>
+    <dgm:txPr/>
+    <dgm:style>
+      <a:lnRef idx="2">
+        <a:scrgbClr r="0" g="0" b="0"/>
+      </a:lnRef>
+      <a:fillRef idx="1">
+        <a:scrgbClr r="0" g="0" b="0"/>
+      </a:fillRef>
+      <a:effectRef idx="0">
+        <a:scrgbClr r="0" g="0" b="0"/>
+      </a:effectRef>
+      <a:fontRef idx="minor">
+        <a:schemeClr val="lt1"/>
+      </a:fontRef>
+    </dgm:style>
+  </dgm:styleLbl>
+  <dgm:styleLbl name="node3">
+    <dgm:scene3d>
+      <a:camera prst="orthographicFront"/>
+      <a:lightRig rig="threePt" dir="t"/>
+    </dgm:scene3d>
+    <dgm:sp3d/>
+    <dgm:txPr/>
+    <dgm:style>
+      <a:lnRef idx="2">
+        <a:scrgbClr r="0" g="0" b="0"/>
+      </a:lnRef>
+      <a:fillRef idx="1">
+        <a:scrgbClr r="0" g="0" b="0"/>
+      </a:fillRef>
+      <a:effectRef idx="0">
+        <a:scrgbClr r="0" g="0" b="0"/>
+      </a:effectRef>
+      <a:fontRef idx="minor">
+        <a:schemeClr val="lt1"/>
+      </a:fontRef>
+    </dgm:style>
+  </dgm:styleLbl>
+  <dgm:styleLbl name="node4">
+    <dgm:scene3d>
+      <a:camera prst="orthographicFront"/>
+      <a:lightRig rig="threePt" dir="t"/>
+    </dgm:scene3d>
+    <dgm:sp3d/>
+    <dgm:txPr/>
+    <dgm:style>
+      <a:lnRef idx="2">
+        <a:scrgbClr r="0" g="0" b="0"/>
+      </a:lnRef>
+      <a:fillRef idx="1">
+        <a:scrgbClr r="0" g="0" b="0"/>
+      </a:fillRef>
+      <a:effectRef idx="0">
+        <a:scrgbClr r="0" g="0" b="0"/>
+      </a:effectRef>
+      <a:fontRef idx="minor">
+        <a:schemeClr val="lt1"/>
+      </a:fontRef>
+    </dgm:style>
+  </dgm:styleLbl>
+  <dgm:styleLbl name="fgImgPlace1">
+    <dgm:scene3d>
+      <a:camera prst="orthographicFront"/>
+      <a:lightRig rig="threePt" dir="t"/>
+    </dgm:scene3d>
+    <dgm:sp3d/>
+    <dgm:txPr/>
+    <dgm:style>
+      <a:lnRef idx="2">
+        <a:scrgbClr r="0" g="0" b="0"/>
+      </a:lnRef>
+      <a:fillRef idx="1">
+        <a:scrgbClr r="0" g="0" b="0"/>
+      </a:fillRef>
+      <a:effectRef idx="0">
+        <a:scrgbClr r="0" g="0" b="0"/>
+      </a:effectRef>
+      <a:fontRef idx="minor"/>
+    </dgm:style>
+  </dgm:styleLbl>
+  <dgm:styleLbl name="alignImgPlace1">
+    <dgm:scene3d>
+      <a:camera prst="orthographicFront"/>
+      <a:lightRig rig="threePt" dir="t"/>
+    </dgm:scene3d>
+    <dgm:sp3d/>
+    <dgm:txPr/>
+    <dgm:style>
+      <a:lnRef idx="2">
+        <a:scrgbClr r="0" g="0" b="0"/>
+      </a:lnRef>
+      <a:fillRef idx="1">
+        <a:scrgbClr r="0" g="0" b="0"/>
+      </a:fillRef>
+      <a:effectRef idx="0">
+        <a:scrgbClr r="0" g="0" b="0"/>
+      </a:effectRef>
+      <a:fontRef idx="minor"/>
+    </dgm:style>
+  </dgm:styleLbl>
+  <dgm:styleLbl name="bgImgPlace1">
+    <dgm:scene3d>
+      <a:camera prst="orthographicFront"/>
+      <a:lightRig rig="threePt" dir="t"/>
+    </dgm:scene3d>
+    <dgm:sp3d/>
+    <dgm:txPr/>
+    <dgm:style>
+      <a:lnRef idx="2">
+        <a:scrgbClr r="0" g="0" b="0"/>
+      </a:lnRef>
+      <a:fillRef idx="1">
+        <a:scrgbClr r="0" g="0" b="0"/>
+      </a:fillRef>
+      <a:effectRef idx="0">
+        <a:scrgbClr r="0" g="0" b="0"/>
+      </a:effectRef>
+      <a:fontRef idx="minor"/>
+    </dgm:style>
+  </dgm:styleLbl>
+  <dgm:styleLbl name="sibTrans2D1">
+    <dgm:scene3d>
+      <a:camera prst="orthographicFront"/>
+      <a:lightRig rig="threePt" dir="t"/>
+    </dgm:scene3d>
+    <dgm:sp3d/>
+    <dgm:txPr/>
+    <dgm:style>
+      <a:lnRef idx="0">
+        <a:scrgbClr r="0" g="0" b="0"/>
+      </a:lnRef>
+      <a:fillRef idx="1">
+        <a:scrgbClr r="0" g="0" b="0"/>
+      </a:fillRef>
+      <a:effectRef idx="0">
+        <a:scrgbClr r="0" g="0" b="0"/>
+      </a:effectRef>
+      <a:fontRef idx="minor">
+        <a:schemeClr val="lt1"/>
+      </a:fontRef>
+    </dgm:style>
+  </dgm:styleLbl>
+  <dgm:styleLbl name="fgSibTrans2D1">
+    <dgm:scene3d>
+      <a:camera prst="orthographicFront"/>
+      <a:lightRig rig="threePt" dir="t"/>
+    </dgm:scene3d>
+    <dgm:sp3d/>
+    <dgm:txPr/>
+    <dgm:style>
+      <a:lnRef idx="0">
+        <a:scrgbClr r="0" g="0" b="0"/>
+      </a:lnRef>
+      <a:fillRef idx="1">
+        <a:scrgbClr r="0" g="0" b="0"/>
+      </a:fillRef>
+      <a:effectRef idx="0">
+        <a:scrgbClr r="0" g="0" b="0"/>
+      </a:effectRef>
+      <a:fontRef idx="minor">
+        <a:schemeClr val="lt1"/>
+      </a:fontRef>
+    </dgm:style>
+  </dgm:styleLbl>
+  <dgm:styleLbl name="bgSibTrans2D1">
+    <dgm:scene3d>
+      <a:camera prst="orthographicFront"/>
+      <a:lightRig rig="threePt" dir="t"/>
+    </dgm:scene3d>
+    <dgm:sp3d/>
+    <dgm:txPr/>
+    <dgm:style>
+      <a:lnRef idx="0">
+        <a:scrgbClr r="0" g="0" b="0"/>
+      </a:lnRef>
+      <a:fillRef idx="1">
+        <a:scrgbClr r="0" g="0" b="0"/>
+      </a:fillRef>
+      <a:effectRef idx="0">
+        <a:scrgbClr r="0" g="0" b="0"/>
+      </a:effectRef>
+      <a:fontRef idx="minor">
+        <a:schemeClr val="lt1"/>
+      </a:fontRef>
+    </dgm:style>
+  </dgm:styleLbl>
+  <dgm:styleLbl name="sibTrans1D1">
+    <dgm:scene3d>
+      <a:camera prst="orthographicFront"/>
+      <a:lightRig rig="threePt" dir="t"/>
+    </dgm:scene3d>
+    <dgm:sp3d/>
+    <dgm:txPr/>
+    <dgm:style>
+      <a:lnRef idx="1">
+        <a:scrgbClr r="0" g="0" b="0"/>
+      </a:lnRef>
+      <a:fillRef idx="0">
+        <a:scrgbClr r="0" g="0" b="0"/>
+      </a:fillRef>
+      <a:effectRef idx="0">
+        <a:scrgbClr r="0" g="0" b="0"/>
+      </a:effectRef>
+      <a:fontRef idx="minor"/>
+    </dgm:style>
+  </dgm:styleLbl>
+  <dgm:styleLbl name="callout">
+    <dgm:scene3d>
+      <a:camera prst="orthographicFront"/>
+      <a:lightRig rig="threePt" dir="t"/>
+    </dgm:scene3d>
+    <dgm:sp3d/>
+    <dgm:txPr/>
+    <dgm:style>
+      <a:lnRef idx="2">
+        <a:scrgbClr r="0" g="0" b="0"/>
+      </a:lnRef>
+      <a:fillRef idx="1">
+        <a:scrgbClr r="0" g="0" b="0"/>
+      </a:fillRef>
+      <a:effectRef idx="0">
+        <a:scrgbClr r="0" g="0" b="0"/>
+      </a:effectRef>
+      <a:fontRef idx="minor"/>
+    </dgm:style>
+  </dgm:styleLbl>
+  <dgm:styleLbl name="asst0">
+    <dgm:scene3d>
+      <a:camera prst="orthographicFront"/>
+      <a:lightRig rig="threePt" dir="t"/>
+    </dgm:scene3d>
+    <dgm:sp3d/>
+    <dgm:txPr/>
+    <dgm:style>
+      <a:lnRef idx="2">
+        <a:scrgbClr r="0" g="0" b="0"/>
+      </a:lnRef>
+      <a:fillRef idx="1">
+        <a:scrgbClr r="0" g="0" b="0"/>
+      </a:fillRef>
+      <a:effectRef idx="0">
+        <a:scrgbClr r="0" g="0" b="0"/>
+      </a:effectRef>
+      <a:fontRef idx="minor">
+        <a:schemeClr val="lt1"/>
+      </a:fontRef>
+    </dgm:style>
+  </dgm:styleLbl>
+  <dgm:styleLbl name="asst1">
+    <dgm:scene3d>
+      <a:camera prst="orthographicFront"/>
+      <a:lightRig rig="threePt" dir="t"/>
+    </dgm:scene3d>
+    <dgm:sp3d/>
+    <dgm:txPr/>
+    <dgm:style>
+      <a:lnRef idx="2">
+        <a:scrgbClr r="0" g="0" b="0"/>
+      </a:lnRef>
+      <a:fillRef idx="1">
+        <a:scrgbClr r="0" g="0" b="0"/>
+      </a:fillRef>
+      <a:effectRef idx="0">
+        <a:scrgbClr r="0" g="0" b="0"/>
+      </a:effectRef>
+      <a:fontRef idx="minor">
+        <a:schemeClr val="lt1"/>
+      </a:fontRef>
+    </dgm:style>
+  </dgm:styleLbl>
+  <dgm:styleLbl name="asst2">
+    <dgm:scene3d>
+      <a:camera prst="orthographicFront"/>
+      <a:lightRig rig="threePt" dir="t"/>
+    </dgm:scene3d>
+    <dgm:sp3d/>
+    <dgm:txPr/>
+    <dgm:style>
+      <a:lnRef idx="2">
+        <a:scrgbClr r="0" g="0" b="0"/>
+      </a:lnRef>
+      <a:fillRef idx="1">
+        <a:scrgbClr r="0" g="0" b="0"/>
+      </a:fillRef>
+      <a:effectRef idx="0">
+        <a:scrgbClr r="0" g="0" b="0"/>
+      </a:effectRef>
+      <a:fontRef idx="minor">
+        <a:schemeClr val="lt1"/>
+      </a:fontRef>
+    </dgm:style>
+  </dgm:styleLbl>
+  <dgm:styleLbl name="asst3">
+    <dgm:scene3d>
+      <a:camera prst="orthographicFront"/>
+      <a:lightRig rig="threePt" dir="t"/>
+    </dgm:scene3d>
+    <dgm:sp3d/>
+    <dgm:txPr/>
+    <dgm:style>
+      <a:lnRef idx="2">
+        <a:scrgbClr r="0" g="0" b="0"/>
+      </a:lnRef>
+      <a:fillRef idx="1">
+        <a:scrgbClr r="0" g="0" b="0"/>
+      </a:fillRef>
+      <a:effectRef idx="0">
+        <a:scrgbClr r="0" g="0" b="0"/>
+      </a:effectRef>
+      <a:fontRef idx="minor">
+        <a:schemeClr val="lt1"/>
+      </a:fontRef>
+    </dgm:style>
+  </dgm:styleLbl>
+  <dgm:styleLbl name="asst4">
+    <dgm:scene3d>
+      <a:camera prst="orthographicFront"/>
+      <a:lightRig rig="threePt" dir="t"/>
+    </dgm:scene3d>
+    <dgm:sp3d/>
+    <dgm:txPr/>
+    <dgm:style>
+      <a:lnRef idx="2">
+        <a:scrgbClr r="0" g="0" b="0"/>
+      </a:lnRef>
+      <a:fillRef idx="1">
+        <a:scrgbClr r="0" g="0" b="0"/>
+      </a:fillRef>
+      <a:effectRef idx="0">
+        <a:scrgbClr r="0" g="0" b="0"/>
+      </a:effectRef>
+      <a:fontRef idx="minor">
+        <a:schemeClr val="lt1"/>
+      </a:fontRef>
+    </dgm:style>
+  </dgm:styleLbl>
+  <dgm:styleLbl name="parChTrans2D1">
+    <dgm:scene3d>
+      <a:camera prst="orthographicFront"/>
+      <a:lightRig rig="threePt" dir="t"/>
+    </dgm:scene3d>
+    <dgm:sp3d/>
+    <dgm:txPr/>
+    <dgm:style>
+      <a:lnRef idx="2">
+        <a:scrgbClr r="0" g="0" b="0"/>
+      </a:lnRef>
+      <a:fillRef idx="1">
+        <a:scrgbClr r="0" g="0" b="0"/>
+      </a:fillRef>
+      <a:effectRef idx="0">
+        <a:scrgbClr r="0" g="0" b="0"/>
+      </a:effectRef>
+      <a:fontRef idx="minor">
+        <a:schemeClr val="lt1"/>
+      </a:fontRef>
+    </dgm:style>
+  </dgm:styleLbl>
+  <dgm:styleLbl name="parChTrans2D2">
+    <dgm:scene3d>
+      <a:camera prst="orthographicFront"/>
+      <a:lightRig rig="threePt" dir="t"/>
+    </dgm:scene3d>
+    <dgm:sp3d/>
+    <dgm:txPr/>
+    <dgm:style>
+      <a:lnRef idx="2">
+        <a:scrgbClr r="0" g="0" b="0"/>
+      </a:lnRef>
+      <a:fillRef idx="1">
+        <a:scrgbClr r="0" g="0" b="0"/>
+      </a:fillRef>
+      <a:effectRef idx="0">
+        <a:scrgbClr r="0" g="0" b="0"/>
+      </a:effectRef>
+      <a:fontRef idx="minor">
+        <a:schemeClr val="lt1"/>
+      </a:fontRef>
+    </dgm:style>
+  </dgm:styleLbl>
+  <dgm:styleLbl name="parChTrans2D3">
+    <dgm:scene3d>
+      <a:camera prst="orthographicFront"/>
+      <a:lightRig rig="threePt" dir="t"/>
+    </dgm:scene3d>
+    <dgm:sp3d/>
+    <dgm:txPr/>
+    <dgm:style>
+      <a:lnRef idx="2">
+        <a:scrgbClr r="0" g="0" b="0"/>
+      </a:lnRef>
+      <a:fillRef idx="1">
+        <a:scrgbClr r="0" g="0" b="0"/>
+      </a:fillRef>
+      <a:effectRef idx="0">
+        <a:scrgbClr r="0" g="0" b="0"/>
+      </a:effectRef>
+      <a:fontRef idx="minor">
+        <a:schemeClr val="lt1"/>
+      </a:fontRef>
+    </dgm:style>
+  </dgm:styleLbl>
+  <dgm:styleLbl name="parChTrans2D4">
+    <dgm:scene3d>
+      <a:camera prst="orthographicFront"/>
+      <a:lightRig rig="threePt" dir="t"/>
+    </dgm:scene3d>
+    <dgm:sp3d/>
+    <dgm:txPr/>
+    <dgm:style>
+      <a:lnRef idx="2">
+        <a:scrgbClr r="0" g="0" b="0"/>
+      </a:lnRef>
+      <a:fillRef idx="1">
+        <a:scrgbClr r="0" g="0" b="0"/>
+      </a:fillRef>
+      <a:effectRef idx="0">
+        <a:scrgbClr r="0" g="0" b="0"/>
+      </a:effectRef>
+      <a:fontRef idx="minor">
+        <a:schemeClr val="lt1"/>
+      </a:fontRef>
+    </dgm:style>
+  </dgm:styleLbl>
+  <dgm:styleLbl name="parChTrans1D1">
+    <dgm:scene3d>
+      <a:camera prst="orthographicFront"/>
+      <a:lightRig rig="threePt" dir="t"/>
+    </dgm:scene3d>
+    <dgm:sp3d/>
+    <dgm:txPr/>
+    <dgm:style>
+      <a:lnRef idx="2">
+        <a:scrgbClr r="0" g="0" b="0"/>
+      </a:lnRef>
+      <a:fillRef idx="0">
+        <a:scrgbClr r="0" g="0" b="0"/>
+      </a:fillRef>
+      <a:effectRef idx="0">
+        <a:scrgbClr r="0" g="0" b="0"/>
+      </a:effectRef>
+      <a:fontRef idx="minor"/>
+    </dgm:style>
+  </dgm:styleLbl>
+  <dgm:styleLbl name="parChTrans1D2">
+    <dgm:scene3d>
+      <a:camera prst="orthographicFront"/>
+      <a:lightRig rig="threePt" dir="t"/>
+    </dgm:scene3d>
+    <dgm:sp3d/>
+    <dgm:txPr/>
+    <dgm:style>
+      <a:lnRef idx="2">
+        <a:scrgbClr r="0" g="0" b="0"/>
+      </a:lnRef>
+      <a:fillRef idx="0">
+        <a:scrgbClr r="0" g="0" b="0"/>
+      </a:fillRef>
+      <a:effectRef idx="0">
+        <a:scrgbClr r="0" g="0" b="0"/>
+      </a:effectRef>
+      <a:fontRef idx="minor"/>
+    </dgm:style>
+  </dgm:styleLbl>
+  <dgm:styleLbl name="parChTrans1D3">
+    <dgm:scene3d>
+      <a:camera prst="orthographicFront"/>
+      <a:lightRig rig="threePt" dir="t"/>
+    </dgm:scene3d>
+    <dgm:sp3d/>
+    <dgm:txPr/>
+    <dgm:style>
+      <a:lnRef idx="2">
+        <a:scrgbClr r="0" g="0" b="0"/>
+      </a:lnRef>
+      <a:fillRef idx="0">
+        <a:scrgbClr r="0" g="0" b="0"/>
+      </a:fillRef>
+      <a:effectRef idx="0">
+        <a:scrgbClr r="0" g="0" b="0"/>
+      </a:effectRef>
+      <a:fontRef idx="minor"/>
+    </dgm:style>
+  </dgm:styleLbl>
+  <dgm:styleLbl name="parChTrans1D4">
+    <dgm:scene3d>
+      <a:camera prst="orthographicFront"/>
+      <a:lightRig rig="threePt" dir="t"/>
+    </dgm:scene3d>
+    <dgm:sp3d/>
+    <dgm:txPr/>
+    <dgm:style>
+      <a:lnRef idx="2">
+        <a:scrgbClr r="0" g="0" b="0"/>
+      </a:lnRef>
+      <a:fillRef idx="0">
+        <a:scrgbClr r="0" g="0" b="0"/>
+      </a:fillRef>
+      <a:effectRef idx="0">
+        <a:scrgbClr r="0" g="0" b="0"/>
+      </a:effectRef>
+      <a:fontRef idx="minor"/>
+    </dgm:style>
+  </dgm:styleLbl>
+  <dgm:styleLbl name="fgAcc1">
+    <dgm:scene3d>
+      <a:camera prst="orthographicFront"/>
+      <a:lightRig rig="threePt" dir="t"/>
+    </dgm:scene3d>
+    <dgm:sp3d/>
+    <dgm:txPr/>
+    <dgm:style>
+      <a:lnRef idx="2">
+        <a:scrgbClr r="0" g="0" b="0"/>
+      </a:lnRef>
+      <a:fillRef idx="1">
+        <a:scrgbClr r="0" g="0" b="0"/>
+      </a:fillRef>
+      <a:effectRef idx="0">
+        <a:scrgbClr r="0" g="0" b="0"/>
+      </a:effectRef>
+      <a:fontRef idx="minor"/>
+    </dgm:style>
+  </dgm:styleLbl>
+  <dgm:styleLbl name="conFgAcc1">
+    <dgm:scene3d>
+      <a:camera prst="orthographicFront"/>
+      <a:lightRig rig="threePt" dir="t"/>
+    </dgm:scene3d>
+    <dgm:sp3d/>
+    <dgm:txPr/>
+    <dgm:style>
+      <a:lnRef idx="2">
+        <a:scrgbClr r="0" g="0" b="0"/>
+      </a:lnRef>
+      <a:fillRef idx="1">
+        <a:scrgbClr r="0" g="0" b="0"/>
+      </a:fillRef>
+      <a:effectRef idx="0">
+        <a:scrgbClr r="0" g="0" b="0"/>
+      </a:effectRef>
+      <a:fontRef idx="minor"/>
+    </dgm:style>
+  </dgm:styleLbl>
+  <dgm:styleLbl name="alignAcc1">
+    <dgm:scene3d>
+      <a:camera prst="orthographicFront"/>
+      <a:lightRig rig="threePt" dir="t"/>
+    </dgm:scene3d>
+    <dgm:sp3d/>
+    <dgm:txPr/>
+    <dgm:style>
+      <a:lnRef idx="2">
+        <a:scrgbClr r="0" g="0" b="0"/>
+      </a:lnRef>
+      <a:fillRef idx="1">
+        <a:scrgbClr r="0" g="0" b="0"/>
+      </a:fillRef>
+      <a:effectRef idx="0">
+        <a:scrgbClr r="0" g="0" b="0"/>
+      </a:effectRef>
+      <a:fontRef idx="minor"/>
+    </dgm:style>
+  </dgm:styleLbl>
+  <dgm:styleLbl name="trAlignAcc1">
+    <dgm:scene3d>
+      <a:camera prst="orthographicFront"/>
+      <a:lightRig rig="threePt" dir="t"/>
+    </dgm:scene3d>
+    <dgm:sp3d/>
+    <dgm:txPr/>
+    <dgm:style>
+      <a:lnRef idx="1">
+        <a:scrgbClr r="0" g="0" b="0"/>
+      </a:lnRef>
+      <a:fillRef idx="1">
+        <a:scrgbClr r="0" g="0" b="0"/>
+      </a:fillRef>
+      <a:effectRef idx="0">
+        <a:scrgbClr r="0" g="0" b="0"/>
+      </a:effectRef>
+      <a:fontRef idx="minor"/>
+    </dgm:style>
+  </dgm:styleLbl>
+  <dgm:styleLbl name="bgAcc1">
+    <dgm:scene3d>
+      <a:camera prst="orthographicFront"/>
+      <a:lightRig rig="threePt" dir="t"/>
+    </dgm:scene3d>
+    <dgm:sp3d/>
+    <dgm:txPr/>
+    <dgm:style>
+      <a:lnRef idx="2">
+        <a:scrgbClr r="0" g="0" b="0"/>
+      </a:lnRef>
+      <a:fillRef idx="1">
+        <a:scrgbClr r="0" g="0" b="0"/>
+      </a:fillRef>
+      <a:effectRef idx="0">
+        <a:scrgbClr r="0" g="0" b="0"/>
+      </a:effectRef>
+      <a:fontRef idx="minor"/>
+    </dgm:style>
+  </dgm:styleLbl>
+  <dgm:styleLbl name="solidFgAcc1">
+    <dgm:scene3d>
+      <a:camera prst="orthographicFront"/>
+      <a:lightRig rig="threePt" dir="t"/>
+    </dgm:scene3d>
+    <dgm:sp3d/>
+    <dgm:txPr/>
+    <dgm:style>
+      <a:lnRef idx="2">
+        <a:scrgbClr r="0" g="0" b="0"/>
+      </a:lnRef>
+      <a:fillRef idx="1">
+        <a:scrgbClr r="0" g="0" b="0"/>
+      </a:fillRef>
+      <a:effectRef idx="0">
+        <a:scrgbClr r="0" g="0" b="0"/>
+      </a:effectRef>
+      <a:fontRef idx="minor"/>
+    </dgm:style>
+  </dgm:styleLbl>
+  <dgm:styleLbl name="solidAlignAcc1">
+    <dgm:scene3d>
+      <a:camera prst="orthographicFront"/>
+      <a:lightRig rig="threePt" dir="t"/>
+    </dgm:scene3d>
+    <dgm:sp3d/>
+    <dgm:txPr/>
+    <dgm:style>
+      <a:lnRef idx="2">
+        <a:scrgbClr r="0" g="0" b="0"/>
+      </a:lnRef>
+      <a:fillRef idx="1">
+        <a:scrgbClr r="0" g="0" b="0"/>
+      </a:fillRef>
+      <a:effectRef idx="0">
+        <a:scrgbClr r="0" g="0" b="0"/>
+      </a:effectRef>
+      <a:fontRef idx="minor"/>
+    </dgm:style>
+  </dgm:styleLbl>
+  <dgm:styleLbl name="solidBgAcc1">
+    <dgm:scene3d>
+      <a:camera prst="orthographicFront"/>
+      <a:lightRig rig="threePt" dir="t"/>
+    </dgm:scene3d>
+    <dgm:sp3d/>
+    <dgm:txPr/>
+    <dgm:style>
+      <a:lnRef idx="2">
+        <a:scrgbClr r="0" g="0" b="0"/>
+      </a:lnRef>
+      <a:fillRef idx="1">
+        <a:scrgbClr r="0" g="0" b="0"/>
+      </a:fillRef>
+      <a:effectRef idx="0">
+        <a:scrgbClr r="0" g="0" b="0"/>
+      </a:effectRef>
+      <a:fontRef idx="minor"/>
+    </dgm:style>
+  </dgm:styleLbl>
+  <dgm:styleLbl name="fgAccFollowNode1">
+    <dgm:scene3d>
+      <a:camera prst="orthographicFront"/>
+      <a:lightRig rig="threePt" dir="t"/>
+    </dgm:scene3d>
+    <dgm:sp3d/>
+    <dgm:txPr/>
+    <dgm:style>
+      <a:lnRef idx="2">
+        <a:scrgbClr r="0" g="0" b="0"/>
+      </a:lnRef>
+      <a:fillRef idx="1">
+        <a:scrgbClr r="0" g="0" b="0"/>
+      </a:fillRef>
+      <a:effectRef idx="0">
+        <a:scrgbClr r="0" g="0" b="0"/>
+      </a:effectRef>
+      <a:fontRef idx="minor"/>
+    </dgm:style>
+  </dgm:styleLbl>
+  <dgm:styleLbl name="alignAccFollowNode1">
+    <dgm:scene3d>
+      <a:camera prst="orthographicFront"/>
+      <a:lightRig rig="threePt" dir="t"/>
+    </dgm:scene3d>
+    <dgm:sp3d/>
+    <dgm:txPr/>
+    <dgm:style>
+      <a:lnRef idx="2">
+        <a:scrgbClr r="0" g="0" b="0"/>
+      </a:lnRef>
+      <a:fillRef idx="1">
+        <a:scrgbClr r="0" g="0" b="0"/>
+      </a:fillRef>
+      <a:effectRef idx="0">
+        <a:scrgbClr r="0" g="0" b="0"/>
+      </a:effectRef>
+      <a:fontRef idx="minor"/>
+    </dgm:style>
+  </dgm:styleLbl>
+  <dgm:styleLbl name="bgAccFollowNode1">
+    <dgm:scene3d>
+      <a:camera prst="orthographicFront"/>
+      <a:lightRig rig="threePt" dir="t"/>
+    </dgm:scene3d>
+    <dgm:sp3d/>
+    <dgm:txPr/>
+    <dgm:style>
+      <a:lnRef idx="2">
+        <a:scrgbClr r="0" g="0" b="0"/>
+      </a:lnRef>
+      <a:fillRef idx="1">
+        <a:scrgbClr r="0" g="0" b="0"/>
+      </a:fillRef>
+      <a:effectRef idx="0">
+        <a:scrgbClr r="0" g="0" b="0"/>
+      </a:effectRef>
+      <a:fontRef idx="minor"/>
+    </dgm:style>
+  </dgm:styleLbl>
+  <dgm:styleLbl name="fgAcc0">
+    <dgm:scene3d>
+      <a:camera prst="orthographicFront"/>
+      <a:lightRig rig="threePt" dir="t"/>
+    </dgm:scene3d>
+    <dgm:sp3d/>
+    <dgm:txPr/>
+    <dgm:style>
+      <a:lnRef idx="2">
+        <a:scrgbClr r="0" g="0" b="0"/>
+      </a:lnRef>
+      <a:fillRef idx="1">
+        <a:scrgbClr r="0" g="0" b="0"/>
+      </a:fillRef>
+      <a:effectRef idx="0">
+        <a:scrgbClr r="0" g="0" b="0"/>
+      </a:effectRef>
+      <a:fontRef idx="minor"/>
+    </dgm:style>
+  </dgm:styleLbl>
+  <dgm:styleLbl name="fgAcc2">
+    <dgm:scene3d>
+      <a:camera prst="orthographicFront"/>
+      <a:lightRig rig="threePt" dir="t"/>
+    </dgm:scene3d>
+    <dgm:sp3d/>
+    <dgm:txPr/>
+    <dgm:style>
+      <a:lnRef idx="2">
+        <a:scrgbClr r="0" g="0" b="0"/>
+      </a:lnRef>
+      <a:fillRef idx="1">
+        <a:scrgbClr r="0" g="0" b="0"/>
+      </a:fillRef>
+      <a:effectRef idx="0">
+        <a:scrgbClr r="0" g="0" b="0"/>
+      </a:effectRef>
+      <a:fontRef idx="minor"/>
+    </dgm:style>
+  </dgm:styleLbl>
+  <dgm:styleLbl name="fgAcc3">
+    <dgm:scene3d>
+      <a:camera prst="orthographicFront"/>
+      <a:lightRig rig="threePt" dir="t"/>
+    </dgm:scene3d>
+    <dgm:sp3d/>
+    <dgm:txPr/>
+    <dgm:style>
+      <a:lnRef idx="2">
+        <a:scrgbClr r="0" g="0" b="0"/>
+      </a:lnRef>
+      <a:fillRef idx="1">
+        <a:scrgbClr r="0" g="0" b="0"/>
+      </a:fillRef>
+      <a:effectRef idx="0">
+        <a:scrgbClr r="0" g="0" b="0"/>
+      </a:effectRef>
+      <a:fontRef idx="minor"/>
+    </dgm:style>
+  </dgm:styleLbl>
+  <dgm:styleLbl name="fgAcc4">
+    <dgm:scene3d>
+      <a:camera prst="orthographicFront"/>
+      <a:lightRig rig="threePt" dir="t"/>
+    </dgm:scene3d>
+    <dgm:sp3d/>
+    <dgm:txPr/>
+    <dgm:style>
+      <a:lnRef idx="2">
+        <a:scrgbClr r="0" g="0" b="0"/>
+      </a:lnRef>
+      <a:fillRef idx="1">
+        <a:scrgbClr r="0" g="0" b="0"/>
+      </a:fillRef>
+      <a:effectRef idx="0">
+        <a:scrgbClr r="0" g="0" b="0"/>
+      </a:effectRef>
+      <a:fontRef idx="minor"/>
+    </dgm:style>
+  </dgm:styleLbl>
+  <dgm:styleLbl name="bgShp">
+    <dgm:scene3d>
+      <a:camera prst="orthographicFront"/>
+      <a:lightRig rig="threePt" dir="t"/>
+    </dgm:scene3d>
+    <dgm:sp3d/>
+    <dgm:txPr/>
+    <dgm:style>
+      <a:lnRef idx="0">
+        <a:scrgbClr r="0" g="0" b="0"/>
+      </a:lnRef>
+      <a:fillRef idx="1">
+        <a:scrgbClr r="0" g="0" b="0"/>
+      </a:fillRef>
+      <a:effectRef idx="0">
+        <a:scrgbClr r="0" g="0" b="0"/>
+      </a:effectRef>
+      <a:fontRef idx="minor"/>
+    </dgm:style>
+  </dgm:styleLbl>
+  <dgm:styleLbl name="dkBgShp">
+    <dgm:scene3d>
+      <a:camera prst="orthographicFront"/>
+      <a:lightRig rig="threePt" dir="t"/>
+    </dgm:scene3d>
+    <dgm:sp3d/>
+    <dgm:txPr/>
+    <dgm:style>
+      <a:lnRef idx="0">
+        <a:scrgbClr r="0" g="0" b="0"/>
+      </a:lnRef>
+      <a:fillRef idx="1">
+        <a:scrgbClr r="0" g="0" b="0"/>
+      </a:fillRef>
+      <a:effectRef idx="0">
+        <a:scrgbClr r="0" g="0" b="0"/>
+      </a:effectRef>
+      <a:fontRef idx="minor"/>
+    </dgm:style>
+  </dgm:styleLbl>
+  <dgm:styleLbl name="trBgShp">
+    <dgm:scene3d>
+      <a:camera prst="orthographicFront"/>
+      <a:lightRig rig="threePt" dir="t"/>
+    </dgm:scene3d>
+    <dgm:sp3d/>
+    <dgm:txPr/>
+    <dgm:style>
+      <a:lnRef idx="0">
+        <a:scrgbClr r="0" g="0" b="0"/>
+      </a:lnRef>
+      <a:fillRef idx="1">
+        <a:scrgbClr r="0" g="0" b="0"/>
+      </a:fillRef>
+      <a:effectRef idx="0">
+        <a:scrgbClr r="0" g="0" b="0"/>
+      </a:effectRef>
+      <a:fontRef idx="minor"/>
+    </dgm:style>
+  </dgm:styleLbl>
+  <dgm:styleLbl name="fgShp">
+    <dgm:scene3d>
+      <a:camera prst="orthographicFront"/>
+      <a:lightRig rig="threePt" dir="t"/>
+    </dgm:scene3d>
+    <dgm:sp3d/>
+    <dgm:txPr/>
+    <dgm:style>
+      <a:lnRef idx="2">
+        <a:scrgbClr r="0" g="0" b="0"/>
+      </a:lnRef>
+      <a:fillRef idx="1">
+        <a:scrgbClr r="0" g="0" b="0"/>
+      </a:fillRef>
+      <a:effectRef idx="0">
+        <a:scrgbClr r="0" g="0" b="0"/>
+      </a:effectRef>
+      <a:fontRef idx="minor"/>
+    </dgm:style>
+  </dgm:styleLbl>
+  <dgm:styleLbl name="revTx">
+    <dgm:scene3d>
+      <a:camera prst="orthographicFront"/>
+      <a:lightRig rig="threePt" dir="t"/>
+    </dgm:scene3d>
+    <dgm:sp3d/>
+    <dgm:txPr/>
+    <dgm:style>
+      <a:lnRef idx="0">
+        <a:scrgbClr r="0" g="0" b="0"/>
+      </a:lnRef>
+      <a:fillRef idx="0">
+        <a:scrgbClr r="0" g="0" b="0"/>
+      </a:fillRef>
+      <a:effectRef idx="0">
+        <a:scrgbClr r="0" g="0" b="0"/>
+      </a:effectRef>
+      <a:fontRef idx="minor"/>
+    </dgm:style>
+  </dgm:styleLbl>
+</dgm:styleDef>
+</file>
+
 <file path=ppt/notesMasters/notesMaster1.xml><?xml version="1.0" encoding="utf-8"?>
 <p:notesMaster xmlns:a="http://schemas.openxmlformats.org/drawingml/2006/main" xmlns:r="http://schemas.openxmlformats.org/officeDocument/2006/relationships" xmlns:p="http://schemas.openxmlformats.org/presentationml/2006/main">
   <p:cSld>
@@ -1320,7 +3909,7 @@
           <a:p>
             <a:fld id="{43E32005-3A63-48D2-8C73-BF5F95786EBD}" type="datetimeFigureOut">
               <a:rPr lang="en-US" smtClean="0"/>
-              <a:t>1/31/2018</a:t>
+              <a:t>3/21/2018</a:t>
             </a:fld>
             <a:endParaRPr lang="en-US"/>
           </a:p>
@@ -4959,6 +7548,93 @@
 </p:notes>
 </file>
 
+<file path=ppt/notesSlides/notesSlide39.xml><?xml version="1.0" encoding="utf-8"?>
+<p:notes xmlns:a="http://schemas.openxmlformats.org/drawingml/2006/main" xmlns:r="http://schemas.openxmlformats.org/officeDocument/2006/relationships" xmlns:p="http://schemas.openxmlformats.org/presentationml/2006/main">
+  <p:cSld>
+    <p:spTree>
+      <p:nvGrpSpPr>
+        <p:cNvPr id="1" name=""/>
+        <p:cNvGrpSpPr/>
+        <p:nvPr/>
+      </p:nvGrpSpPr>
+      <p:grpSpPr>
+        <a:xfrm>
+          <a:off x="0" y="0"/>
+          <a:ext cx="0" cy="0"/>
+          <a:chOff x="0" y="0"/>
+          <a:chExt cx="0" cy="0"/>
+        </a:xfrm>
+      </p:grpSpPr>
+      <p:sp>
+        <p:nvSpPr>
+          <p:cNvPr id="2" name="Slide Image Placeholder 1"/>
+          <p:cNvSpPr>
+            <a:spLocks noGrp="1" noRot="1" noChangeAspect="1"/>
+          </p:cNvSpPr>
+          <p:nvPr>
+            <p:ph type="sldImg"/>
+          </p:nvPr>
+        </p:nvSpPr>
+        <p:spPr/>
+      </p:sp>
+      <p:sp>
+        <p:nvSpPr>
+          <p:cNvPr id="3" name="Notes Placeholder 2"/>
+          <p:cNvSpPr>
+            <a:spLocks noGrp="1"/>
+          </p:cNvSpPr>
+          <p:nvPr>
+            <p:ph type="body" idx="1"/>
+          </p:nvPr>
+        </p:nvSpPr>
+        <p:spPr/>
+        <p:txBody>
+          <a:bodyPr/>
+          <a:lstStyle/>
+          <a:p>
+            <a:r>
+              <a:rPr lang="en-US" dirty="0"/>
+              <a:t>SmartArt</a:t>
+            </a:r>
+          </a:p>
+        </p:txBody>
+      </p:sp>
+      <p:sp>
+        <p:nvSpPr>
+          <p:cNvPr id="4" name="Slide Number Placeholder 3"/>
+          <p:cNvSpPr>
+            <a:spLocks noGrp="1"/>
+          </p:cNvSpPr>
+          <p:nvPr>
+            <p:ph type="sldNum" sz="quarter" idx="10"/>
+          </p:nvPr>
+        </p:nvSpPr>
+        <p:spPr/>
+        <p:txBody>
+          <a:bodyPr/>
+          <a:lstStyle/>
+          <a:p>
+            <a:fld id="{0FE7C38A-472B-4221-8E00-509E1DA863EC}" type="slidenum">
+              <a:rPr lang="en-US" smtClean="0"/>
+              <a:t>47</a:t>
+            </a:fld>
+            <a:endParaRPr lang="en-US"/>
+          </a:p>
+        </p:txBody>
+      </p:sp>
+    </p:spTree>
+    <p:extLst>
+      <p:ext uri="{BB962C8B-B14F-4D97-AF65-F5344CB8AC3E}">
+        <p14:creationId xmlns:p14="http://schemas.microsoft.com/office/powerpoint/2010/main" val="2636897301"/>
+      </p:ext>
+    </p:extLst>
+  </p:cSld>
+  <p:clrMapOvr>
+    <a:masterClrMapping/>
+  </p:clrMapOvr>
+</p:notes>
+</file>
+
 <file path=ppt/notesSlides/notesSlide4.xml><?xml version="1.0" encoding="utf-8"?>
 <p:notes xmlns:a="http://schemas.openxmlformats.org/drawingml/2006/main" xmlns:r="http://schemas.openxmlformats.org/officeDocument/2006/relationships" xmlns:p="http://schemas.openxmlformats.org/presentationml/2006/main">
   <p:cSld>
@@ -5905,7 +8581,7 @@
           <a:p>
             <a:fld id="{699DC775-C286-4358-8C92-D7E584E969B3}" type="datetimeFigureOut">
               <a:rPr lang="en-US" smtClean="0"/>
-              <a:t>1/31/2018</a:t>
+              <a:t>3/21/2018</a:t>
             </a:fld>
             <a:endParaRPr lang="en-US"/>
           </a:p>
@@ -6073,7 +8749,7 @@
           <a:p>
             <a:fld id="{699DC775-C286-4358-8C92-D7E584E969B3}" type="datetimeFigureOut">
               <a:rPr lang="en-US" smtClean="0"/>
-              <a:t>1/31/2018</a:t>
+              <a:t>3/21/2018</a:t>
             </a:fld>
             <a:endParaRPr lang="en-US"/>
           </a:p>
@@ -6251,7 +8927,7 @@
           <a:p>
             <a:fld id="{699DC775-C286-4358-8C92-D7E584E969B3}" type="datetimeFigureOut">
               <a:rPr lang="en-US" smtClean="0"/>
-              <a:t>1/31/2018</a:t>
+              <a:t>3/21/2018</a:t>
             </a:fld>
             <a:endParaRPr lang="en-US"/>
           </a:p>
@@ -6491,7 +9167,7 @@
           <a:p>
             <a:fld id="{699DC775-C286-4358-8C92-D7E584E969B3}" type="datetimeFigureOut">
               <a:rPr lang="en-US" smtClean="0"/>
-              <a:t>1/31/2018</a:t>
+              <a:t>3/21/2018</a:t>
             </a:fld>
             <a:endParaRPr lang="en-US"/>
           </a:p>
@@ -6659,7 +9335,7 @@
           <a:p>
             <a:fld id="{699DC775-C286-4358-8C92-D7E584E969B3}" type="datetimeFigureOut">
               <a:rPr lang="en-US" smtClean="0"/>
-              <a:t>1/31/2018</a:t>
+              <a:t>3/21/2018</a:t>
             </a:fld>
             <a:endParaRPr lang="en-US"/>
           </a:p>
@@ -6904,7 +9580,7 @@
           <a:p>
             <a:fld id="{699DC775-C286-4358-8C92-D7E584E969B3}" type="datetimeFigureOut">
               <a:rPr lang="en-US" smtClean="0"/>
-              <a:t>1/31/2018</a:t>
+              <a:t>3/21/2018</a:t>
             </a:fld>
             <a:endParaRPr lang="en-US"/>
           </a:p>
@@ -7189,7 +9865,7 @@
           <a:p>
             <a:fld id="{699DC775-C286-4358-8C92-D7E584E969B3}" type="datetimeFigureOut">
               <a:rPr lang="en-US" smtClean="0"/>
-              <a:t>1/31/2018</a:t>
+              <a:t>3/21/2018</a:t>
             </a:fld>
             <a:endParaRPr lang="en-US"/>
           </a:p>
@@ -7608,7 +10284,7 @@
           <a:p>
             <a:fld id="{699DC775-C286-4358-8C92-D7E584E969B3}" type="datetimeFigureOut">
               <a:rPr lang="en-US" smtClean="0"/>
-              <a:t>1/31/2018</a:t>
+              <a:t>3/21/2018</a:t>
             </a:fld>
             <a:endParaRPr lang="en-US"/>
           </a:p>
@@ -7725,7 +10401,7 @@
           <a:p>
             <a:fld id="{699DC775-C286-4358-8C92-D7E584E969B3}" type="datetimeFigureOut">
               <a:rPr lang="en-US" smtClean="0"/>
-              <a:t>1/31/2018</a:t>
+              <a:t>3/21/2018</a:t>
             </a:fld>
             <a:endParaRPr lang="en-US"/>
           </a:p>
@@ -7820,7 +10496,7 @@
           <a:p>
             <a:fld id="{699DC775-C286-4358-8C92-D7E584E969B3}" type="datetimeFigureOut">
               <a:rPr lang="en-US" smtClean="0"/>
-              <a:t>1/31/2018</a:t>
+              <a:t>3/21/2018</a:t>
             </a:fld>
             <a:endParaRPr lang="en-US"/>
           </a:p>
@@ -8095,7 +10771,7 @@
           <a:p>
             <a:fld id="{699DC775-C286-4358-8C92-D7E584E969B3}" type="datetimeFigureOut">
               <a:rPr lang="en-US" smtClean="0"/>
-              <a:t>1/31/2018</a:t>
+              <a:t>3/21/2018</a:t>
             </a:fld>
             <a:endParaRPr lang="en-US"/>
           </a:p>
@@ -8263,7 +10939,7 @@
           <a:p>
             <a:fld id="{699DC775-C286-4358-8C92-D7E584E969B3}" type="datetimeFigureOut">
               <a:rPr lang="en-US" smtClean="0"/>
-              <a:t>1/31/2018</a:t>
+              <a:t>3/21/2018</a:t>
             </a:fld>
             <a:endParaRPr lang="en-US"/>
           </a:p>
@@ -8515,7 +11191,7 @@
           <a:p>
             <a:fld id="{699DC775-C286-4358-8C92-D7E584E969B3}" type="datetimeFigureOut">
               <a:rPr lang="en-US" smtClean="0"/>
-              <a:t>1/31/2018</a:t>
+              <a:t>3/21/2018</a:t>
             </a:fld>
             <a:endParaRPr lang="en-US"/>
           </a:p>
@@ -8683,7 +11359,7 @@
           <a:p>
             <a:fld id="{699DC775-C286-4358-8C92-D7E584E969B3}" type="datetimeFigureOut">
               <a:rPr lang="en-US" smtClean="0"/>
-              <a:t>1/31/2018</a:t>
+              <a:t>3/21/2018</a:t>
             </a:fld>
             <a:endParaRPr lang="en-US"/>
           </a:p>
@@ -8861,7 +11537,7 @@
           <a:p>
             <a:fld id="{699DC775-C286-4358-8C92-D7E584E969B3}" type="datetimeFigureOut">
               <a:rPr lang="en-US" smtClean="0"/>
-              <a:t>1/31/2018</a:t>
+              <a:t>3/21/2018</a:t>
             </a:fld>
             <a:endParaRPr lang="en-US"/>
           </a:p>
@@ -9109,7 +11785,7 @@
           <a:p>
             <a:fld id="{699DC775-C286-4358-8C92-D7E584E969B3}" type="datetimeFigureOut">
               <a:rPr lang="en-US" smtClean="0"/>
-              <a:t>1/31/2018</a:t>
+              <a:t>3/21/2018</a:t>
             </a:fld>
             <a:endParaRPr lang="en-US"/>
           </a:p>
@@ -9285,7 +11961,7 @@
           <a:p>
             <a:fld id="{699DC775-C286-4358-8C92-D7E584E969B3}" type="datetimeFigureOut">
               <a:rPr lang="en-US" smtClean="0"/>
-              <a:t>1/31/2018</a:t>
+              <a:t>3/21/2018</a:t>
             </a:fld>
             <a:endParaRPr lang="en-US"/>
           </a:p>
@@ -9538,7 +12214,7 @@
           <a:p>
             <a:fld id="{699DC775-C286-4358-8C92-D7E584E969B3}" type="datetimeFigureOut">
               <a:rPr lang="en-US" smtClean="0"/>
-              <a:t>1/31/2018</a:t>
+              <a:t>3/21/2018</a:t>
             </a:fld>
             <a:endParaRPr lang="en-US"/>
           </a:p>
@@ -9831,7 +12507,7 @@
           <a:p>
             <a:fld id="{699DC775-C286-4358-8C92-D7E584E969B3}" type="datetimeFigureOut">
               <a:rPr lang="en-US" smtClean="0"/>
-              <a:t>1/31/2018</a:t>
+              <a:t>3/21/2018</a:t>
             </a:fld>
             <a:endParaRPr lang="en-US"/>
           </a:p>
@@ -10258,7 +12934,7 @@
           <a:p>
             <a:fld id="{699DC775-C286-4358-8C92-D7E584E969B3}" type="datetimeFigureOut">
               <a:rPr lang="en-US" smtClean="0"/>
-              <a:t>1/31/2018</a:t>
+              <a:t>3/21/2018</a:t>
             </a:fld>
             <a:endParaRPr lang="en-US"/>
           </a:p>
@@ -10383,7 +13059,7 @@
           <a:p>
             <a:fld id="{699DC775-C286-4358-8C92-D7E584E969B3}" type="datetimeFigureOut">
               <a:rPr lang="en-US" smtClean="0"/>
-              <a:t>1/31/2018</a:t>
+              <a:t>3/21/2018</a:t>
             </a:fld>
             <a:endParaRPr lang="en-US"/>
           </a:p>
@@ -10486,7 +13162,7 @@
           <a:p>
             <a:fld id="{699DC775-C286-4358-8C92-D7E584E969B3}" type="datetimeFigureOut">
               <a:rPr lang="en-US" smtClean="0"/>
-              <a:t>1/31/2018</a:t>
+              <a:t>3/21/2018</a:t>
             </a:fld>
             <a:endParaRPr lang="en-US"/>
           </a:p>
@@ -10731,7 +13407,7 @@
           <a:p>
             <a:fld id="{699DC775-C286-4358-8C92-D7E584E969B3}" type="datetimeFigureOut">
               <a:rPr lang="en-US" smtClean="0"/>
-              <a:t>1/31/2018</a:t>
+              <a:t>3/21/2018</a:t>
             </a:fld>
             <a:endParaRPr lang="en-US"/>
           </a:p>
@@ -11014,7 +13690,7 @@
           <a:p>
             <a:fld id="{699DC775-C286-4358-8C92-D7E584E969B3}" type="datetimeFigureOut">
               <a:rPr lang="en-US" smtClean="0"/>
-              <a:t>1/31/2018</a:t>
+              <a:t>3/21/2018</a:t>
             </a:fld>
             <a:endParaRPr lang="en-US"/>
           </a:p>
@@ -11274,7 +13950,7 @@
           <a:p>
             <a:fld id="{699DC775-C286-4358-8C92-D7E584E969B3}" type="datetimeFigureOut">
               <a:rPr lang="en-US" smtClean="0"/>
-              <a:t>1/31/2018</a:t>
+              <a:t>3/21/2018</a:t>
             </a:fld>
             <a:endParaRPr lang="en-US"/>
           </a:p>
@@ -11450,7 +14126,7 @@
           <a:p>
             <a:fld id="{699DC775-C286-4358-8C92-D7E584E969B3}" type="datetimeFigureOut">
               <a:rPr lang="en-US" smtClean="0"/>
-              <a:t>1/31/2018</a:t>
+              <a:t>3/21/2018</a:t>
             </a:fld>
             <a:endParaRPr lang="en-US"/>
           </a:p>
@@ -11636,7 +14312,7 @@
           <a:p>
             <a:fld id="{699DC775-C286-4358-8C92-D7E584E969B3}" type="datetimeFigureOut">
               <a:rPr lang="en-US" smtClean="0"/>
-              <a:t>1/31/2018</a:t>
+              <a:t>3/21/2018</a:t>
             </a:fld>
             <a:endParaRPr lang="en-US"/>
           </a:p>
@@ -11826,7 +14502,7 @@
           <a:p>
             <a:fld id="{45696B32-6A70-48EC-8939-9D142D9557CD}" type="datetimeFigureOut">
               <a:rPr lang="en-US" smtClean="0"/>
-              <a:t>1/31/2018</a:t>
+              <a:t>3/21/2018</a:t>
             </a:fld>
             <a:endParaRPr lang="en-US"/>
           </a:p>
@@ -12140,7 +14816,7 @@
           <a:p>
             <a:fld id="{45696B32-6A70-48EC-8939-9D142D9557CD}" type="datetimeFigureOut">
               <a:rPr lang="en-US" smtClean="0"/>
-              <a:t>1/31/2018</a:t>
+              <a:t>3/21/2018</a:t>
             </a:fld>
             <a:endParaRPr lang="en-US"/>
           </a:p>
@@ -12385,7 +15061,7 @@
           <a:p>
             <a:fld id="{45696B32-6A70-48EC-8939-9D142D9557CD}" type="datetimeFigureOut">
               <a:rPr lang="en-US" smtClean="0"/>
-              <a:t>1/31/2018</a:t>
+              <a:t>3/21/2018</a:t>
             </a:fld>
             <a:endParaRPr lang="en-US"/>
           </a:p>
@@ -12614,7 +15290,7 @@
           <a:p>
             <a:fld id="{45696B32-6A70-48EC-8939-9D142D9557CD}" type="datetimeFigureOut">
               <a:rPr lang="en-US" smtClean="0"/>
-              <a:t>1/31/2018</a:t>
+              <a:t>3/21/2018</a:t>
             </a:fld>
             <a:endParaRPr lang="en-US"/>
           </a:p>
@@ -12978,7 +15654,7 @@
           <a:p>
             <a:fld id="{45696B32-6A70-48EC-8939-9D142D9557CD}" type="datetimeFigureOut">
               <a:rPr lang="en-US" smtClean="0"/>
-              <a:t>1/31/2018</a:t>
+              <a:t>3/21/2018</a:t>
             </a:fld>
             <a:endParaRPr lang="en-US"/>
           </a:p>
@@ -13095,7 +15771,7 @@
           <a:p>
             <a:fld id="{45696B32-6A70-48EC-8939-9D142D9557CD}" type="datetimeFigureOut">
               <a:rPr lang="en-US" smtClean="0"/>
-              <a:t>1/31/2018</a:t>
+              <a:t>3/21/2018</a:t>
             </a:fld>
             <a:endParaRPr lang="en-US"/>
           </a:p>
@@ -13380,7 +16056,7 @@
           <a:p>
             <a:fld id="{699DC775-C286-4358-8C92-D7E584E969B3}" type="datetimeFigureOut">
               <a:rPr lang="en-US" smtClean="0"/>
-              <a:t>1/31/2018</a:t>
+              <a:t>3/21/2018</a:t>
             </a:fld>
             <a:endParaRPr lang="en-US"/>
           </a:p>
@@ -13475,7 +16151,7 @@
           <a:p>
             <a:fld id="{45696B32-6A70-48EC-8939-9D142D9557CD}" type="datetimeFigureOut">
               <a:rPr lang="en-US" smtClean="0"/>
-              <a:t>1/31/2018</a:t>
+              <a:t>3/21/2018</a:t>
             </a:fld>
             <a:endParaRPr lang="en-US"/>
           </a:p>
@@ -13750,7 +16426,7 @@
           <a:p>
             <a:fld id="{45696B32-6A70-48EC-8939-9D142D9557CD}" type="datetimeFigureOut">
               <a:rPr lang="en-US" smtClean="0"/>
-              <a:t>1/31/2018</a:t>
+              <a:t>3/21/2018</a:t>
             </a:fld>
             <a:endParaRPr lang="en-US"/>
           </a:p>
@@ -14002,7 +16678,7 @@
           <a:p>
             <a:fld id="{45696B32-6A70-48EC-8939-9D142D9557CD}" type="datetimeFigureOut">
               <a:rPr lang="en-US" smtClean="0"/>
-              <a:t>1/31/2018</a:t>
+              <a:t>3/21/2018</a:t>
             </a:fld>
             <a:endParaRPr lang="en-US"/>
           </a:p>
@@ -14170,7 +16846,7 @@
           <a:p>
             <a:fld id="{45696B32-6A70-48EC-8939-9D142D9557CD}" type="datetimeFigureOut">
               <a:rPr lang="en-US" smtClean="0"/>
-              <a:t>1/31/2018</a:t>
+              <a:t>3/21/2018</a:t>
             </a:fld>
             <a:endParaRPr lang="en-US"/>
           </a:p>
@@ -14348,7 +17024,7 @@
           <a:p>
             <a:fld id="{45696B32-6A70-48EC-8939-9D142D9557CD}" type="datetimeFigureOut">
               <a:rPr lang="en-US" smtClean="0"/>
-              <a:t>1/31/2018</a:t>
+              <a:t>3/21/2018</a:t>
             </a:fld>
             <a:endParaRPr lang="en-US"/>
           </a:p>
@@ -14767,7 +17443,7 @@
           <a:p>
             <a:fld id="{699DC775-C286-4358-8C92-D7E584E969B3}" type="datetimeFigureOut">
               <a:rPr lang="en-US" smtClean="0"/>
-              <a:t>1/31/2018</a:t>
+              <a:t>3/21/2018</a:t>
             </a:fld>
             <a:endParaRPr lang="en-US"/>
           </a:p>
@@ -14884,7 +17560,7 @@
           <a:p>
             <a:fld id="{699DC775-C286-4358-8C92-D7E584E969B3}" type="datetimeFigureOut">
               <a:rPr lang="en-US" smtClean="0"/>
-              <a:t>1/31/2018</a:t>
+              <a:t>3/21/2018</a:t>
             </a:fld>
             <a:endParaRPr lang="en-US"/>
           </a:p>
@@ -14979,7 +17655,7 @@
           <a:p>
             <a:fld id="{699DC775-C286-4358-8C92-D7E584E969B3}" type="datetimeFigureOut">
               <a:rPr lang="en-US" smtClean="0"/>
-              <a:t>1/31/2018</a:t>
+              <a:t>3/21/2018</a:t>
             </a:fld>
             <a:endParaRPr lang="en-US"/>
           </a:p>
@@ -15254,7 +17930,7 @@
           <a:p>
             <a:fld id="{699DC775-C286-4358-8C92-D7E584E969B3}" type="datetimeFigureOut">
               <a:rPr lang="en-US" smtClean="0"/>
-              <a:t>1/31/2018</a:t>
+              <a:t>3/21/2018</a:t>
             </a:fld>
             <a:endParaRPr lang="en-US"/>
           </a:p>
@@ -15506,7 +18182,7 @@
           <a:p>
             <a:fld id="{699DC775-C286-4358-8C92-D7E584E969B3}" type="datetimeFigureOut">
               <a:rPr lang="en-US" smtClean="0"/>
-              <a:t>1/31/2018</a:t>
+              <a:t>3/21/2018</a:t>
             </a:fld>
             <a:endParaRPr lang="en-US"/>
           </a:p>
@@ -15717,7 +18393,7 @@
           <a:p>
             <a:fld id="{699DC775-C286-4358-8C92-D7E584E969B3}" type="datetimeFigureOut">
               <a:rPr lang="en-US" smtClean="0"/>
-              <a:t>1/31/2018</a:t>
+              <a:t>3/21/2018</a:t>
             </a:fld>
             <a:endParaRPr lang="en-US"/>
           </a:p>
@@ -16230,7 +18906,7 @@
           <a:p>
             <a:fld id="{699DC775-C286-4358-8C92-D7E584E969B3}" type="datetimeFigureOut">
               <a:rPr lang="en-US" smtClean="0"/>
-              <a:t>1/31/2018</a:t>
+              <a:t>3/21/2018</a:t>
             </a:fld>
             <a:endParaRPr lang="en-US"/>
           </a:p>
@@ -16741,7 +19417,7 @@
           <a:p>
             <a:fld id="{699DC775-C286-4358-8C92-D7E584E969B3}" type="datetimeFigureOut">
               <a:rPr lang="en-US" smtClean="0"/>
-              <a:t>1/31/2018</a:t>
+              <a:t>3/21/2018</a:t>
             </a:fld>
             <a:endParaRPr lang="en-US"/>
           </a:p>
@@ -17249,7 +19925,7 @@
           <a:p>
             <a:fld id="{45696B32-6A70-48EC-8939-9D142D9557CD}" type="datetimeFigureOut">
               <a:rPr lang="en-US" smtClean="0"/>
-              <a:t>1/31/2018</a:t>
+              <a:t>3/21/2018</a:t>
             </a:fld>
             <a:endParaRPr lang="en-US"/>
           </a:p>
@@ -30868,6 +33544,64 @@
     <p:extLst>
       <p:ext uri="{BB962C8B-B14F-4D97-AF65-F5344CB8AC3E}">
         <p14:creationId xmlns:p14="http://schemas.microsoft.com/office/powerpoint/2010/main" val="2343974947"/>
+      </p:ext>
+    </p:extLst>
+  </p:cSld>
+  <p:clrMapOvr>
+    <a:masterClrMapping/>
+  </p:clrMapOvr>
+</p:sld>
+</file>
+
+<file path=ppt/slides/slide47.xml><?xml version="1.0" encoding="utf-8"?>
+<p:sld xmlns:a="http://schemas.openxmlformats.org/drawingml/2006/main" xmlns:r="http://schemas.openxmlformats.org/officeDocument/2006/relationships" xmlns:p="http://schemas.openxmlformats.org/presentationml/2006/main">
+  <p:cSld>
+    <p:spTree>
+      <p:nvGrpSpPr>
+        <p:cNvPr id="1" name=""/>
+        <p:cNvGrpSpPr/>
+        <p:nvPr/>
+      </p:nvGrpSpPr>
+      <p:grpSpPr>
+        <a:xfrm>
+          <a:off x="0" y="0"/>
+          <a:ext cx="0" cy="0"/>
+          <a:chOff x="0" y="0"/>
+          <a:chExt cx="0" cy="0"/>
+        </a:xfrm>
+      </p:grpSpPr>
+      <p:graphicFrame>
+        <p:nvGraphicFramePr>
+          <p:cNvPr id="4" name="SmartArt 1">
+            <a:extLst>
+              <a:ext uri="{FF2B5EF4-FFF2-40B4-BE49-F238E27FC236}">
+                <a16:creationId xmlns:a16="http://schemas.microsoft.com/office/drawing/2014/main" id="{F1081CDD-D1ED-41CF-9914-9E09978430F0}"/>
+              </a:ext>
+            </a:extLst>
+          </p:cNvPr>
+          <p:cNvGraphicFramePr/>
+          <p:nvPr>
+            <p:extLst>
+              <p:ext uri="{D42A27DB-BD31-4B8C-83A1-F6EECF244321}">
+                <p14:modId xmlns:p14="http://schemas.microsoft.com/office/powerpoint/2010/main" val="1724723330"/>
+              </p:ext>
+            </p:extLst>
+          </p:nvPr>
+        </p:nvGraphicFramePr>
+        <p:xfrm>
+          <a:off x="1524000" y="1397000"/>
+          <a:ext cx="6096000" cy="4064000"/>
+        </p:xfrm>
+        <a:graphic>
+          <a:graphicData uri="http://schemas.openxmlformats.org/drawingml/2006/diagram">
+            <dgm:relIds xmlns:dgm="http://schemas.openxmlformats.org/drawingml/2006/diagram" xmlns:r="http://schemas.openxmlformats.org/officeDocument/2006/relationships" r:dm="rId3" r:lo="rId4" r:qs="rId5" r:cs="rId6"/>
+          </a:graphicData>
+        </a:graphic>
+      </p:graphicFrame>
+    </p:spTree>
+    <p:extLst>
+      <p:ext uri="{BB962C8B-B14F-4D97-AF65-F5344CB8AC3E}">
+        <p14:creationId xmlns:p14="http://schemas.microsoft.com/office/powerpoint/2010/main" val="3323667291"/>
       </p:ext>
     </p:extLst>
   </p:cSld>

</xml_diff>

<commit_message>
Show warning dialog when copying custom perspective shadows
</commit_message>
<xml_diff>
--- a/doc/test/SyncLab/SyncLab.pptx
+++ b/doc/test/SyncLab/SyncLab.pptx
@@ -8,7 +8,7 @@
     <p:sldMasterId id="2147483684" r:id="rId4"/>
   </p:sldMasterIdLst>
   <p:notesMasterIdLst>
-    <p:notesMasterId r:id="rId52"/>
+    <p:notesMasterId r:id="rId53"/>
   </p:notesMasterIdLst>
   <p:sldIdLst>
     <p:sldId id="287" r:id="rId5"/>
@@ -58,6 +58,7 @@
     <p:sldId id="417" r:id="rId49"/>
     <p:sldId id="418" r:id="rId50"/>
     <p:sldId id="419" r:id="rId51"/>
+    <p:sldId id="420" r:id="rId52"/>
   </p:sldIdLst>
   <p:sldSz cx="9144000" cy="6858000" type="screen4x3"/>
   <p:notesSz cx="6858000" cy="9144000"/>
@@ -232,6 +233,7 @@
             <p14:sldId id="417"/>
             <p14:sldId id="418"/>
             <p14:sldId id="419"/>
+            <p14:sldId id="420"/>
           </p14:sldIdLst>
         </p14:section>
       </p14:sectionLst>
@@ -2338,7 +2340,7 @@
             </a:spcAft>
             <a:buNone/>
           </a:pPr>
-          <a:endParaRPr lang="en-US" sz="5500" kern="1200"/>
+          <a:endParaRPr lang="en-US" sz="5500" kern="1200" dirty="0"/>
         </a:p>
       </dsp:txBody>
       <dsp:txXfrm>
@@ -3909,7 +3911,7 @@
           <a:p>
             <a:fld id="{43E32005-3A63-48D2-8C73-BF5F95786EBD}" type="datetimeFigureOut">
               <a:rPr lang="en-US" smtClean="0"/>
-              <a:t>3/21/2018</a:t>
+              <a:t>4/11/2018</a:t>
             </a:fld>
             <a:endParaRPr lang="en-US"/>
           </a:p>
@@ -7754,6 +7756,93 @@
 </p:notes>
 </file>
 
+<file path=ppt/notesSlides/notesSlide40.xml><?xml version="1.0" encoding="utf-8"?>
+<p:notes xmlns:a="http://schemas.openxmlformats.org/drawingml/2006/main" xmlns:r="http://schemas.openxmlformats.org/officeDocument/2006/relationships" xmlns:p="http://schemas.openxmlformats.org/presentationml/2006/main">
+  <p:cSld>
+    <p:spTree>
+      <p:nvGrpSpPr>
+        <p:cNvPr id="1" name=""/>
+        <p:cNvGrpSpPr/>
+        <p:nvPr/>
+      </p:nvGrpSpPr>
+      <p:grpSpPr>
+        <a:xfrm>
+          <a:off x="0" y="0"/>
+          <a:ext cx="0" cy="0"/>
+          <a:chOff x="0" y="0"/>
+          <a:chExt cx="0" cy="0"/>
+        </a:xfrm>
+      </p:grpSpPr>
+      <p:sp>
+        <p:nvSpPr>
+          <p:cNvPr id="2" name="Slide Image Placeholder 1"/>
+          <p:cNvSpPr>
+            <a:spLocks noGrp="1" noRot="1" noChangeAspect="1"/>
+          </p:cNvSpPr>
+          <p:nvPr>
+            <p:ph type="sldImg"/>
+          </p:nvPr>
+        </p:nvSpPr>
+        <p:spPr/>
+      </p:sp>
+      <p:sp>
+        <p:nvSpPr>
+          <p:cNvPr id="3" name="Notes Placeholder 2"/>
+          <p:cNvSpPr>
+            <a:spLocks noGrp="1"/>
+          </p:cNvSpPr>
+          <p:nvPr>
+            <p:ph type="body" idx="1"/>
+          </p:nvPr>
+        </p:nvSpPr>
+        <p:spPr/>
+        <p:txBody>
+          <a:bodyPr/>
+          <a:lstStyle/>
+          <a:p>
+            <a:r>
+              <a:rPr lang="en-US" dirty="0"/>
+              <a:t>SmartArt</a:t>
+            </a:r>
+          </a:p>
+        </p:txBody>
+      </p:sp>
+      <p:sp>
+        <p:nvSpPr>
+          <p:cNvPr id="4" name="Slide Number Placeholder 3"/>
+          <p:cNvSpPr>
+            <a:spLocks noGrp="1"/>
+          </p:cNvSpPr>
+          <p:nvPr>
+            <p:ph type="sldNum" sz="quarter" idx="10"/>
+          </p:nvPr>
+        </p:nvSpPr>
+        <p:spPr/>
+        <p:txBody>
+          <a:bodyPr/>
+          <a:lstStyle/>
+          <a:p>
+            <a:fld id="{0FE7C38A-472B-4221-8E00-509E1DA863EC}" type="slidenum">
+              <a:rPr lang="en-US" smtClean="0"/>
+              <a:t>48</a:t>
+            </a:fld>
+            <a:endParaRPr lang="en-US"/>
+          </a:p>
+        </p:txBody>
+      </p:sp>
+    </p:spTree>
+    <p:extLst>
+      <p:ext uri="{BB962C8B-B14F-4D97-AF65-F5344CB8AC3E}">
+        <p14:creationId xmlns:p14="http://schemas.microsoft.com/office/powerpoint/2010/main" val="3672517908"/>
+      </p:ext>
+    </p:extLst>
+  </p:cSld>
+  <p:clrMapOvr>
+    <a:masterClrMapping/>
+  </p:clrMapOvr>
+</p:notes>
+</file>
+
 <file path=ppt/notesSlides/notesSlide5.xml><?xml version="1.0" encoding="utf-8"?>
 <p:notes xmlns:a="http://schemas.openxmlformats.org/drawingml/2006/main" xmlns:r="http://schemas.openxmlformats.org/officeDocument/2006/relationships" xmlns:p="http://schemas.openxmlformats.org/presentationml/2006/main">
   <p:cSld>
@@ -8581,7 +8670,7 @@
           <a:p>
             <a:fld id="{699DC775-C286-4358-8C92-D7E584E969B3}" type="datetimeFigureOut">
               <a:rPr lang="en-US" smtClean="0"/>
-              <a:t>3/21/2018</a:t>
+              <a:t>4/11/2018</a:t>
             </a:fld>
             <a:endParaRPr lang="en-US"/>
           </a:p>
@@ -8749,7 +8838,7 @@
           <a:p>
             <a:fld id="{699DC775-C286-4358-8C92-D7E584E969B3}" type="datetimeFigureOut">
               <a:rPr lang="en-US" smtClean="0"/>
-              <a:t>3/21/2018</a:t>
+              <a:t>4/11/2018</a:t>
             </a:fld>
             <a:endParaRPr lang="en-US"/>
           </a:p>
@@ -8927,7 +9016,7 @@
           <a:p>
             <a:fld id="{699DC775-C286-4358-8C92-D7E584E969B3}" type="datetimeFigureOut">
               <a:rPr lang="en-US" smtClean="0"/>
-              <a:t>3/21/2018</a:t>
+              <a:t>4/11/2018</a:t>
             </a:fld>
             <a:endParaRPr lang="en-US"/>
           </a:p>
@@ -9167,7 +9256,7 @@
           <a:p>
             <a:fld id="{699DC775-C286-4358-8C92-D7E584E969B3}" type="datetimeFigureOut">
               <a:rPr lang="en-US" smtClean="0"/>
-              <a:t>3/21/2018</a:t>
+              <a:t>4/11/2018</a:t>
             </a:fld>
             <a:endParaRPr lang="en-US"/>
           </a:p>
@@ -9335,7 +9424,7 @@
           <a:p>
             <a:fld id="{699DC775-C286-4358-8C92-D7E584E969B3}" type="datetimeFigureOut">
               <a:rPr lang="en-US" smtClean="0"/>
-              <a:t>3/21/2018</a:t>
+              <a:t>4/11/2018</a:t>
             </a:fld>
             <a:endParaRPr lang="en-US"/>
           </a:p>
@@ -9580,7 +9669,7 @@
           <a:p>
             <a:fld id="{699DC775-C286-4358-8C92-D7E584E969B3}" type="datetimeFigureOut">
               <a:rPr lang="en-US" smtClean="0"/>
-              <a:t>3/21/2018</a:t>
+              <a:t>4/11/2018</a:t>
             </a:fld>
             <a:endParaRPr lang="en-US"/>
           </a:p>
@@ -9865,7 +9954,7 @@
           <a:p>
             <a:fld id="{699DC775-C286-4358-8C92-D7E584E969B3}" type="datetimeFigureOut">
               <a:rPr lang="en-US" smtClean="0"/>
-              <a:t>3/21/2018</a:t>
+              <a:t>4/11/2018</a:t>
             </a:fld>
             <a:endParaRPr lang="en-US"/>
           </a:p>
@@ -10284,7 +10373,7 @@
           <a:p>
             <a:fld id="{699DC775-C286-4358-8C92-D7E584E969B3}" type="datetimeFigureOut">
               <a:rPr lang="en-US" smtClean="0"/>
-              <a:t>3/21/2018</a:t>
+              <a:t>4/11/2018</a:t>
             </a:fld>
             <a:endParaRPr lang="en-US"/>
           </a:p>
@@ -10401,7 +10490,7 @@
           <a:p>
             <a:fld id="{699DC775-C286-4358-8C92-D7E584E969B3}" type="datetimeFigureOut">
               <a:rPr lang="en-US" smtClean="0"/>
-              <a:t>3/21/2018</a:t>
+              <a:t>4/11/2018</a:t>
             </a:fld>
             <a:endParaRPr lang="en-US"/>
           </a:p>
@@ -10496,7 +10585,7 @@
           <a:p>
             <a:fld id="{699DC775-C286-4358-8C92-D7E584E969B3}" type="datetimeFigureOut">
               <a:rPr lang="en-US" smtClean="0"/>
-              <a:t>3/21/2018</a:t>
+              <a:t>4/11/2018</a:t>
             </a:fld>
             <a:endParaRPr lang="en-US"/>
           </a:p>
@@ -10771,7 +10860,7 @@
           <a:p>
             <a:fld id="{699DC775-C286-4358-8C92-D7E584E969B3}" type="datetimeFigureOut">
               <a:rPr lang="en-US" smtClean="0"/>
-              <a:t>3/21/2018</a:t>
+              <a:t>4/11/2018</a:t>
             </a:fld>
             <a:endParaRPr lang="en-US"/>
           </a:p>
@@ -10939,7 +11028,7 @@
           <a:p>
             <a:fld id="{699DC775-C286-4358-8C92-D7E584E969B3}" type="datetimeFigureOut">
               <a:rPr lang="en-US" smtClean="0"/>
-              <a:t>3/21/2018</a:t>
+              <a:t>4/11/2018</a:t>
             </a:fld>
             <a:endParaRPr lang="en-US"/>
           </a:p>
@@ -11191,7 +11280,7 @@
           <a:p>
             <a:fld id="{699DC775-C286-4358-8C92-D7E584E969B3}" type="datetimeFigureOut">
               <a:rPr lang="en-US" smtClean="0"/>
-              <a:t>3/21/2018</a:t>
+              <a:t>4/11/2018</a:t>
             </a:fld>
             <a:endParaRPr lang="en-US"/>
           </a:p>
@@ -11359,7 +11448,7 @@
           <a:p>
             <a:fld id="{699DC775-C286-4358-8C92-D7E584E969B3}" type="datetimeFigureOut">
               <a:rPr lang="en-US" smtClean="0"/>
-              <a:t>3/21/2018</a:t>
+              <a:t>4/11/2018</a:t>
             </a:fld>
             <a:endParaRPr lang="en-US"/>
           </a:p>
@@ -11537,7 +11626,7 @@
           <a:p>
             <a:fld id="{699DC775-C286-4358-8C92-D7E584E969B3}" type="datetimeFigureOut">
               <a:rPr lang="en-US" smtClean="0"/>
-              <a:t>3/21/2018</a:t>
+              <a:t>4/11/2018</a:t>
             </a:fld>
             <a:endParaRPr lang="en-US"/>
           </a:p>
@@ -11785,7 +11874,7 @@
           <a:p>
             <a:fld id="{699DC775-C286-4358-8C92-D7E584E969B3}" type="datetimeFigureOut">
               <a:rPr lang="en-US" smtClean="0"/>
-              <a:t>3/21/2018</a:t>
+              <a:t>4/11/2018</a:t>
             </a:fld>
             <a:endParaRPr lang="en-US"/>
           </a:p>
@@ -11961,7 +12050,7 @@
           <a:p>
             <a:fld id="{699DC775-C286-4358-8C92-D7E584E969B3}" type="datetimeFigureOut">
               <a:rPr lang="en-US" smtClean="0"/>
-              <a:t>3/21/2018</a:t>
+              <a:t>4/11/2018</a:t>
             </a:fld>
             <a:endParaRPr lang="en-US"/>
           </a:p>
@@ -12214,7 +12303,7 @@
           <a:p>
             <a:fld id="{699DC775-C286-4358-8C92-D7E584E969B3}" type="datetimeFigureOut">
               <a:rPr lang="en-US" smtClean="0"/>
-              <a:t>3/21/2018</a:t>
+              <a:t>4/11/2018</a:t>
             </a:fld>
             <a:endParaRPr lang="en-US"/>
           </a:p>
@@ -12507,7 +12596,7 @@
           <a:p>
             <a:fld id="{699DC775-C286-4358-8C92-D7E584E969B3}" type="datetimeFigureOut">
               <a:rPr lang="en-US" smtClean="0"/>
-              <a:t>3/21/2018</a:t>
+              <a:t>4/11/2018</a:t>
             </a:fld>
             <a:endParaRPr lang="en-US"/>
           </a:p>
@@ -12934,7 +13023,7 @@
           <a:p>
             <a:fld id="{699DC775-C286-4358-8C92-D7E584E969B3}" type="datetimeFigureOut">
               <a:rPr lang="en-US" smtClean="0"/>
-              <a:t>3/21/2018</a:t>
+              <a:t>4/11/2018</a:t>
             </a:fld>
             <a:endParaRPr lang="en-US"/>
           </a:p>
@@ -13059,7 +13148,7 @@
           <a:p>
             <a:fld id="{699DC775-C286-4358-8C92-D7E584E969B3}" type="datetimeFigureOut">
               <a:rPr lang="en-US" smtClean="0"/>
-              <a:t>3/21/2018</a:t>
+              <a:t>4/11/2018</a:t>
             </a:fld>
             <a:endParaRPr lang="en-US"/>
           </a:p>
@@ -13162,7 +13251,7 @@
           <a:p>
             <a:fld id="{699DC775-C286-4358-8C92-D7E584E969B3}" type="datetimeFigureOut">
               <a:rPr lang="en-US" smtClean="0"/>
-              <a:t>3/21/2018</a:t>
+              <a:t>4/11/2018</a:t>
             </a:fld>
             <a:endParaRPr lang="en-US"/>
           </a:p>
@@ -13407,7 +13496,7 @@
           <a:p>
             <a:fld id="{699DC775-C286-4358-8C92-D7E584E969B3}" type="datetimeFigureOut">
               <a:rPr lang="en-US" smtClean="0"/>
-              <a:t>3/21/2018</a:t>
+              <a:t>4/11/2018</a:t>
             </a:fld>
             <a:endParaRPr lang="en-US"/>
           </a:p>
@@ -13690,7 +13779,7 @@
           <a:p>
             <a:fld id="{699DC775-C286-4358-8C92-D7E584E969B3}" type="datetimeFigureOut">
               <a:rPr lang="en-US" smtClean="0"/>
-              <a:t>3/21/2018</a:t>
+              <a:t>4/11/2018</a:t>
             </a:fld>
             <a:endParaRPr lang="en-US"/>
           </a:p>
@@ -13950,7 +14039,7 @@
           <a:p>
             <a:fld id="{699DC775-C286-4358-8C92-D7E584E969B3}" type="datetimeFigureOut">
               <a:rPr lang="en-US" smtClean="0"/>
-              <a:t>3/21/2018</a:t>
+              <a:t>4/11/2018</a:t>
             </a:fld>
             <a:endParaRPr lang="en-US"/>
           </a:p>
@@ -14126,7 +14215,7 @@
           <a:p>
             <a:fld id="{699DC775-C286-4358-8C92-D7E584E969B3}" type="datetimeFigureOut">
               <a:rPr lang="en-US" smtClean="0"/>
-              <a:t>3/21/2018</a:t>
+              <a:t>4/11/2018</a:t>
             </a:fld>
             <a:endParaRPr lang="en-US"/>
           </a:p>
@@ -14312,7 +14401,7 @@
           <a:p>
             <a:fld id="{699DC775-C286-4358-8C92-D7E584E969B3}" type="datetimeFigureOut">
               <a:rPr lang="en-US" smtClean="0"/>
-              <a:t>3/21/2018</a:t>
+              <a:t>4/11/2018</a:t>
             </a:fld>
             <a:endParaRPr lang="en-US"/>
           </a:p>
@@ -14502,7 +14591,7 @@
           <a:p>
             <a:fld id="{45696B32-6A70-48EC-8939-9D142D9557CD}" type="datetimeFigureOut">
               <a:rPr lang="en-US" smtClean="0"/>
-              <a:t>3/21/2018</a:t>
+              <a:t>4/11/2018</a:t>
             </a:fld>
             <a:endParaRPr lang="en-US"/>
           </a:p>
@@ -14816,7 +14905,7 @@
           <a:p>
             <a:fld id="{45696B32-6A70-48EC-8939-9D142D9557CD}" type="datetimeFigureOut">
               <a:rPr lang="en-US" smtClean="0"/>
-              <a:t>3/21/2018</a:t>
+              <a:t>4/11/2018</a:t>
             </a:fld>
             <a:endParaRPr lang="en-US"/>
           </a:p>
@@ -15061,7 +15150,7 @@
           <a:p>
             <a:fld id="{45696B32-6A70-48EC-8939-9D142D9557CD}" type="datetimeFigureOut">
               <a:rPr lang="en-US" smtClean="0"/>
-              <a:t>3/21/2018</a:t>
+              <a:t>4/11/2018</a:t>
             </a:fld>
             <a:endParaRPr lang="en-US"/>
           </a:p>
@@ -15290,7 +15379,7 @@
           <a:p>
             <a:fld id="{45696B32-6A70-48EC-8939-9D142D9557CD}" type="datetimeFigureOut">
               <a:rPr lang="en-US" smtClean="0"/>
-              <a:t>3/21/2018</a:t>
+              <a:t>4/11/2018</a:t>
             </a:fld>
             <a:endParaRPr lang="en-US"/>
           </a:p>
@@ -15654,7 +15743,7 @@
           <a:p>
             <a:fld id="{45696B32-6A70-48EC-8939-9D142D9557CD}" type="datetimeFigureOut">
               <a:rPr lang="en-US" smtClean="0"/>
-              <a:t>3/21/2018</a:t>
+              <a:t>4/11/2018</a:t>
             </a:fld>
             <a:endParaRPr lang="en-US"/>
           </a:p>
@@ -15771,7 +15860,7 @@
           <a:p>
             <a:fld id="{45696B32-6A70-48EC-8939-9D142D9557CD}" type="datetimeFigureOut">
               <a:rPr lang="en-US" smtClean="0"/>
-              <a:t>3/21/2018</a:t>
+              <a:t>4/11/2018</a:t>
             </a:fld>
             <a:endParaRPr lang="en-US"/>
           </a:p>
@@ -16056,7 +16145,7 @@
           <a:p>
             <a:fld id="{699DC775-C286-4358-8C92-D7E584E969B3}" type="datetimeFigureOut">
               <a:rPr lang="en-US" smtClean="0"/>
-              <a:t>3/21/2018</a:t>
+              <a:t>4/11/2018</a:t>
             </a:fld>
             <a:endParaRPr lang="en-US"/>
           </a:p>
@@ -16151,7 +16240,7 @@
           <a:p>
             <a:fld id="{45696B32-6A70-48EC-8939-9D142D9557CD}" type="datetimeFigureOut">
               <a:rPr lang="en-US" smtClean="0"/>
-              <a:t>3/21/2018</a:t>
+              <a:t>4/11/2018</a:t>
             </a:fld>
             <a:endParaRPr lang="en-US"/>
           </a:p>
@@ -16426,7 +16515,7 @@
           <a:p>
             <a:fld id="{45696B32-6A70-48EC-8939-9D142D9557CD}" type="datetimeFigureOut">
               <a:rPr lang="en-US" smtClean="0"/>
-              <a:t>3/21/2018</a:t>
+              <a:t>4/11/2018</a:t>
             </a:fld>
             <a:endParaRPr lang="en-US"/>
           </a:p>
@@ -16678,7 +16767,7 @@
           <a:p>
             <a:fld id="{45696B32-6A70-48EC-8939-9D142D9557CD}" type="datetimeFigureOut">
               <a:rPr lang="en-US" smtClean="0"/>
-              <a:t>3/21/2018</a:t>
+              <a:t>4/11/2018</a:t>
             </a:fld>
             <a:endParaRPr lang="en-US"/>
           </a:p>
@@ -16846,7 +16935,7 @@
           <a:p>
             <a:fld id="{45696B32-6A70-48EC-8939-9D142D9557CD}" type="datetimeFigureOut">
               <a:rPr lang="en-US" smtClean="0"/>
-              <a:t>3/21/2018</a:t>
+              <a:t>4/11/2018</a:t>
             </a:fld>
             <a:endParaRPr lang="en-US"/>
           </a:p>
@@ -17024,7 +17113,7 @@
           <a:p>
             <a:fld id="{45696B32-6A70-48EC-8939-9D142D9557CD}" type="datetimeFigureOut">
               <a:rPr lang="en-US" smtClean="0"/>
-              <a:t>3/21/2018</a:t>
+              <a:t>4/11/2018</a:t>
             </a:fld>
             <a:endParaRPr lang="en-US"/>
           </a:p>
@@ -17443,7 +17532,7 @@
           <a:p>
             <a:fld id="{699DC775-C286-4358-8C92-D7E584E969B3}" type="datetimeFigureOut">
               <a:rPr lang="en-US" smtClean="0"/>
-              <a:t>3/21/2018</a:t>
+              <a:t>4/11/2018</a:t>
             </a:fld>
             <a:endParaRPr lang="en-US"/>
           </a:p>
@@ -17560,7 +17649,7 @@
           <a:p>
             <a:fld id="{699DC775-C286-4358-8C92-D7E584E969B3}" type="datetimeFigureOut">
               <a:rPr lang="en-US" smtClean="0"/>
-              <a:t>3/21/2018</a:t>
+              <a:t>4/11/2018</a:t>
             </a:fld>
             <a:endParaRPr lang="en-US"/>
           </a:p>
@@ -17655,7 +17744,7 @@
           <a:p>
             <a:fld id="{699DC775-C286-4358-8C92-D7E584E969B3}" type="datetimeFigureOut">
               <a:rPr lang="en-US" smtClean="0"/>
-              <a:t>3/21/2018</a:t>
+              <a:t>4/11/2018</a:t>
             </a:fld>
             <a:endParaRPr lang="en-US"/>
           </a:p>
@@ -17930,7 +18019,7 @@
           <a:p>
             <a:fld id="{699DC775-C286-4358-8C92-D7E584E969B3}" type="datetimeFigureOut">
               <a:rPr lang="en-US" smtClean="0"/>
-              <a:t>3/21/2018</a:t>
+              <a:t>4/11/2018</a:t>
             </a:fld>
             <a:endParaRPr lang="en-US"/>
           </a:p>
@@ -18182,7 +18271,7 @@
           <a:p>
             <a:fld id="{699DC775-C286-4358-8C92-D7E584E969B3}" type="datetimeFigureOut">
               <a:rPr lang="en-US" smtClean="0"/>
-              <a:t>3/21/2018</a:t>
+              <a:t>4/11/2018</a:t>
             </a:fld>
             <a:endParaRPr lang="en-US"/>
           </a:p>
@@ -18393,7 +18482,7 @@
           <a:p>
             <a:fld id="{699DC775-C286-4358-8C92-D7E584E969B3}" type="datetimeFigureOut">
               <a:rPr lang="en-US" smtClean="0"/>
-              <a:t>3/21/2018</a:t>
+              <a:t>4/11/2018</a:t>
             </a:fld>
             <a:endParaRPr lang="en-US"/>
           </a:p>
@@ -18906,7 +18995,7 @@
           <a:p>
             <a:fld id="{699DC775-C286-4358-8C92-D7E584E969B3}" type="datetimeFigureOut">
               <a:rPr lang="en-US" smtClean="0"/>
-              <a:t>3/21/2018</a:t>
+              <a:t>4/11/2018</a:t>
             </a:fld>
             <a:endParaRPr lang="en-US"/>
           </a:p>
@@ -19417,7 +19506,7 @@
           <a:p>
             <a:fld id="{699DC775-C286-4358-8C92-D7E584E969B3}" type="datetimeFigureOut">
               <a:rPr lang="en-US" smtClean="0"/>
-              <a:t>3/21/2018</a:t>
+              <a:t>4/11/2018</a:t>
             </a:fld>
             <a:endParaRPr lang="en-US"/>
           </a:p>
@@ -19925,7 +20014,7 @@
           <a:p>
             <a:fld id="{45696B32-6A70-48EC-8939-9D142D9557CD}" type="datetimeFigureOut">
               <a:rPr lang="en-US" smtClean="0"/>
-              <a:t>3/21/2018</a:t>
+              <a:t>4/11/2018</a:t>
             </a:fld>
             <a:endParaRPr lang="en-US"/>
           </a:p>
@@ -33602,6 +33691,89 @@
     <p:extLst>
       <p:ext uri="{BB962C8B-B14F-4D97-AF65-F5344CB8AC3E}">
         <p14:creationId xmlns:p14="http://schemas.microsoft.com/office/powerpoint/2010/main" val="3323667291"/>
+      </p:ext>
+    </p:extLst>
+  </p:cSld>
+  <p:clrMapOvr>
+    <a:masterClrMapping/>
+  </p:clrMapOvr>
+</p:sld>
+</file>
+
+<file path=ppt/slides/slide48.xml><?xml version="1.0" encoding="utf-8"?>
+<p:sld xmlns:a="http://schemas.openxmlformats.org/drawingml/2006/main" xmlns:r="http://schemas.openxmlformats.org/officeDocument/2006/relationships" xmlns:p="http://schemas.openxmlformats.org/presentationml/2006/main">
+  <p:cSld>
+    <p:spTree>
+      <p:nvGrpSpPr>
+        <p:cNvPr id="1" name=""/>
+        <p:cNvGrpSpPr/>
+        <p:nvPr/>
+      </p:nvGrpSpPr>
+      <p:grpSpPr>
+        <a:xfrm>
+          <a:off x="0" y="0"/>
+          <a:ext cx="0" cy="0"/>
+          <a:chOff x="0" y="0"/>
+          <a:chExt cx="0" cy="0"/>
+        </a:xfrm>
+      </p:grpSpPr>
+      <p:sp>
+        <p:nvSpPr>
+          <p:cNvPr id="2" name="Custom Perspective Shadow">
+            <a:extLst>
+              <a:ext uri="{FF2B5EF4-FFF2-40B4-BE49-F238E27FC236}">
+                <a16:creationId xmlns:a16="http://schemas.microsoft.com/office/drawing/2014/main" id="{CDFCE54E-FE43-4EB3-B003-1BC51DC2F375}"/>
+              </a:ext>
+            </a:extLst>
+          </p:cNvPr>
+          <p:cNvSpPr/>
+          <p:nvPr/>
+        </p:nvSpPr>
+        <p:spPr>
+          <a:xfrm>
+            <a:off x="2667000" y="1447800"/>
+            <a:ext cx="3505200" cy="3733800"/>
+          </a:xfrm>
+          <a:prstGeom prst="rect">
+            <a:avLst/>
+          </a:prstGeom>
+          <a:effectLst>
+            <a:outerShdw blurRad="76200" dist="1244600" dir="7980000" sy="23000" kx="-1200000" algn="bl" rotWithShape="0">
+              <a:prstClr val="black">
+                <a:alpha val="20000"/>
+              </a:prstClr>
+            </a:outerShdw>
+          </a:effectLst>
+        </p:spPr>
+        <p:style>
+          <a:lnRef idx="2">
+            <a:schemeClr val="accent1">
+              <a:shade val="50000"/>
+            </a:schemeClr>
+          </a:lnRef>
+          <a:fillRef idx="1">
+            <a:schemeClr val="accent1"/>
+          </a:fillRef>
+          <a:effectRef idx="0">
+            <a:schemeClr val="accent1"/>
+          </a:effectRef>
+          <a:fontRef idx="minor">
+            <a:schemeClr val="lt1"/>
+          </a:fontRef>
+        </p:style>
+        <p:txBody>
+          <a:bodyPr rtlCol="0" anchor="ctr"/>
+          <a:lstStyle/>
+          <a:p>
+            <a:pPr algn="ctr"/>
+            <a:endParaRPr lang="en-US" dirty="0"/>
+          </a:p>
+        </p:txBody>
+      </p:sp>
+    </p:spTree>
+    <p:extLst>
+      <p:ext uri="{BB962C8B-B14F-4D97-AF65-F5344CB8AC3E}">
+        <p14:creationId xmlns:p14="http://schemas.microsoft.com/office/powerpoint/2010/main" val="4144271423"/>
       </p:ext>
     </p:extLst>
   </p:cSld>

</xml_diff>

<commit_message>
#1213 support for syncing shadow (#1655)
* Add support for syncing shadow

* Add UT for ShadowEffect

* Show shadow in pane image

* Fix bugs due to ShadowFormat.Type

* Sync ForeColor for non mixed types

* Address bugs with modified shadows

* Show warning dialog when copying custom perspective shadows

* Revert: Accidental edit to SyncLab_VisualEffects.pptx

* Fix syncing perspective shadow's warning message
</commit_message>
<xml_diff>
--- a/doc/test/SyncLab/SyncLab.pptx
+++ b/doc/test/SyncLab/SyncLab.pptx
@@ -8,7 +8,7 @@
     <p:sldMasterId id="2147483684" r:id="rId4"/>
   </p:sldMasterIdLst>
   <p:notesMasterIdLst>
-    <p:notesMasterId r:id="rId52"/>
+    <p:notesMasterId r:id="rId53"/>
   </p:notesMasterIdLst>
   <p:sldIdLst>
     <p:sldId id="287" r:id="rId5"/>
@@ -58,6 +58,7 @@
     <p:sldId id="417" r:id="rId49"/>
     <p:sldId id="418" r:id="rId50"/>
     <p:sldId id="419" r:id="rId51"/>
+    <p:sldId id="420" r:id="rId52"/>
   </p:sldIdLst>
   <p:sldSz cx="9144000" cy="6858000" type="screen4x3"/>
   <p:notesSz cx="6858000" cy="9144000"/>
@@ -232,6 +233,7 @@
             <p14:sldId id="417"/>
             <p14:sldId id="418"/>
             <p14:sldId id="419"/>
+            <p14:sldId id="420"/>
           </p14:sldIdLst>
         </p14:section>
       </p14:sectionLst>
@@ -2338,7 +2340,7 @@
             </a:spcAft>
             <a:buNone/>
           </a:pPr>
-          <a:endParaRPr lang="en-US" sz="5500" kern="1200"/>
+          <a:endParaRPr lang="en-US" sz="5500" kern="1200" dirty="0"/>
         </a:p>
       </dsp:txBody>
       <dsp:txXfrm>
@@ -3909,7 +3911,7 @@
           <a:p>
             <a:fld id="{43E32005-3A63-48D2-8C73-BF5F95786EBD}" type="datetimeFigureOut">
               <a:rPr lang="en-US" smtClean="0"/>
-              <a:t>3/21/2018</a:t>
+              <a:t>4/11/2018</a:t>
             </a:fld>
             <a:endParaRPr lang="en-US"/>
           </a:p>
@@ -7754,6 +7756,93 @@
 </p:notes>
 </file>
 
+<file path=ppt/notesSlides/notesSlide40.xml><?xml version="1.0" encoding="utf-8"?>
+<p:notes xmlns:a="http://schemas.openxmlformats.org/drawingml/2006/main" xmlns:r="http://schemas.openxmlformats.org/officeDocument/2006/relationships" xmlns:p="http://schemas.openxmlformats.org/presentationml/2006/main">
+  <p:cSld>
+    <p:spTree>
+      <p:nvGrpSpPr>
+        <p:cNvPr id="1" name=""/>
+        <p:cNvGrpSpPr/>
+        <p:nvPr/>
+      </p:nvGrpSpPr>
+      <p:grpSpPr>
+        <a:xfrm>
+          <a:off x="0" y="0"/>
+          <a:ext cx="0" cy="0"/>
+          <a:chOff x="0" y="0"/>
+          <a:chExt cx="0" cy="0"/>
+        </a:xfrm>
+      </p:grpSpPr>
+      <p:sp>
+        <p:nvSpPr>
+          <p:cNvPr id="2" name="Slide Image Placeholder 1"/>
+          <p:cNvSpPr>
+            <a:spLocks noGrp="1" noRot="1" noChangeAspect="1"/>
+          </p:cNvSpPr>
+          <p:nvPr>
+            <p:ph type="sldImg"/>
+          </p:nvPr>
+        </p:nvSpPr>
+        <p:spPr/>
+      </p:sp>
+      <p:sp>
+        <p:nvSpPr>
+          <p:cNvPr id="3" name="Notes Placeholder 2"/>
+          <p:cNvSpPr>
+            <a:spLocks noGrp="1"/>
+          </p:cNvSpPr>
+          <p:nvPr>
+            <p:ph type="body" idx="1"/>
+          </p:nvPr>
+        </p:nvSpPr>
+        <p:spPr/>
+        <p:txBody>
+          <a:bodyPr/>
+          <a:lstStyle/>
+          <a:p>
+            <a:r>
+              <a:rPr lang="en-US" dirty="0"/>
+              <a:t>SmartArt</a:t>
+            </a:r>
+          </a:p>
+        </p:txBody>
+      </p:sp>
+      <p:sp>
+        <p:nvSpPr>
+          <p:cNvPr id="4" name="Slide Number Placeholder 3"/>
+          <p:cNvSpPr>
+            <a:spLocks noGrp="1"/>
+          </p:cNvSpPr>
+          <p:nvPr>
+            <p:ph type="sldNum" sz="quarter" idx="10"/>
+          </p:nvPr>
+        </p:nvSpPr>
+        <p:spPr/>
+        <p:txBody>
+          <a:bodyPr/>
+          <a:lstStyle/>
+          <a:p>
+            <a:fld id="{0FE7C38A-472B-4221-8E00-509E1DA863EC}" type="slidenum">
+              <a:rPr lang="en-US" smtClean="0"/>
+              <a:t>48</a:t>
+            </a:fld>
+            <a:endParaRPr lang="en-US"/>
+          </a:p>
+        </p:txBody>
+      </p:sp>
+    </p:spTree>
+    <p:extLst>
+      <p:ext uri="{BB962C8B-B14F-4D97-AF65-F5344CB8AC3E}">
+        <p14:creationId xmlns:p14="http://schemas.microsoft.com/office/powerpoint/2010/main" val="3672517908"/>
+      </p:ext>
+    </p:extLst>
+  </p:cSld>
+  <p:clrMapOvr>
+    <a:masterClrMapping/>
+  </p:clrMapOvr>
+</p:notes>
+</file>
+
 <file path=ppt/notesSlides/notesSlide5.xml><?xml version="1.0" encoding="utf-8"?>
 <p:notes xmlns:a="http://schemas.openxmlformats.org/drawingml/2006/main" xmlns:r="http://schemas.openxmlformats.org/officeDocument/2006/relationships" xmlns:p="http://schemas.openxmlformats.org/presentationml/2006/main">
   <p:cSld>
@@ -8581,7 +8670,7 @@
           <a:p>
             <a:fld id="{699DC775-C286-4358-8C92-D7E584E969B3}" type="datetimeFigureOut">
               <a:rPr lang="en-US" smtClean="0"/>
-              <a:t>3/21/2018</a:t>
+              <a:t>4/11/2018</a:t>
             </a:fld>
             <a:endParaRPr lang="en-US"/>
           </a:p>
@@ -8749,7 +8838,7 @@
           <a:p>
             <a:fld id="{699DC775-C286-4358-8C92-D7E584E969B3}" type="datetimeFigureOut">
               <a:rPr lang="en-US" smtClean="0"/>
-              <a:t>3/21/2018</a:t>
+              <a:t>4/11/2018</a:t>
             </a:fld>
             <a:endParaRPr lang="en-US"/>
           </a:p>
@@ -8927,7 +9016,7 @@
           <a:p>
             <a:fld id="{699DC775-C286-4358-8C92-D7E584E969B3}" type="datetimeFigureOut">
               <a:rPr lang="en-US" smtClean="0"/>
-              <a:t>3/21/2018</a:t>
+              <a:t>4/11/2018</a:t>
             </a:fld>
             <a:endParaRPr lang="en-US"/>
           </a:p>
@@ -9167,7 +9256,7 @@
           <a:p>
             <a:fld id="{699DC775-C286-4358-8C92-D7E584E969B3}" type="datetimeFigureOut">
               <a:rPr lang="en-US" smtClean="0"/>
-              <a:t>3/21/2018</a:t>
+              <a:t>4/11/2018</a:t>
             </a:fld>
             <a:endParaRPr lang="en-US"/>
           </a:p>
@@ -9335,7 +9424,7 @@
           <a:p>
             <a:fld id="{699DC775-C286-4358-8C92-D7E584E969B3}" type="datetimeFigureOut">
               <a:rPr lang="en-US" smtClean="0"/>
-              <a:t>3/21/2018</a:t>
+              <a:t>4/11/2018</a:t>
             </a:fld>
             <a:endParaRPr lang="en-US"/>
           </a:p>
@@ -9580,7 +9669,7 @@
           <a:p>
             <a:fld id="{699DC775-C286-4358-8C92-D7E584E969B3}" type="datetimeFigureOut">
               <a:rPr lang="en-US" smtClean="0"/>
-              <a:t>3/21/2018</a:t>
+              <a:t>4/11/2018</a:t>
             </a:fld>
             <a:endParaRPr lang="en-US"/>
           </a:p>
@@ -9865,7 +9954,7 @@
           <a:p>
             <a:fld id="{699DC775-C286-4358-8C92-D7E584E969B3}" type="datetimeFigureOut">
               <a:rPr lang="en-US" smtClean="0"/>
-              <a:t>3/21/2018</a:t>
+              <a:t>4/11/2018</a:t>
             </a:fld>
             <a:endParaRPr lang="en-US"/>
           </a:p>
@@ -10284,7 +10373,7 @@
           <a:p>
             <a:fld id="{699DC775-C286-4358-8C92-D7E584E969B3}" type="datetimeFigureOut">
               <a:rPr lang="en-US" smtClean="0"/>
-              <a:t>3/21/2018</a:t>
+              <a:t>4/11/2018</a:t>
             </a:fld>
             <a:endParaRPr lang="en-US"/>
           </a:p>
@@ -10401,7 +10490,7 @@
           <a:p>
             <a:fld id="{699DC775-C286-4358-8C92-D7E584E969B3}" type="datetimeFigureOut">
               <a:rPr lang="en-US" smtClean="0"/>
-              <a:t>3/21/2018</a:t>
+              <a:t>4/11/2018</a:t>
             </a:fld>
             <a:endParaRPr lang="en-US"/>
           </a:p>
@@ -10496,7 +10585,7 @@
           <a:p>
             <a:fld id="{699DC775-C286-4358-8C92-D7E584E969B3}" type="datetimeFigureOut">
               <a:rPr lang="en-US" smtClean="0"/>
-              <a:t>3/21/2018</a:t>
+              <a:t>4/11/2018</a:t>
             </a:fld>
             <a:endParaRPr lang="en-US"/>
           </a:p>
@@ -10771,7 +10860,7 @@
           <a:p>
             <a:fld id="{699DC775-C286-4358-8C92-D7E584E969B3}" type="datetimeFigureOut">
               <a:rPr lang="en-US" smtClean="0"/>
-              <a:t>3/21/2018</a:t>
+              <a:t>4/11/2018</a:t>
             </a:fld>
             <a:endParaRPr lang="en-US"/>
           </a:p>
@@ -10939,7 +11028,7 @@
           <a:p>
             <a:fld id="{699DC775-C286-4358-8C92-D7E584E969B3}" type="datetimeFigureOut">
               <a:rPr lang="en-US" smtClean="0"/>
-              <a:t>3/21/2018</a:t>
+              <a:t>4/11/2018</a:t>
             </a:fld>
             <a:endParaRPr lang="en-US"/>
           </a:p>
@@ -11191,7 +11280,7 @@
           <a:p>
             <a:fld id="{699DC775-C286-4358-8C92-D7E584E969B3}" type="datetimeFigureOut">
               <a:rPr lang="en-US" smtClean="0"/>
-              <a:t>3/21/2018</a:t>
+              <a:t>4/11/2018</a:t>
             </a:fld>
             <a:endParaRPr lang="en-US"/>
           </a:p>
@@ -11359,7 +11448,7 @@
           <a:p>
             <a:fld id="{699DC775-C286-4358-8C92-D7E584E969B3}" type="datetimeFigureOut">
               <a:rPr lang="en-US" smtClean="0"/>
-              <a:t>3/21/2018</a:t>
+              <a:t>4/11/2018</a:t>
             </a:fld>
             <a:endParaRPr lang="en-US"/>
           </a:p>
@@ -11537,7 +11626,7 @@
           <a:p>
             <a:fld id="{699DC775-C286-4358-8C92-D7E584E969B3}" type="datetimeFigureOut">
               <a:rPr lang="en-US" smtClean="0"/>
-              <a:t>3/21/2018</a:t>
+              <a:t>4/11/2018</a:t>
             </a:fld>
             <a:endParaRPr lang="en-US"/>
           </a:p>
@@ -11785,7 +11874,7 @@
           <a:p>
             <a:fld id="{699DC775-C286-4358-8C92-D7E584E969B3}" type="datetimeFigureOut">
               <a:rPr lang="en-US" smtClean="0"/>
-              <a:t>3/21/2018</a:t>
+              <a:t>4/11/2018</a:t>
             </a:fld>
             <a:endParaRPr lang="en-US"/>
           </a:p>
@@ -11961,7 +12050,7 @@
           <a:p>
             <a:fld id="{699DC775-C286-4358-8C92-D7E584E969B3}" type="datetimeFigureOut">
               <a:rPr lang="en-US" smtClean="0"/>
-              <a:t>3/21/2018</a:t>
+              <a:t>4/11/2018</a:t>
             </a:fld>
             <a:endParaRPr lang="en-US"/>
           </a:p>
@@ -12214,7 +12303,7 @@
           <a:p>
             <a:fld id="{699DC775-C286-4358-8C92-D7E584E969B3}" type="datetimeFigureOut">
               <a:rPr lang="en-US" smtClean="0"/>
-              <a:t>3/21/2018</a:t>
+              <a:t>4/11/2018</a:t>
             </a:fld>
             <a:endParaRPr lang="en-US"/>
           </a:p>
@@ -12507,7 +12596,7 @@
           <a:p>
             <a:fld id="{699DC775-C286-4358-8C92-D7E584E969B3}" type="datetimeFigureOut">
               <a:rPr lang="en-US" smtClean="0"/>
-              <a:t>3/21/2018</a:t>
+              <a:t>4/11/2018</a:t>
             </a:fld>
             <a:endParaRPr lang="en-US"/>
           </a:p>
@@ -12934,7 +13023,7 @@
           <a:p>
             <a:fld id="{699DC775-C286-4358-8C92-D7E584E969B3}" type="datetimeFigureOut">
               <a:rPr lang="en-US" smtClean="0"/>
-              <a:t>3/21/2018</a:t>
+              <a:t>4/11/2018</a:t>
             </a:fld>
             <a:endParaRPr lang="en-US"/>
           </a:p>
@@ -13059,7 +13148,7 @@
           <a:p>
             <a:fld id="{699DC775-C286-4358-8C92-D7E584E969B3}" type="datetimeFigureOut">
               <a:rPr lang="en-US" smtClean="0"/>
-              <a:t>3/21/2018</a:t>
+              <a:t>4/11/2018</a:t>
             </a:fld>
             <a:endParaRPr lang="en-US"/>
           </a:p>
@@ -13162,7 +13251,7 @@
           <a:p>
             <a:fld id="{699DC775-C286-4358-8C92-D7E584E969B3}" type="datetimeFigureOut">
               <a:rPr lang="en-US" smtClean="0"/>
-              <a:t>3/21/2018</a:t>
+              <a:t>4/11/2018</a:t>
             </a:fld>
             <a:endParaRPr lang="en-US"/>
           </a:p>
@@ -13407,7 +13496,7 @@
           <a:p>
             <a:fld id="{699DC775-C286-4358-8C92-D7E584E969B3}" type="datetimeFigureOut">
               <a:rPr lang="en-US" smtClean="0"/>
-              <a:t>3/21/2018</a:t>
+              <a:t>4/11/2018</a:t>
             </a:fld>
             <a:endParaRPr lang="en-US"/>
           </a:p>
@@ -13690,7 +13779,7 @@
           <a:p>
             <a:fld id="{699DC775-C286-4358-8C92-D7E584E969B3}" type="datetimeFigureOut">
               <a:rPr lang="en-US" smtClean="0"/>
-              <a:t>3/21/2018</a:t>
+              <a:t>4/11/2018</a:t>
             </a:fld>
             <a:endParaRPr lang="en-US"/>
           </a:p>
@@ -13950,7 +14039,7 @@
           <a:p>
             <a:fld id="{699DC775-C286-4358-8C92-D7E584E969B3}" type="datetimeFigureOut">
               <a:rPr lang="en-US" smtClean="0"/>
-              <a:t>3/21/2018</a:t>
+              <a:t>4/11/2018</a:t>
             </a:fld>
             <a:endParaRPr lang="en-US"/>
           </a:p>
@@ -14126,7 +14215,7 @@
           <a:p>
             <a:fld id="{699DC775-C286-4358-8C92-D7E584E969B3}" type="datetimeFigureOut">
               <a:rPr lang="en-US" smtClean="0"/>
-              <a:t>3/21/2018</a:t>
+              <a:t>4/11/2018</a:t>
             </a:fld>
             <a:endParaRPr lang="en-US"/>
           </a:p>
@@ -14312,7 +14401,7 @@
           <a:p>
             <a:fld id="{699DC775-C286-4358-8C92-D7E584E969B3}" type="datetimeFigureOut">
               <a:rPr lang="en-US" smtClean="0"/>
-              <a:t>3/21/2018</a:t>
+              <a:t>4/11/2018</a:t>
             </a:fld>
             <a:endParaRPr lang="en-US"/>
           </a:p>
@@ -14502,7 +14591,7 @@
           <a:p>
             <a:fld id="{45696B32-6A70-48EC-8939-9D142D9557CD}" type="datetimeFigureOut">
               <a:rPr lang="en-US" smtClean="0"/>
-              <a:t>3/21/2018</a:t>
+              <a:t>4/11/2018</a:t>
             </a:fld>
             <a:endParaRPr lang="en-US"/>
           </a:p>
@@ -14816,7 +14905,7 @@
           <a:p>
             <a:fld id="{45696B32-6A70-48EC-8939-9D142D9557CD}" type="datetimeFigureOut">
               <a:rPr lang="en-US" smtClean="0"/>
-              <a:t>3/21/2018</a:t>
+              <a:t>4/11/2018</a:t>
             </a:fld>
             <a:endParaRPr lang="en-US"/>
           </a:p>
@@ -15061,7 +15150,7 @@
           <a:p>
             <a:fld id="{45696B32-6A70-48EC-8939-9D142D9557CD}" type="datetimeFigureOut">
               <a:rPr lang="en-US" smtClean="0"/>
-              <a:t>3/21/2018</a:t>
+              <a:t>4/11/2018</a:t>
             </a:fld>
             <a:endParaRPr lang="en-US"/>
           </a:p>
@@ -15290,7 +15379,7 @@
           <a:p>
             <a:fld id="{45696B32-6A70-48EC-8939-9D142D9557CD}" type="datetimeFigureOut">
               <a:rPr lang="en-US" smtClean="0"/>
-              <a:t>3/21/2018</a:t>
+              <a:t>4/11/2018</a:t>
             </a:fld>
             <a:endParaRPr lang="en-US"/>
           </a:p>
@@ -15654,7 +15743,7 @@
           <a:p>
             <a:fld id="{45696B32-6A70-48EC-8939-9D142D9557CD}" type="datetimeFigureOut">
               <a:rPr lang="en-US" smtClean="0"/>
-              <a:t>3/21/2018</a:t>
+              <a:t>4/11/2018</a:t>
             </a:fld>
             <a:endParaRPr lang="en-US"/>
           </a:p>
@@ -15771,7 +15860,7 @@
           <a:p>
             <a:fld id="{45696B32-6A70-48EC-8939-9D142D9557CD}" type="datetimeFigureOut">
               <a:rPr lang="en-US" smtClean="0"/>
-              <a:t>3/21/2018</a:t>
+              <a:t>4/11/2018</a:t>
             </a:fld>
             <a:endParaRPr lang="en-US"/>
           </a:p>
@@ -16056,7 +16145,7 @@
           <a:p>
             <a:fld id="{699DC775-C286-4358-8C92-D7E584E969B3}" type="datetimeFigureOut">
               <a:rPr lang="en-US" smtClean="0"/>
-              <a:t>3/21/2018</a:t>
+              <a:t>4/11/2018</a:t>
             </a:fld>
             <a:endParaRPr lang="en-US"/>
           </a:p>
@@ -16151,7 +16240,7 @@
           <a:p>
             <a:fld id="{45696B32-6A70-48EC-8939-9D142D9557CD}" type="datetimeFigureOut">
               <a:rPr lang="en-US" smtClean="0"/>
-              <a:t>3/21/2018</a:t>
+              <a:t>4/11/2018</a:t>
             </a:fld>
             <a:endParaRPr lang="en-US"/>
           </a:p>
@@ -16426,7 +16515,7 @@
           <a:p>
             <a:fld id="{45696B32-6A70-48EC-8939-9D142D9557CD}" type="datetimeFigureOut">
               <a:rPr lang="en-US" smtClean="0"/>
-              <a:t>3/21/2018</a:t>
+              <a:t>4/11/2018</a:t>
             </a:fld>
             <a:endParaRPr lang="en-US"/>
           </a:p>
@@ -16678,7 +16767,7 @@
           <a:p>
             <a:fld id="{45696B32-6A70-48EC-8939-9D142D9557CD}" type="datetimeFigureOut">
               <a:rPr lang="en-US" smtClean="0"/>
-              <a:t>3/21/2018</a:t>
+              <a:t>4/11/2018</a:t>
             </a:fld>
             <a:endParaRPr lang="en-US"/>
           </a:p>
@@ -16846,7 +16935,7 @@
           <a:p>
             <a:fld id="{45696B32-6A70-48EC-8939-9D142D9557CD}" type="datetimeFigureOut">
               <a:rPr lang="en-US" smtClean="0"/>
-              <a:t>3/21/2018</a:t>
+              <a:t>4/11/2018</a:t>
             </a:fld>
             <a:endParaRPr lang="en-US"/>
           </a:p>
@@ -17024,7 +17113,7 @@
           <a:p>
             <a:fld id="{45696B32-6A70-48EC-8939-9D142D9557CD}" type="datetimeFigureOut">
               <a:rPr lang="en-US" smtClean="0"/>
-              <a:t>3/21/2018</a:t>
+              <a:t>4/11/2018</a:t>
             </a:fld>
             <a:endParaRPr lang="en-US"/>
           </a:p>
@@ -17443,7 +17532,7 @@
           <a:p>
             <a:fld id="{699DC775-C286-4358-8C92-D7E584E969B3}" type="datetimeFigureOut">
               <a:rPr lang="en-US" smtClean="0"/>
-              <a:t>3/21/2018</a:t>
+              <a:t>4/11/2018</a:t>
             </a:fld>
             <a:endParaRPr lang="en-US"/>
           </a:p>
@@ -17560,7 +17649,7 @@
           <a:p>
             <a:fld id="{699DC775-C286-4358-8C92-D7E584E969B3}" type="datetimeFigureOut">
               <a:rPr lang="en-US" smtClean="0"/>
-              <a:t>3/21/2018</a:t>
+              <a:t>4/11/2018</a:t>
             </a:fld>
             <a:endParaRPr lang="en-US"/>
           </a:p>
@@ -17655,7 +17744,7 @@
           <a:p>
             <a:fld id="{699DC775-C286-4358-8C92-D7E584E969B3}" type="datetimeFigureOut">
               <a:rPr lang="en-US" smtClean="0"/>
-              <a:t>3/21/2018</a:t>
+              <a:t>4/11/2018</a:t>
             </a:fld>
             <a:endParaRPr lang="en-US"/>
           </a:p>
@@ -17930,7 +18019,7 @@
           <a:p>
             <a:fld id="{699DC775-C286-4358-8C92-D7E584E969B3}" type="datetimeFigureOut">
               <a:rPr lang="en-US" smtClean="0"/>
-              <a:t>3/21/2018</a:t>
+              <a:t>4/11/2018</a:t>
             </a:fld>
             <a:endParaRPr lang="en-US"/>
           </a:p>
@@ -18182,7 +18271,7 @@
           <a:p>
             <a:fld id="{699DC775-C286-4358-8C92-D7E584E969B3}" type="datetimeFigureOut">
               <a:rPr lang="en-US" smtClean="0"/>
-              <a:t>3/21/2018</a:t>
+              <a:t>4/11/2018</a:t>
             </a:fld>
             <a:endParaRPr lang="en-US"/>
           </a:p>
@@ -18393,7 +18482,7 @@
           <a:p>
             <a:fld id="{699DC775-C286-4358-8C92-D7E584E969B3}" type="datetimeFigureOut">
               <a:rPr lang="en-US" smtClean="0"/>
-              <a:t>3/21/2018</a:t>
+              <a:t>4/11/2018</a:t>
             </a:fld>
             <a:endParaRPr lang="en-US"/>
           </a:p>
@@ -18906,7 +18995,7 @@
           <a:p>
             <a:fld id="{699DC775-C286-4358-8C92-D7E584E969B3}" type="datetimeFigureOut">
               <a:rPr lang="en-US" smtClean="0"/>
-              <a:t>3/21/2018</a:t>
+              <a:t>4/11/2018</a:t>
             </a:fld>
             <a:endParaRPr lang="en-US"/>
           </a:p>
@@ -19417,7 +19506,7 @@
           <a:p>
             <a:fld id="{699DC775-C286-4358-8C92-D7E584E969B3}" type="datetimeFigureOut">
               <a:rPr lang="en-US" smtClean="0"/>
-              <a:t>3/21/2018</a:t>
+              <a:t>4/11/2018</a:t>
             </a:fld>
             <a:endParaRPr lang="en-US"/>
           </a:p>
@@ -19925,7 +20014,7 @@
           <a:p>
             <a:fld id="{45696B32-6A70-48EC-8939-9D142D9557CD}" type="datetimeFigureOut">
               <a:rPr lang="en-US" smtClean="0"/>
-              <a:t>3/21/2018</a:t>
+              <a:t>4/11/2018</a:t>
             </a:fld>
             <a:endParaRPr lang="en-US"/>
           </a:p>
@@ -33602,6 +33691,89 @@
     <p:extLst>
       <p:ext uri="{BB962C8B-B14F-4D97-AF65-F5344CB8AC3E}">
         <p14:creationId xmlns:p14="http://schemas.microsoft.com/office/powerpoint/2010/main" val="3323667291"/>
+      </p:ext>
+    </p:extLst>
+  </p:cSld>
+  <p:clrMapOvr>
+    <a:masterClrMapping/>
+  </p:clrMapOvr>
+</p:sld>
+</file>
+
+<file path=ppt/slides/slide48.xml><?xml version="1.0" encoding="utf-8"?>
+<p:sld xmlns:a="http://schemas.openxmlformats.org/drawingml/2006/main" xmlns:r="http://schemas.openxmlformats.org/officeDocument/2006/relationships" xmlns:p="http://schemas.openxmlformats.org/presentationml/2006/main">
+  <p:cSld>
+    <p:spTree>
+      <p:nvGrpSpPr>
+        <p:cNvPr id="1" name=""/>
+        <p:cNvGrpSpPr/>
+        <p:nvPr/>
+      </p:nvGrpSpPr>
+      <p:grpSpPr>
+        <a:xfrm>
+          <a:off x="0" y="0"/>
+          <a:ext cx="0" cy="0"/>
+          <a:chOff x="0" y="0"/>
+          <a:chExt cx="0" cy="0"/>
+        </a:xfrm>
+      </p:grpSpPr>
+      <p:sp>
+        <p:nvSpPr>
+          <p:cNvPr id="2" name="Custom Perspective Shadow">
+            <a:extLst>
+              <a:ext uri="{FF2B5EF4-FFF2-40B4-BE49-F238E27FC236}">
+                <a16:creationId xmlns:a16="http://schemas.microsoft.com/office/drawing/2014/main" id="{CDFCE54E-FE43-4EB3-B003-1BC51DC2F375}"/>
+              </a:ext>
+            </a:extLst>
+          </p:cNvPr>
+          <p:cNvSpPr/>
+          <p:nvPr/>
+        </p:nvSpPr>
+        <p:spPr>
+          <a:xfrm>
+            <a:off x="2667000" y="1447800"/>
+            <a:ext cx="3505200" cy="3733800"/>
+          </a:xfrm>
+          <a:prstGeom prst="rect">
+            <a:avLst/>
+          </a:prstGeom>
+          <a:effectLst>
+            <a:outerShdw blurRad="76200" dist="1244600" dir="7980000" sy="23000" kx="-1200000" algn="bl" rotWithShape="0">
+              <a:prstClr val="black">
+                <a:alpha val="20000"/>
+              </a:prstClr>
+            </a:outerShdw>
+          </a:effectLst>
+        </p:spPr>
+        <p:style>
+          <a:lnRef idx="2">
+            <a:schemeClr val="accent1">
+              <a:shade val="50000"/>
+            </a:schemeClr>
+          </a:lnRef>
+          <a:fillRef idx="1">
+            <a:schemeClr val="accent1"/>
+          </a:fillRef>
+          <a:effectRef idx="0">
+            <a:schemeClr val="accent1"/>
+          </a:effectRef>
+          <a:fontRef idx="minor">
+            <a:schemeClr val="lt1"/>
+          </a:fontRef>
+        </p:style>
+        <p:txBody>
+          <a:bodyPr rtlCol="0" anchor="ctr"/>
+          <a:lstStyle/>
+          <a:p>
+            <a:pPr algn="ctr"/>
+            <a:endParaRPr lang="en-US" dirty="0"/>
+          </a:p>
+        </p:txBody>
+      </p:sp>
+    </p:spTree>
+    <p:extLst>
+      <p:ext uri="{BB962C8B-B14F-4D97-AF65-F5344CB8AC3E}">
+        <p14:creationId xmlns:p14="http://schemas.microsoft.com/office/powerpoint/2010/main" val="4144271423"/>
       </p:ext>
     </p:extLst>
   </p:cSld>

</xml_diff>